<commit_message>
Add link to Atlassian tutorial
</commit_message>
<xml_diff>
--- a/presentation/walkingThroughTheWood.pptx
+++ b/presentation/walkingThroughTheWood.pptx
@@ -205,7 +205,7 @@
           <a:p>
             <a:fld id="{5B4B4F26-8393-3B4D-8FE5-9C29F905127C}" type="datetimeFigureOut">
               <a:rPr lang="en-US" smtClean="0"/>
-              <a:t>3/20/2013</a:t>
+              <a:t>21/03/13</a:t>
             </a:fld>
             <a:endParaRPr lang="en-US"/>
           </a:p>
@@ -1494,7 +1494,7 @@
           <a:p>
             <a:fld id="{99C3E6F9-20FC-254C-9885-321F390E26D9}" type="datetimeFigureOut">
               <a:rPr lang="en-US" smtClean="0"/>
-              <a:t>3/20/2013</a:t>
+              <a:t>21/03/13</a:t>
             </a:fld>
             <a:endParaRPr lang="en-US"/>
           </a:p>
@@ -1664,7 +1664,7 @@
           <a:p>
             <a:fld id="{99C3E6F9-20FC-254C-9885-321F390E26D9}" type="datetimeFigureOut">
               <a:rPr lang="en-US" smtClean="0"/>
-              <a:t>3/20/2013</a:t>
+              <a:t>21/03/13</a:t>
             </a:fld>
             <a:endParaRPr lang="en-US"/>
           </a:p>
@@ -1844,7 +1844,7 @@
           <a:p>
             <a:fld id="{99C3E6F9-20FC-254C-9885-321F390E26D9}" type="datetimeFigureOut">
               <a:rPr lang="en-US" smtClean="0"/>
-              <a:t>3/20/2013</a:t>
+              <a:t>21/03/13</a:t>
             </a:fld>
             <a:endParaRPr lang="en-US"/>
           </a:p>
@@ -2094,7 +2094,7 @@
                 <a:latin typeface="Calibri"/>
               </a:rPr>
               <a:pPr/>
-              <a:t>3/20/2013</a:t>
+              <a:t>21/03/13</a:t>
             </a:fld>
             <a:endParaRPr lang="en-US">
               <a:solidFill>
@@ -2301,7 +2301,7 @@
                 <a:latin typeface="Calibri"/>
               </a:rPr>
               <a:pPr/>
-              <a:t>3/20/2013</a:t>
+              <a:t>21/03/13</a:t>
             </a:fld>
             <a:endParaRPr lang="en-US">
               <a:solidFill>
@@ -2584,7 +2584,7 @@
                 <a:latin typeface="Calibri"/>
               </a:rPr>
               <a:pPr/>
-              <a:t>3/20/2013</a:t>
+              <a:t>21/03/13</a:t>
             </a:fld>
             <a:endParaRPr lang="en-US">
               <a:solidFill>
@@ -2909,7 +2909,7 @@
                 <a:latin typeface="Calibri"/>
               </a:rPr>
               <a:pPr/>
-              <a:t>3/20/2013</a:t>
+              <a:t>21/03/13</a:t>
             </a:fld>
             <a:endParaRPr lang="en-US">
               <a:solidFill>
@@ -3368,7 +3368,7 @@
                 <a:latin typeface="Calibri"/>
               </a:rPr>
               <a:pPr/>
-              <a:t>3/20/2013</a:t>
+              <a:t>21/03/13</a:t>
             </a:fld>
             <a:endParaRPr lang="en-US">
               <a:solidFill>
@@ -3523,7 +3523,7 @@
                 <a:latin typeface="Calibri"/>
               </a:rPr>
               <a:pPr/>
-              <a:t>3/20/2013</a:t>
+              <a:t>21/03/13</a:t>
             </a:fld>
             <a:endParaRPr lang="en-US">
               <a:solidFill>
@@ -3655,7 +3655,7 @@
                 <a:latin typeface="Calibri"/>
               </a:rPr>
               <a:pPr/>
-              <a:t>3/20/2013</a:t>
+              <a:t>21/03/13</a:t>
             </a:fld>
             <a:endParaRPr lang="en-US">
               <a:solidFill>
@@ -3969,7 +3969,7 @@
                 <a:latin typeface="Calibri"/>
               </a:rPr>
               <a:pPr/>
-              <a:t>3/20/2013</a:t>
+              <a:t>21/03/13</a:t>
             </a:fld>
             <a:endParaRPr lang="en-US">
               <a:solidFill>
@@ -4168,7 +4168,7 @@
           <a:p>
             <a:fld id="{99C3E6F9-20FC-254C-9885-321F390E26D9}" type="datetimeFigureOut">
               <a:rPr lang="en-US" smtClean="0"/>
-              <a:t>3/20/2013</a:t>
+              <a:t>21/03/13</a:t>
             </a:fld>
             <a:endParaRPr lang="en-US"/>
           </a:p>
@@ -4429,7 +4429,7 @@
                 <a:latin typeface="Calibri"/>
               </a:rPr>
               <a:pPr/>
-              <a:t>3/20/2013</a:t>
+              <a:t>21/03/13</a:t>
             </a:fld>
             <a:endParaRPr lang="en-US">
               <a:solidFill>
@@ -4636,7 +4636,7 @@
                 <a:latin typeface="Calibri"/>
               </a:rPr>
               <a:pPr/>
-              <a:t>3/20/2013</a:t>
+              <a:t>21/03/13</a:t>
             </a:fld>
             <a:endParaRPr lang="en-US">
               <a:solidFill>
@@ -4853,7 +4853,7 @@
                 <a:latin typeface="Calibri"/>
               </a:rPr>
               <a:pPr/>
-              <a:t>3/20/2013</a:t>
+              <a:t>21/03/13</a:t>
             </a:fld>
             <a:endParaRPr lang="en-US">
               <a:solidFill>
@@ -5132,7 +5132,7 @@
                 <a:latin typeface="Calibri"/>
               </a:rPr>
               <a:pPr/>
-              <a:t>3/20/2013</a:t>
+              <a:t>21/03/13</a:t>
             </a:fld>
             <a:endParaRPr lang="en-US">
               <a:solidFill>
@@ -5339,7 +5339,7 @@
                 <a:latin typeface="Calibri"/>
               </a:rPr>
               <a:pPr/>
-              <a:t>3/20/2013</a:t>
+              <a:t>21/03/13</a:t>
             </a:fld>
             <a:endParaRPr lang="en-US">
               <a:solidFill>
@@ -5622,7 +5622,7 @@
                 <a:latin typeface="Calibri"/>
               </a:rPr>
               <a:pPr/>
-              <a:t>3/20/2013</a:t>
+              <a:t>21/03/13</a:t>
             </a:fld>
             <a:endParaRPr lang="en-US">
               <a:solidFill>
@@ -5947,7 +5947,7 @@
                 <a:latin typeface="Calibri"/>
               </a:rPr>
               <a:pPr/>
-              <a:t>3/20/2013</a:t>
+              <a:t>21/03/13</a:t>
             </a:fld>
             <a:endParaRPr lang="en-US">
               <a:solidFill>
@@ -6406,7 +6406,7 @@
                 <a:latin typeface="Calibri"/>
               </a:rPr>
               <a:pPr/>
-              <a:t>3/20/2013</a:t>
+              <a:t>21/03/13</a:t>
             </a:fld>
             <a:endParaRPr lang="en-US">
               <a:solidFill>
@@ -6561,7 +6561,7 @@
                 <a:latin typeface="Calibri"/>
               </a:rPr>
               <a:pPr/>
-              <a:t>3/20/2013</a:t>
+              <a:t>21/03/13</a:t>
             </a:fld>
             <a:endParaRPr lang="en-US">
               <a:solidFill>
@@ -6693,7 +6693,7 @@
                 <a:latin typeface="Calibri"/>
               </a:rPr>
               <a:pPr/>
-              <a:t>3/20/2013</a:t>
+              <a:t>21/03/13</a:t>
             </a:fld>
             <a:endParaRPr lang="en-US">
               <a:solidFill>
@@ -6968,7 +6968,7 @@
           <a:p>
             <a:fld id="{99C3E6F9-20FC-254C-9885-321F390E26D9}" type="datetimeFigureOut">
               <a:rPr lang="en-US" smtClean="0"/>
-              <a:t>3/20/2013</a:t>
+              <a:t>21/03/13</a:t>
             </a:fld>
             <a:endParaRPr lang="en-US"/>
           </a:p>
@@ -7253,7 +7253,7 @@
                 <a:latin typeface="Calibri"/>
               </a:rPr>
               <a:pPr/>
-              <a:t>3/20/2013</a:t>
+              <a:t>21/03/13</a:t>
             </a:fld>
             <a:endParaRPr lang="en-US">
               <a:solidFill>
@@ -7543,7 +7543,7 @@
                 <a:latin typeface="Calibri"/>
               </a:rPr>
               <a:pPr/>
-              <a:t>3/20/2013</a:t>
+              <a:t>21/03/13</a:t>
             </a:fld>
             <a:endParaRPr lang="en-US">
               <a:solidFill>
@@ -7750,7 +7750,7 @@
                 <a:latin typeface="Calibri"/>
               </a:rPr>
               <a:pPr/>
-              <a:t>3/20/2013</a:t>
+              <a:t>21/03/13</a:t>
             </a:fld>
             <a:endParaRPr lang="en-US">
               <a:solidFill>
@@ -7967,7 +7967,7 @@
                 <a:latin typeface="Calibri"/>
               </a:rPr>
               <a:pPr/>
-              <a:t>3/20/2013</a:t>
+              <a:t>21/03/13</a:t>
             </a:fld>
             <a:endParaRPr lang="en-US">
               <a:solidFill>
@@ -8246,7 +8246,7 @@
                 <a:latin typeface="Calibri"/>
               </a:rPr>
               <a:pPr/>
-              <a:t>3/20/2013</a:t>
+              <a:t>21/03/13</a:t>
             </a:fld>
             <a:endParaRPr lang="en-US">
               <a:solidFill>
@@ -8453,7 +8453,7 @@
                 <a:latin typeface="Calibri"/>
               </a:rPr>
               <a:pPr/>
-              <a:t>3/20/2013</a:t>
+              <a:t>21/03/13</a:t>
             </a:fld>
             <a:endParaRPr lang="en-US">
               <a:solidFill>
@@ -8736,7 +8736,7 @@
                 <a:latin typeface="Calibri"/>
               </a:rPr>
               <a:pPr/>
-              <a:t>3/20/2013</a:t>
+              <a:t>21/03/13</a:t>
             </a:fld>
             <a:endParaRPr lang="en-US">
               <a:solidFill>
@@ -9061,7 +9061,7 @@
                 <a:latin typeface="Calibri"/>
               </a:rPr>
               <a:pPr/>
-              <a:t>3/20/2013</a:t>
+              <a:t>21/03/13</a:t>
             </a:fld>
             <a:endParaRPr lang="en-US">
               <a:solidFill>
@@ -9520,7 +9520,7 @@
                 <a:latin typeface="Calibri"/>
               </a:rPr>
               <a:pPr/>
-              <a:t>3/20/2013</a:t>
+              <a:t>21/03/13</a:t>
             </a:fld>
             <a:endParaRPr lang="en-US">
               <a:solidFill>
@@ -9675,7 +9675,7 @@
                 <a:latin typeface="Calibri"/>
               </a:rPr>
               <a:pPr/>
-              <a:t>3/20/2013</a:t>
+              <a:t>21/03/13</a:t>
             </a:fld>
             <a:endParaRPr lang="en-US">
               <a:solidFill>
@@ -9992,7 +9992,7 @@
           <a:p>
             <a:fld id="{99C3E6F9-20FC-254C-9885-321F390E26D9}" type="datetimeFigureOut">
               <a:rPr lang="en-US" smtClean="0"/>
-              <a:t>3/20/2013</a:t>
+              <a:t>21/03/13</a:t>
             </a:fld>
             <a:endParaRPr lang="en-US"/>
           </a:p>
@@ -10095,7 +10095,7 @@
                 <a:latin typeface="Calibri"/>
               </a:rPr>
               <a:pPr/>
-              <a:t>3/20/2013</a:t>
+              <a:t>21/03/13</a:t>
             </a:fld>
             <a:endParaRPr lang="en-US">
               <a:solidFill>
@@ -10409,7 +10409,7 @@
                 <a:latin typeface="Calibri"/>
               </a:rPr>
               <a:pPr/>
-              <a:t>3/20/2013</a:t>
+              <a:t>21/03/13</a:t>
             </a:fld>
             <a:endParaRPr lang="en-US">
               <a:solidFill>
@@ -10699,7 +10699,7 @@
                 <a:latin typeface="Calibri"/>
               </a:rPr>
               <a:pPr/>
-              <a:t>3/20/2013</a:t>
+              <a:t>21/03/13</a:t>
             </a:fld>
             <a:endParaRPr lang="en-US">
               <a:solidFill>
@@ -10906,7 +10906,7 @@
                 <a:latin typeface="Calibri"/>
               </a:rPr>
               <a:pPr/>
-              <a:t>3/20/2013</a:t>
+              <a:t>21/03/13</a:t>
             </a:fld>
             <a:endParaRPr lang="en-US">
               <a:solidFill>
@@ -11123,7 +11123,7 @@
                 <a:latin typeface="Calibri"/>
               </a:rPr>
               <a:pPr/>
-              <a:t>3/20/2013</a:t>
+              <a:t>21/03/13</a:t>
             </a:fld>
             <a:endParaRPr lang="en-US">
               <a:solidFill>
@@ -11401,7 +11401,7 @@
                 </a:solidFill>
               </a:rPr>
               <a:pPr/>
-              <a:t>3/20/2013</a:t>
+              <a:t>21/03/13</a:t>
             </a:fld>
             <a:endParaRPr lang="en-US">
               <a:solidFill>
@@ -11603,7 +11603,7 @@
                 </a:solidFill>
               </a:rPr>
               <a:pPr/>
-              <a:t>3/20/2013</a:t>
+              <a:t>21/03/13</a:t>
             </a:fld>
             <a:endParaRPr lang="en-US">
               <a:solidFill>
@@ -11881,7 +11881,7 @@
                 </a:solidFill>
               </a:rPr>
               <a:pPr/>
-              <a:t>3/20/2013</a:t>
+              <a:t>21/03/13</a:t>
             </a:fld>
             <a:endParaRPr lang="en-US">
               <a:solidFill>
@@ -12201,7 +12201,7 @@
                 </a:solidFill>
               </a:rPr>
               <a:pPr/>
-              <a:t>3/20/2013</a:t>
+              <a:t>21/03/13</a:t>
             </a:fld>
             <a:endParaRPr lang="en-US">
               <a:solidFill>
@@ -12655,7 +12655,7 @@
                 </a:solidFill>
               </a:rPr>
               <a:pPr/>
-              <a:t>3/20/2013</a:t>
+              <a:t>21/03/13</a:t>
             </a:fld>
             <a:endParaRPr lang="en-US">
               <a:solidFill>
@@ -13102,7 +13102,7 @@
           <a:p>
             <a:fld id="{99C3E6F9-20FC-254C-9885-321F390E26D9}" type="datetimeFigureOut">
               <a:rPr lang="en-US" smtClean="0"/>
-              <a:t>3/20/2013</a:t>
+              <a:t>21/03/13</a:t>
             </a:fld>
             <a:endParaRPr lang="en-US"/>
           </a:p>
@@ -13227,7 +13227,7 @@
                 </a:solidFill>
               </a:rPr>
               <a:pPr/>
-              <a:t>3/20/2013</a:t>
+              <a:t>21/03/13</a:t>
             </a:fld>
             <a:endParaRPr lang="en-US">
               <a:solidFill>
@@ -13354,7 +13354,7 @@
                 </a:solidFill>
               </a:rPr>
               <a:pPr/>
-              <a:t>3/20/2013</a:t>
+              <a:t>21/03/13</a:t>
             </a:fld>
             <a:endParaRPr lang="en-US">
               <a:solidFill>
@@ -13663,7 +13663,7 @@
                 </a:solidFill>
               </a:rPr>
               <a:pPr/>
-              <a:t>3/20/2013</a:t>
+              <a:t>21/03/13</a:t>
             </a:fld>
             <a:endParaRPr lang="en-US">
               <a:solidFill>
@@ -13948,7 +13948,7 @@
                 </a:solidFill>
               </a:rPr>
               <a:pPr/>
-              <a:t>3/20/2013</a:t>
+              <a:t>21/03/13</a:t>
             </a:fld>
             <a:endParaRPr lang="en-US">
               <a:solidFill>
@@ -14150,7 +14150,7 @@
                 </a:solidFill>
               </a:rPr>
               <a:pPr/>
-              <a:t>3/20/2013</a:t>
+              <a:t>21/03/13</a:t>
             </a:fld>
             <a:endParaRPr lang="en-US">
               <a:solidFill>
@@ -14362,7 +14362,7 @@
                 </a:solidFill>
               </a:rPr>
               <a:pPr/>
-              <a:t>3/20/2013</a:t>
+              <a:t>21/03/13</a:t>
             </a:fld>
             <a:endParaRPr lang="en-US">
               <a:solidFill>
@@ -14505,7 +14505,7 @@
           <a:p>
             <a:fld id="{99C3E6F9-20FC-254C-9885-321F390E26D9}" type="datetimeFigureOut">
               <a:rPr lang="en-US" smtClean="0"/>
-              <a:t>3/20/2013</a:t>
+              <a:t>21/03/13</a:t>
             </a:fld>
             <a:endParaRPr lang="en-US"/>
           </a:p>
@@ -14600,7 +14600,7 @@
           <a:p>
             <a:fld id="{99C3E6F9-20FC-254C-9885-321F390E26D9}" type="datetimeFigureOut">
               <a:rPr lang="en-US" smtClean="0"/>
-              <a:t>3/20/2013</a:t>
+              <a:t>21/03/13</a:t>
             </a:fld>
             <a:endParaRPr lang="en-US"/>
           </a:p>
@@ -14877,7 +14877,7 @@
           <a:p>
             <a:fld id="{99C3E6F9-20FC-254C-9885-321F390E26D9}" type="datetimeFigureOut">
               <a:rPr lang="en-US" smtClean="0"/>
-              <a:t>3/20/2013</a:t>
+              <a:t>21/03/13</a:t>
             </a:fld>
             <a:endParaRPr lang="en-US"/>
           </a:p>
@@ -15130,7 +15130,7 @@
           <a:p>
             <a:fld id="{99C3E6F9-20FC-254C-9885-321F390E26D9}" type="datetimeFigureOut">
               <a:rPr lang="en-US" smtClean="0"/>
-              <a:t>3/20/2013</a:t>
+              <a:t>21/03/13</a:t>
             </a:fld>
             <a:endParaRPr lang="en-US"/>
           </a:p>
@@ -15343,7 +15343,7 @@
           <a:p>
             <a:fld id="{99C3E6F9-20FC-254C-9885-321F390E26D9}" type="datetimeFigureOut">
               <a:rPr lang="en-US" smtClean="0"/>
-              <a:t>3/20/2013</a:t>
+              <a:t>21/03/13</a:t>
             </a:fld>
             <a:endParaRPr lang="en-US"/>
           </a:p>
@@ -15861,7 +15861,7 @@
                 <a:latin typeface="Calibri"/>
               </a:rPr>
               <a:pPr/>
-              <a:t>3/20/2013</a:t>
+              <a:t>21/03/13</a:t>
             </a:fld>
             <a:endParaRPr lang="en-US">
               <a:solidFill>
@@ -16408,7 +16408,7 @@
                 <a:latin typeface="Calibri"/>
               </a:rPr>
               <a:pPr/>
-              <a:t>3/20/2013</a:t>
+              <a:t>21/03/13</a:t>
             </a:fld>
             <a:endParaRPr lang="en-US">
               <a:solidFill>
@@ -16955,7 +16955,7 @@
                 <a:latin typeface="Calibri"/>
               </a:rPr>
               <a:pPr/>
-              <a:t>3/20/2013</a:t>
+              <a:t>21/03/13</a:t>
             </a:fld>
             <a:endParaRPr lang="en-US">
               <a:solidFill>
@@ -17501,7 +17501,7 @@
                 </a:solidFill>
               </a:rPr>
               <a:pPr/>
-              <a:t>3/20/2013</a:t>
+              <a:t>21/03/13</a:t>
             </a:fld>
             <a:endParaRPr lang="en-US">
               <a:solidFill>
@@ -18170,7 +18170,7 @@
   <p:timing>
     <p:tnLst>
       <p:par>
-        <p:cTn id="1" dur="indefinite" restart="never" nodeType="tmRoot"/>
+        <p:cTn xmlns:p14="http://schemas.microsoft.com/office/powerpoint/2010/main" id="1" dur="indefinite" restart="never" nodeType="tmRoot"/>
       </p:par>
     </p:tnLst>
   </p:timing>
@@ -18602,26 +18602,7 @@
                 <a:latin typeface="Lucida Sans Unicode"/>
                 <a:cs typeface="Lucida Sans Unicode"/>
               </a:rPr>
-              <a:t>Copy the content </a:t>
-            </a:r>
-            <a:r>
-              <a:rPr lang="en-US" dirty="0" smtClean="0">
-                <a:solidFill>
-                  <a:schemeClr val="tx2">
-                    <a:lumMod val="50000"/>
-                  </a:schemeClr>
-                </a:solidFill>
-                <a:effectLst>
-                  <a:outerShdw blurRad="50800" dist="38100" dir="2700000" algn="tl" rotWithShape="0">
-                    <a:schemeClr val="bg1">
-                      <a:alpha val="40000"/>
-                    </a:schemeClr>
-                  </a:outerShdw>
-                </a:effectLst>
-                <a:latin typeface="Lucida Sans Unicode"/>
-                <a:cs typeface="Lucida Sans Unicode"/>
-              </a:rPr>
-              <a:t>to your profile on </a:t>
+              <a:t>Copy the content to your profile on </a:t>
             </a:r>
             <a:r>
               <a:rPr lang="en-US" dirty="0" err="1" smtClean="0">
@@ -18695,7 +18676,7 @@
   <p:timing>
     <p:tnLst>
       <p:par>
-        <p:cTn id="1" dur="indefinite" restart="never" nodeType="tmRoot"/>
+        <p:cTn xmlns:p14="http://schemas.microsoft.com/office/powerpoint/2010/main" id="1" dur="indefinite" restart="never" nodeType="tmRoot"/>
       </p:par>
     </p:tnLst>
   </p:timing>
@@ -19028,7 +19009,7 @@
   <p:timing>
     <p:tnLst>
       <p:par>
-        <p:cTn id="1" dur="indefinite" restart="never" nodeType="tmRoot"/>
+        <p:cTn xmlns:p14="http://schemas.microsoft.com/office/powerpoint/2010/main" id="1" dur="indefinite" restart="never" nodeType="tmRoot"/>
       </p:par>
     </p:tnLst>
   </p:timing>
@@ -19199,7 +19180,7 @@
   <p:timing>
     <p:tnLst>
       <p:par>
-        <p:cTn id="1" dur="indefinite" restart="never" nodeType="tmRoot"/>
+        <p:cTn xmlns:p14="http://schemas.microsoft.com/office/powerpoint/2010/main" id="1" dur="indefinite" restart="never" nodeType="tmRoot"/>
       </p:par>
     </p:tnLst>
   </p:timing>
@@ -19370,7 +19351,7 @@
   <p:timing>
     <p:tnLst>
       <p:par>
-        <p:cTn id="1" dur="indefinite" restart="never" nodeType="tmRoot"/>
+        <p:cTn xmlns:p14="http://schemas.microsoft.com/office/powerpoint/2010/main" id="1" dur="indefinite" restart="never" nodeType="tmRoot"/>
       </p:par>
     </p:tnLst>
   </p:timing>
@@ -19550,7 +19531,7 @@
   <p:timing>
     <p:tnLst>
       <p:par>
-        <p:cTn id="1" dur="indefinite" restart="never" nodeType="tmRoot"/>
+        <p:cTn xmlns:p14="http://schemas.microsoft.com/office/powerpoint/2010/main" id="1" dur="indefinite" restart="never" nodeType="tmRoot"/>
       </p:par>
     </p:tnLst>
   </p:timing>
@@ -19683,7 +19664,7 @@
   <p:timing>
     <p:tnLst>
       <p:par>
-        <p:cTn id="1" dur="indefinite" restart="never" nodeType="tmRoot"/>
+        <p:cTn xmlns:p14="http://schemas.microsoft.com/office/powerpoint/2010/main" id="1" dur="indefinite" restart="never" nodeType="tmRoot"/>
       </p:par>
     </p:tnLst>
   </p:timing>
@@ -19795,14 +19776,80 @@
         </p:blipFill>
         <p:spPr>
           <a:xfrm>
-            <a:off x="1307633" y="1417638"/>
-            <a:ext cx="6507595" cy="5201877"/>
+            <a:off x="1504731" y="1417638"/>
+            <a:ext cx="6103424" cy="4878801"/>
           </a:xfrm>
           <a:prstGeom prst="rect">
             <a:avLst/>
           </a:prstGeom>
         </p:spPr>
       </p:pic>
+      <p:sp>
+        <p:nvSpPr>
+          <p:cNvPr id="3" name="TextBox 2"/>
+          <p:cNvSpPr txBox="1"/>
+          <p:nvPr/>
+        </p:nvSpPr>
+        <p:spPr>
+          <a:xfrm>
+            <a:off x="2622925" y="4069270"/>
+            <a:ext cx="3869869" cy="369332"/>
+          </a:xfrm>
+          <a:prstGeom prst="rect">
+            <a:avLst/>
+          </a:prstGeom>
+          <a:solidFill>
+            <a:schemeClr val="bg2"/>
+          </a:solidFill>
+        </p:spPr>
+        <p:txBody>
+          <a:bodyPr wrap="none" rtlCol="0">
+            <a:spAutoFit/>
+          </a:bodyPr>
+          <a:lstStyle/>
+          <a:p>
+            <a:r>
+              <a:rPr lang="en-US" dirty="0">
+                <a:solidFill>
+                  <a:schemeClr val="tx2">
+                    <a:lumMod val="50000"/>
+                  </a:schemeClr>
+                </a:solidFill>
+              </a:rPr>
+              <a:t>Tutorial : </a:t>
+            </a:r>
+            <a:r>
+              <a:rPr lang="en-US" dirty="0">
+                <a:solidFill>
+                  <a:schemeClr val="tx2">
+                    <a:lumMod val="50000"/>
+                  </a:schemeClr>
+                </a:solidFill>
+                <a:hlinkClick r:id="rId5"/>
+              </a:rPr>
+              <a:t>http://www.atlassian.com/</a:t>
+            </a:r>
+            <a:r>
+              <a:rPr lang="en-US" dirty="0" smtClean="0">
+                <a:solidFill>
+                  <a:schemeClr val="tx2">
+                    <a:lumMod val="50000"/>
+                  </a:schemeClr>
+                </a:solidFill>
+                <a:hlinkClick r:id="rId5"/>
+              </a:rPr>
+              <a:t>git</a:t>
+            </a:r>
+            <a:endParaRPr lang="en-US" dirty="0">
+              <a:solidFill>
+                <a:schemeClr val="tx2">
+                  <a:lumMod val="50000"/>
+                </a:schemeClr>
+              </a:solidFill>
+            </a:endParaRPr>
+          </a:p>
+        </p:txBody>
+      </p:sp>
     </p:spTree>
     <p:extLst>
       <p:ext uri="{BB962C8B-B14F-4D97-AF65-F5344CB8AC3E}">
@@ -19816,7 +19863,7 @@
   <p:timing>
     <p:tnLst>
       <p:par>
-        <p:cTn id="1" dur="indefinite" restart="never" nodeType="tmRoot"/>
+        <p:cTn xmlns:p14="http://schemas.microsoft.com/office/powerpoint/2010/main" id="1" dur="indefinite" restart="never" nodeType="tmRoot"/>
       </p:par>
     </p:tnLst>
   </p:timing>
@@ -19949,7 +19996,7 @@
   <p:timing>
     <p:tnLst>
       <p:par>
-        <p:cTn id="1" dur="indefinite" restart="never" nodeType="tmRoot"/>
+        <p:cTn xmlns:p14="http://schemas.microsoft.com/office/powerpoint/2010/main" id="1" dur="indefinite" restart="never" nodeType="tmRoot"/>
       </p:par>
     </p:tnLst>
   </p:timing>
@@ -20381,26 +20428,7 @@
                 <a:latin typeface="Lucida Sans Unicode"/>
                 <a:cs typeface="Lucida Sans Unicode"/>
               </a:rPr>
-              <a:t>Copy the content </a:t>
-            </a:r>
-            <a:r>
-              <a:rPr lang="en-US" dirty="0" smtClean="0">
-                <a:solidFill>
-                  <a:schemeClr val="tx2">
-                    <a:lumMod val="50000"/>
-                  </a:schemeClr>
-                </a:solidFill>
-                <a:effectLst>
-                  <a:outerShdw blurRad="50800" dist="38100" dir="2700000" algn="tl" rotWithShape="0">
-                    <a:schemeClr val="bg1">
-                      <a:alpha val="40000"/>
-                    </a:schemeClr>
-                  </a:outerShdw>
-                </a:effectLst>
-                <a:latin typeface="Lucida Sans Unicode"/>
-                <a:cs typeface="Lucida Sans Unicode"/>
-              </a:rPr>
-              <a:t>to your profile on </a:t>
+              <a:t>Copy the content to your profile on </a:t>
             </a:r>
             <a:r>
               <a:rPr lang="en-US" dirty="0" err="1" smtClean="0">
@@ -20493,14 +20521,14 @@
             <a:noFill/>
           </a:ln>
           <a:extLst>
-            <a:ext uri="{909E8E84-426E-40DD-AFC4-6F175D3DCCD1}">
+            <a:ext uri="{909E8E84-426E-40dd-AFC4-6F175D3DCCD1}">
               <a14:hiddenFill xmlns:a14="http://schemas.microsoft.com/office/drawing/2010/main">
                 <a:solidFill>
                   <a:schemeClr val="accent1"/>
                 </a:solidFill>
               </a14:hiddenFill>
             </a:ext>
-            <a:ext uri="{91240B29-F687-4F45-9708-019B960494DF}">
+            <a:ext uri="{91240B29-F687-4f45-9708-019B960494DF}">
               <a14:hiddenLine xmlns:a14="http://schemas.microsoft.com/office/drawing/2010/main" w="9525">
                 <a:solidFill>
                   <a:schemeClr val="tx1"/>
@@ -20526,7 +20554,7 @@
   <p:timing>
     <p:tnLst>
       <p:par>
-        <p:cTn id="1" dur="indefinite" restart="never" nodeType="tmRoot"/>
+        <p:cTn xmlns:p14="http://schemas.microsoft.com/office/powerpoint/2010/main" id="1" dur="indefinite" restart="never" nodeType="tmRoot"/>
       </p:par>
     </p:tnLst>
   </p:timing>

</xml_diff>

<commit_message>
Add workflow slide in the presentation
</commit_message>
<xml_diff>
--- a/presentation/walkingThroughTheWood.pptx
+++ b/presentation/walkingThroughTheWood.pptx
@@ -7,21 +7,22 @@
     <p:sldMasterId id="2147483672" r:id="rId3"/>
     <p:sldMasterId id="2147483684" r:id="rId4"/>
     <p:sldMasterId id="2147483696" r:id="rId5"/>
+    <p:sldMasterId id="2147483708" r:id="rId6"/>
   </p:sldMasterIdLst>
   <p:notesMasterIdLst>
-    <p:notesMasterId r:id="rId16"/>
+    <p:notesMasterId r:id="rId17"/>
   </p:notesMasterIdLst>
   <p:sldIdLst>
-    <p:sldId id="256" r:id="rId6"/>
-    <p:sldId id="257" r:id="rId7"/>
-    <p:sldId id="258" r:id="rId8"/>
-    <p:sldId id="259" r:id="rId9"/>
-    <p:sldId id="260" r:id="rId10"/>
-    <p:sldId id="261" r:id="rId11"/>
-    <p:sldId id="263" r:id="rId12"/>
-    <p:sldId id="262" r:id="rId13"/>
-    <p:sldId id="264" r:id="rId14"/>
-    <p:sldId id="265" r:id="rId15"/>
+    <p:sldId id="256" r:id="rId7"/>
+    <p:sldId id="257" r:id="rId8"/>
+    <p:sldId id="258" r:id="rId9"/>
+    <p:sldId id="259" r:id="rId10"/>
+    <p:sldId id="260" r:id="rId11"/>
+    <p:sldId id="266" r:id="rId12"/>
+    <p:sldId id="261" r:id="rId13"/>
+    <p:sldId id="263" r:id="rId14"/>
+    <p:sldId id="262" r:id="rId15"/>
+    <p:sldId id="264" r:id="rId16"/>
   </p:sldIdLst>
   <p:sldSz cx="9144000" cy="6858000" type="screen4x3"/>
   <p:notesSz cx="6858000" cy="9144000"/>
@@ -1191,10 +1192,11 @@
           <a:lstStyle/>
           <a:p>
             <a:fld id="{76ADA075-0DB7-C04C-B66A-616A5CAE2EFC}" type="slidenum">
-              <a:rPr lang="en-US" smtClean="0">
+              <a:rPr lang="en-US">
                 <a:solidFill>
                   <a:prstClr val="black"/>
                 </a:solidFill>
+                <a:latin typeface="Calibri"/>
               </a:rPr>
               <a:pPr/>
               <a:t>9</a:t>
@@ -1203,6 +1205,7 @@
               <a:solidFill>
                 <a:prstClr val="black"/>
               </a:solidFill>
+              <a:latin typeface="Calibri"/>
             </a:endParaRPr>
           </a:p>
         </p:txBody>
@@ -14448,6 +14451,1100 @@
 </p:sldLayout>
 </file>
 
+<file path=ppt/slideLayouts/slideLayout56.xml><?xml version="1.0" encoding="utf-8"?>
+<p:sldLayout xmlns:a="http://schemas.openxmlformats.org/drawingml/2006/main" xmlns:r="http://schemas.openxmlformats.org/officeDocument/2006/relationships" xmlns:p="http://schemas.openxmlformats.org/presentationml/2006/main" type="title" preserve="1">
+  <p:cSld name="Title Slide">
+    <p:spTree>
+      <p:nvGrpSpPr>
+        <p:cNvPr id="1" name=""/>
+        <p:cNvGrpSpPr/>
+        <p:nvPr/>
+      </p:nvGrpSpPr>
+      <p:grpSpPr>
+        <a:xfrm>
+          <a:off x="0" y="0"/>
+          <a:ext cx="0" cy="0"/>
+          <a:chOff x="0" y="0"/>
+          <a:chExt cx="0" cy="0"/>
+        </a:xfrm>
+      </p:grpSpPr>
+      <p:sp>
+        <p:nvSpPr>
+          <p:cNvPr id="2" name="Title 1"/>
+          <p:cNvSpPr>
+            <a:spLocks noGrp="1"/>
+          </p:cNvSpPr>
+          <p:nvPr>
+            <p:ph type="ctrTitle"/>
+          </p:nvPr>
+        </p:nvSpPr>
+        <p:spPr>
+          <a:xfrm>
+            <a:off x="685800" y="2130425"/>
+            <a:ext cx="7772400" cy="1470025"/>
+          </a:xfrm>
+        </p:spPr>
+        <p:txBody>
+          <a:bodyPr/>
+          <a:lstStyle/>
+          <a:p>
+            <a:r>
+              <a:rPr lang="en-GB" smtClean="0"/>
+              <a:t>Click to edit Master title style</a:t>
+            </a:r>
+            <a:endParaRPr lang="en-US"/>
+          </a:p>
+        </p:txBody>
+      </p:sp>
+      <p:sp>
+        <p:nvSpPr>
+          <p:cNvPr id="3" name="Subtitle 2"/>
+          <p:cNvSpPr>
+            <a:spLocks noGrp="1"/>
+          </p:cNvSpPr>
+          <p:nvPr>
+            <p:ph type="subTitle" idx="1"/>
+          </p:nvPr>
+        </p:nvSpPr>
+        <p:spPr>
+          <a:xfrm>
+            <a:off x="1371600" y="3886200"/>
+            <a:ext cx="6400800" cy="1752600"/>
+          </a:xfrm>
+        </p:spPr>
+        <p:txBody>
+          <a:bodyPr/>
+          <a:lstStyle>
+            <a:lvl1pPr marL="0" indent="0" algn="ctr">
+              <a:buNone/>
+              <a:defRPr>
+                <a:solidFill>
+                  <a:schemeClr val="tx1">
+                    <a:tint val="75000"/>
+                  </a:schemeClr>
+                </a:solidFill>
+              </a:defRPr>
+            </a:lvl1pPr>
+            <a:lvl2pPr marL="457200" indent="0" algn="ctr">
+              <a:buNone/>
+              <a:defRPr>
+                <a:solidFill>
+                  <a:schemeClr val="tx1">
+                    <a:tint val="75000"/>
+                  </a:schemeClr>
+                </a:solidFill>
+              </a:defRPr>
+            </a:lvl2pPr>
+            <a:lvl3pPr marL="914400" indent="0" algn="ctr">
+              <a:buNone/>
+              <a:defRPr>
+                <a:solidFill>
+                  <a:schemeClr val="tx1">
+                    <a:tint val="75000"/>
+                  </a:schemeClr>
+                </a:solidFill>
+              </a:defRPr>
+            </a:lvl3pPr>
+            <a:lvl4pPr marL="1371600" indent="0" algn="ctr">
+              <a:buNone/>
+              <a:defRPr>
+                <a:solidFill>
+                  <a:schemeClr val="tx1">
+                    <a:tint val="75000"/>
+                  </a:schemeClr>
+                </a:solidFill>
+              </a:defRPr>
+            </a:lvl4pPr>
+            <a:lvl5pPr marL="1828800" indent="0" algn="ctr">
+              <a:buNone/>
+              <a:defRPr>
+                <a:solidFill>
+                  <a:schemeClr val="tx1">
+                    <a:tint val="75000"/>
+                  </a:schemeClr>
+                </a:solidFill>
+              </a:defRPr>
+            </a:lvl5pPr>
+            <a:lvl6pPr marL="2286000" indent="0" algn="ctr">
+              <a:buNone/>
+              <a:defRPr>
+                <a:solidFill>
+                  <a:schemeClr val="tx1">
+                    <a:tint val="75000"/>
+                  </a:schemeClr>
+                </a:solidFill>
+              </a:defRPr>
+            </a:lvl6pPr>
+            <a:lvl7pPr marL="2743200" indent="0" algn="ctr">
+              <a:buNone/>
+              <a:defRPr>
+                <a:solidFill>
+                  <a:schemeClr val="tx1">
+                    <a:tint val="75000"/>
+                  </a:schemeClr>
+                </a:solidFill>
+              </a:defRPr>
+            </a:lvl7pPr>
+            <a:lvl8pPr marL="3200400" indent="0" algn="ctr">
+              <a:buNone/>
+              <a:defRPr>
+                <a:solidFill>
+                  <a:schemeClr val="tx1">
+                    <a:tint val="75000"/>
+                  </a:schemeClr>
+                </a:solidFill>
+              </a:defRPr>
+            </a:lvl8pPr>
+            <a:lvl9pPr marL="3657600" indent="0" algn="ctr">
+              <a:buNone/>
+              <a:defRPr>
+                <a:solidFill>
+                  <a:schemeClr val="tx1">
+                    <a:tint val="75000"/>
+                  </a:schemeClr>
+                </a:solidFill>
+              </a:defRPr>
+            </a:lvl9pPr>
+          </a:lstStyle>
+          <a:p>
+            <a:r>
+              <a:rPr lang="en-GB" smtClean="0"/>
+              <a:t>Click to edit Master subtitle style</a:t>
+            </a:r>
+            <a:endParaRPr lang="en-US"/>
+          </a:p>
+        </p:txBody>
+      </p:sp>
+      <p:sp>
+        <p:nvSpPr>
+          <p:cNvPr id="4" name="Date Placeholder 3"/>
+          <p:cNvSpPr>
+            <a:spLocks noGrp="1"/>
+          </p:cNvSpPr>
+          <p:nvPr>
+            <p:ph type="dt" sz="half" idx="10"/>
+          </p:nvPr>
+        </p:nvSpPr>
+        <p:spPr/>
+        <p:txBody>
+          <a:bodyPr/>
+          <a:lstStyle/>
+          <a:p>
+            <a:fld id="{99C3E6F9-20FC-254C-9885-321F390E26D9}" type="datetimeFigureOut">
+              <a:rPr lang="en-US" smtClean="0">
+                <a:solidFill>
+                  <a:prstClr val="black">
+                    <a:tint val="75000"/>
+                  </a:prstClr>
+                </a:solidFill>
+                <a:latin typeface="Calibri"/>
+              </a:rPr>
+              <a:pPr/>
+              <a:t>21/03/13</a:t>
+            </a:fld>
+            <a:endParaRPr lang="en-US">
+              <a:solidFill>
+                <a:prstClr val="black">
+                  <a:tint val="75000"/>
+                </a:prstClr>
+              </a:solidFill>
+              <a:latin typeface="Calibri"/>
+            </a:endParaRPr>
+          </a:p>
+        </p:txBody>
+      </p:sp>
+      <p:sp>
+        <p:nvSpPr>
+          <p:cNvPr id="5" name="Footer Placeholder 4"/>
+          <p:cNvSpPr>
+            <a:spLocks noGrp="1"/>
+          </p:cNvSpPr>
+          <p:nvPr>
+            <p:ph type="ftr" sz="quarter" idx="11"/>
+          </p:nvPr>
+        </p:nvSpPr>
+        <p:spPr/>
+        <p:txBody>
+          <a:bodyPr/>
+          <a:lstStyle/>
+          <a:p>
+            <a:endParaRPr lang="en-US">
+              <a:solidFill>
+                <a:prstClr val="black">
+                  <a:tint val="75000"/>
+                </a:prstClr>
+              </a:solidFill>
+              <a:latin typeface="Calibri"/>
+            </a:endParaRPr>
+          </a:p>
+        </p:txBody>
+      </p:sp>
+      <p:sp>
+        <p:nvSpPr>
+          <p:cNvPr id="6" name="Slide Number Placeholder 5"/>
+          <p:cNvSpPr>
+            <a:spLocks noGrp="1"/>
+          </p:cNvSpPr>
+          <p:nvPr>
+            <p:ph type="sldNum" sz="quarter" idx="12"/>
+          </p:nvPr>
+        </p:nvSpPr>
+        <p:spPr/>
+        <p:txBody>
+          <a:bodyPr/>
+          <a:lstStyle/>
+          <a:p>
+            <a:fld id="{3B8E83EB-7D5A-4947-8E9F-CDD9CFCA5BC8}" type="slidenum">
+              <a:rPr lang="en-US" smtClean="0">
+                <a:solidFill>
+                  <a:prstClr val="black">
+                    <a:tint val="75000"/>
+                  </a:prstClr>
+                </a:solidFill>
+                <a:latin typeface="Calibri"/>
+              </a:rPr>
+              <a:pPr/>
+              <a:t>‹#›</a:t>
+            </a:fld>
+            <a:endParaRPr lang="en-US">
+              <a:solidFill>
+                <a:prstClr val="black">
+                  <a:tint val="75000"/>
+                </a:prstClr>
+              </a:solidFill>
+              <a:latin typeface="Calibri"/>
+            </a:endParaRPr>
+          </a:p>
+        </p:txBody>
+      </p:sp>
+    </p:spTree>
+    <p:extLst>
+      <p:ext uri="{BB962C8B-B14F-4D97-AF65-F5344CB8AC3E}">
+        <p14:creationId xmlns:p14="http://schemas.microsoft.com/office/powerpoint/2010/main" val="1966470858"/>
+      </p:ext>
+    </p:extLst>
+  </p:cSld>
+  <p:clrMapOvr>
+    <a:masterClrMapping/>
+  </p:clrMapOvr>
+</p:sldLayout>
+</file>
+
+<file path=ppt/slideLayouts/slideLayout57.xml><?xml version="1.0" encoding="utf-8"?>
+<p:sldLayout xmlns:a="http://schemas.openxmlformats.org/drawingml/2006/main" xmlns:r="http://schemas.openxmlformats.org/officeDocument/2006/relationships" xmlns:p="http://schemas.openxmlformats.org/presentationml/2006/main" type="obj" preserve="1">
+  <p:cSld name="Title and Content">
+    <p:spTree>
+      <p:nvGrpSpPr>
+        <p:cNvPr id="1" name=""/>
+        <p:cNvGrpSpPr/>
+        <p:nvPr/>
+      </p:nvGrpSpPr>
+      <p:grpSpPr>
+        <a:xfrm>
+          <a:off x="0" y="0"/>
+          <a:ext cx="0" cy="0"/>
+          <a:chOff x="0" y="0"/>
+          <a:chExt cx="0" cy="0"/>
+        </a:xfrm>
+      </p:grpSpPr>
+      <p:sp>
+        <p:nvSpPr>
+          <p:cNvPr id="2" name="Title 1"/>
+          <p:cNvSpPr>
+            <a:spLocks noGrp="1"/>
+          </p:cNvSpPr>
+          <p:nvPr>
+            <p:ph type="title"/>
+          </p:nvPr>
+        </p:nvSpPr>
+        <p:spPr/>
+        <p:txBody>
+          <a:bodyPr/>
+          <a:lstStyle/>
+          <a:p>
+            <a:r>
+              <a:rPr lang="en-GB" smtClean="0"/>
+              <a:t>Click to edit Master title style</a:t>
+            </a:r>
+            <a:endParaRPr lang="en-US"/>
+          </a:p>
+        </p:txBody>
+      </p:sp>
+      <p:sp>
+        <p:nvSpPr>
+          <p:cNvPr id="3" name="Content Placeholder 2"/>
+          <p:cNvSpPr>
+            <a:spLocks noGrp="1"/>
+          </p:cNvSpPr>
+          <p:nvPr>
+            <p:ph idx="1"/>
+          </p:nvPr>
+        </p:nvSpPr>
+        <p:spPr/>
+        <p:txBody>
+          <a:bodyPr/>
+          <a:lstStyle/>
+          <a:p>
+            <a:pPr lvl="0"/>
+            <a:r>
+              <a:rPr lang="en-GB" smtClean="0"/>
+              <a:t>Click to edit Master text styles</a:t>
+            </a:r>
+          </a:p>
+          <a:p>
+            <a:pPr lvl="1"/>
+            <a:r>
+              <a:rPr lang="en-GB" smtClean="0"/>
+              <a:t>Second level</a:t>
+            </a:r>
+          </a:p>
+          <a:p>
+            <a:pPr lvl="2"/>
+            <a:r>
+              <a:rPr lang="en-GB" smtClean="0"/>
+              <a:t>Third level</a:t>
+            </a:r>
+          </a:p>
+          <a:p>
+            <a:pPr lvl="3"/>
+            <a:r>
+              <a:rPr lang="en-GB" smtClean="0"/>
+              <a:t>Fourth level</a:t>
+            </a:r>
+          </a:p>
+          <a:p>
+            <a:pPr lvl="4"/>
+            <a:r>
+              <a:rPr lang="en-GB" smtClean="0"/>
+              <a:t>Fifth level</a:t>
+            </a:r>
+            <a:endParaRPr lang="en-US"/>
+          </a:p>
+        </p:txBody>
+      </p:sp>
+      <p:sp>
+        <p:nvSpPr>
+          <p:cNvPr id="4" name="Date Placeholder 3"/>
+          <p:cNvSpPr>
+            <a:spLocks noGrp="1"/>
+          </p:cNvSpPr>
+          <p:nvPr>
+            <p:ph type="dt" sz="half" idx="10"/>
+          </p:nvPr>
+        </p:nvSpPr>
+        <p:spPr/>
+        <p:txBody>
+          <a:bodyPr/>
+          <a:lstStyle/>
+          <a:p>
+            <a:fld id="{99C3E6F9-20FC-254C-9885-321F390E26D9}" type="datetimeFigureOut">
+              <a:rPr lang="en-US" smtClean="0">
+                <a:solidFill>
+                  <a:prstClr val="black">
+                    <a:tint val="75000"/>
+                  </a:prstClr>
+                </a:solidFill>
+                <a:latin typeface="Calibri"/>
+              </a:rPr>
+              <a:pPr/>
+              <a:t>21/03/13</a:t>
+            </a:fld>
+            <a:endParaRPr lang="en-US">
+              <a:solidFill>
+                <a:prstClr val="black">
+                  <a:tint val="75000"/>
+                </a:prstClr>
+              </a:solidFill>
+              <a:latin typeface="Calibri"/>
+            </a:endParaRPr>
+          </a:p>
+        </p:txBody>
+      </p:sp>
+      <p:sp>
+        <p:nvSpPr>
+          <p:cNvPr id="5" name="Footer Placeholder 4"/>
+          <p:cNvSpPr>
+            <a:spLocks noGrp="1"/>
+          </p:cNvSpPr>
+          <p:nvPr>
+            <p:ph type="ftr" sz="quarter" idx="11"/>
+          </p:nvPr>
+        </p:nvSpPr>
+        <p:spPr/>
+        <p:txBody>
+          <a:bodyPr/>
+          <a:lstStyle/>
+          <a:p>
+            <a:endParaRPr lang="en-US">
+              <a:solidFill>
+                <a:prstClr val="black">
+                  <a:tint val="75000"/>
+                </a:prstClr>
+              </a:solidFill>
+              <a:latin typeface="Calibri"/>
+            </a:endParaRPr>
+          </a:p>
+        </p:txBody>
+      </p:sp>
+      <p:sp>
+        <p:nvSpPr>
+          <p:cNvPr id="6" name="Slide Number Placeholder 5"/>
+          <p:cNvSpPr>
+            <a:spLocks noGrp="1"/>
+          </p:cNvSpPr>
+          <p:nvPr>
+            <p:ph type="sldNum" sz="quarter" idx="12"/>
+          </p:nvPr>
+        </p:nvSpPr>
+        <p:spPr/>
+        <p:txBody>
+          <a:bodyPr/>
+          <a:lstStyle/>
+          <a:p>
+            <a:fld id="{3B8E83EB-7D5A-4947-8E9F-CDD9CFCA5BC8}" type="slidenum">
+              <a:rPr lang="en-US" smtClean="0">
+                <a:solidFill>
+                  <a:prstClr val="black">
+                    <a:tint val="75000"/>
+                  </a:prstClr>
+                </a:solidFill>
+                <a:latin typeface="Calibri"/>
+              </a:rPr>
+              <a:pPr/>
+              <a:t>‹#›</a:t>
+            </a:fld>
+            <a:endParaRPr lang="en-US">
+              <a:solidFill>
+                <a:prstClr val="black">
+                  <a:tint val="75000"/>
+                </a:prstClr>
+              </a:solidFill>
+              <a:latin typeface="Calibri"/>
+            </a:endParaRPr>
+          </a:p>
+        </p:txBody>
+      </p:sp>
+    </p:spTree>
+    <p:extLst>
+      <p:ext uri="{BB962C8B-B14F-4D97-AF65-F5344CB8AC3E}">
+        <p14:creationId xmlns:p14="http://schemas.microsoft.com/office/powerpoint/2010/main" val="1558844692"/>
+      </p:ext>
+    </p:extLst>
+  </p:cSld>
+  <p:clrMapOvr>
+    <a:masterClrMapping/>
+  </p:clrMapOvr>
+</p:sldLayout>
+</file>
+
+<file path=ppt/slideLayouts/slideLayout58.xml><?xml version="1.0" encoding="utf-8"?>
+<p:sldLayout xmlns:a="http://schemas.openxmlformats.org/drawingml/2006/main" xmlns:r="http://schemas.openxmlformats.org/officeDocument/2006/relationships" xmlns:p="http://schemas.openxmlformats.org/presentationml/2006/main" type="secHead" preserve="1">
+  <p:cSld name="Section Header">
+    <p:spTree>
+      <p:nvGrpSpPr>
+        <p:cNvPr id="1" name=""/>
+        <p:cNvGrpSpPr/>
+        <p:nvPr/>
+      </p:nvGrpSpPr>
+      <p:grpSpPr>
+        <a:xfrm>
+          <a:off x="0" y="0"/>
+          <a:ext cx="0" cy="0"/>
+          <a:chOff x="0" y="0"/>
+          <a:chExt cx="0" cy="0"/>
+        </a:xfrm>
+      </p:grpSpPr>
+      <p:sp>
+        <p:nvSpPr>
+          <p:cNvPr id="2" name="Title 1"/>
+          <p:cNvSpPr>
+            <a:spLocks noGrp="1"/>
+          </p:cNvSpPr>
+          <p:nvPr>
+            <p:ph type="title"/>
+          </p:nvPr>
+        </p:nvSpPr>
+        <p:spPr>
+          <a:xfrm>
+            <a:off x="722313" y="4406900"/>
+            <a:ext cx="7772400" cy="1362075"/>
+          </a:xfrm>
+        </p:spPr>
+        <p:txBody>
+          <a:bodyPr anchor="t"/>
+          <a:lstStyle>
+            <a:lvl1pPr algn="l">
+              <a:defRPr sz="4000" b="1" cap="all"/>
+            </a:lvl1pPr>
+          </a:lstStyle>
+          <a:p>
+            <a:r>
+              <a:rPr lang="en-GB" smtClean="0"/>
+              <a:t>Click to edit Master title style</a:t>
+            </a:r>
+            <a:endParaRPr lang="en-US"/>
+          </a:p>
+        </p:txBody>
+      </p:sp>
+      <p:sp>
+        <p:nvSpPr>
+          <p:cNvPr id="3" name="Text Placeholder 2"/>
+          <p:cNvSpPr>
+            <a:spLocks noGrp="1"/>
+          </p:cNvSpPr>
+          <p:nvPr>
+            <p:ph type="body" idx="1"/>
+          </p:nvPr>
+        </p:nvSpPr>
+        <p:spPr>
+          <a:xfrm>
+            <a:off x="722313" y="2906713"/>
+            <a:ext cx="7772400" cy="1500187"/>
+          </a:xfrm>
+        </p:spPr>
+        <p:txBody>
+          <a:bodyPr anchor="b"/>
+          <a:lstStyle>
+            <a:lvl1pPr marL="0" indent="0">
+              <a:buNone/>
+              <a:defRPr sz="2000">
+                <a:solidFill>
+                  <a:schemeClr val="tx1">
+                    <a:tint val="75000"/>
+                  </a:schemeClr>
+                </a:solidFill>
+              </a:defRPr>
+            </a:lvl1pPr>
+            <a:lvl2pPr marL="457200" indent="0">
+              <a:buNone/>
+              <a:defRPr sz="1800">
+                <a:solidFill>
+                  <a:schemeClr val="tx1">
+                    <a:tint val="75000"/>
+                  </a:schemeClr>
+                </a:solidFill>
+              </a:defRPr>
+            </a:lvl2pPr>
+            <a:lvl3pPr marL="914400" indent="0">
+              <a:buNone/>
+              <a:defRPr sz="1600">
+                <a:solidFill>
+                  <a:schemeClr val="tx1">
+                    <a:tint val="75000"/>
+                  </a:schemeClr>
+                </a:solidFill>
+              </a:defRPr>
+            </a:lvl3pPr>
+            <a:lvl4pPr marL="1371600" indent="0">
+              <a:buNone/>
+              <a:defRPr sz="1400">
+                <a:solidFill>
+                  <a:schemeClr val="tx1">
+                    <a:tint val="75000"/>
+                  </a:schemeClr>
+                </a:solidFill>
+              </a:defRPr>
+            </a:lvl4pPr>
+            <a:lvl5pPr marL="1828800" indent="0">
+              <a:buNone/>
+              <a:defRPr sz="1400">
+                <a:solidFill>
+                  <a:schemeClr val="tx1">
+                    <a:tint val="75000"/>
+                  </a:schemeClr>
+                </a:solidFill>
+              </a:defRPr>
+            </a:lvl5pPr>
+            <a:lvl6pPr marL="2286000" indent="0">
+              <a:buNone/>
+              <a:defRPr sz="1400">
+                <a:solidFill>
+                  <a:schemeClr val="tx1">
+                    <a:tint val="75000"/>
+                  </a:schemeClr>
+                </a:solidFill>
+              </a:defRPr>
+            </a:lvl6pPr>
+            <a:lvl7pPr marL="2743200" indent="0">
+              <a:buNone/>
+              <a:defRPr sz="1400">
+                <a:solidFill>
+                  <a:schemeClr val="tx1">
+                    <a:tint val="75000"/>
+                  </a:schemeClr>
+                </a:solidFill>
+              </a:defRPr>
+            </a:lvl7pPr>
+            <a:lvl8pPr marL="3200400" indent="0">
+              <a:buNone/>
+              <a:defRPr sz="1400">
+                <a:solidFill>
+                  <a:schemeClr val="tx1">
+                    <a:tint val="75000"/>
+                  </a:schemeClr>
+                </a:solidFill>
+              </a:defRPr>
+            </a:lvl8pPr>
+            <a:lvl9pPr marL="3657600" indent="0">
+              <a:buNone/>
+              <a:defRPr sz="1400">
+                <a:solidFill>
+                  <a:schemeClr val="tx1">
+                    <a:tint val="75000"/>
+                  </a:schemeClr>
+                </a:solidFill>
+              </a:defRPr>
+            </a:lvl9pPr>
+          </a:lstStyle>
+          <a:p>
+            <a:pPr lvl="0"/>
+            <a:r>
+              <a:rPr lang="en-GB" smtClean="0"/>
+              <a:t>Click to edit Master text styles</a:t>
+            </a:r>
+          </a:p>
+        </p:txBody>
+      </p:sp>
+      <p:sp>
+        <p:nvSpPr>
+          <p:cNvPr id="4" name="Date Placeholder 3"/>
+          <p:cNvSpPr>
+            <a:spLocks noGrp="1"/>
+          </p:cNvSpPr>
+          <p:nvPr>
+            <p:ph type="dt" sz="half" idx="10"/>
+          </p:nvPr>
+        </p:nvSpPr>
+        <p:spPr/>
+        <p:txBody>
+          <a:bodyPr/>
+          <a:lstStyle/>
+          <a:p>
+            <a:fld id="{99C3E6F9-20FC-254C-9885-321F390E26D9}" type="datetimeFigureOut">
+              <a:rPr lang="en-US" smtClean="0">
+                <a:solidFill>
+                  <a:prstClr val="black">
+                    <a:tint val="75000"/>
+                  </a:prstClr>
+                </a:solidFill>
+                <a:latin typeface="Calibri"/>
+              </a:rPr>
+              <a:pPr/>
+              <a:t>21/03/13</a:t>
+            </a:fld>
+            <a:endParaRPr lang="en-US">
+              <a:solidFill>
+                <a:prstClr val="black">
+                  <a:tint val="75000"/>
+                </a:prstClr>
+              </a:solidFill>
+              <a:latin typeface="Calibri"/>
+            </a:endParaRPr>
+          </a:p>
+        </p:txBody>
+      </p:sp>
+      <p:sp>
+        <p:nvSpPr>
+          <p:cNvPr id="5" name="Footer Placeholder 4"/>
+          <p:cNvSpPr>
+            <a:spLocks noGrp="1"/>
+          </p:cNvSpPr>
+          <p:nvPr>
+            <p:ph type="ftr" sz="quarter" idx="11"/>
+          </p:nvPr>
+        </p:nvSpPr>
+        <p:spPr/>
+        <p:txBody>
+          <a:bodyPr/>
+          <a:lstStyle/>
+          <a:p>
+            <a:endParaRPr lang="en-US">
+              <a:solidFill>
+                <a:prstClr val="black">
+                  <a:tint val="75000"/>
+                </a:prstClr>
+              </a:solidFill>
+              <a:latin typeface="Calibri"/>
+            </a:endParaRPr>
+          </a:p>
+        </p:txBody>
+      </p:sp>
+      <p:sp>
+        <p:nvSpPr>
+          <p:cNvPr id="6" name="Slide Number Placeholder 5"/>
+          <p:cNvSpPr>
+            <a:spLocks noGrp="1"/>
+          </p:cNvSpPr>
+          <p:nvPr>
+            <p:ph type="sldNum" sz="quarter" idx="12"/>
+          </p:nvPr>
+        </p:nvSpPr>
+        <p:spPr/>
+        <p:txBody>
+          <a:bodyPr/>
+          <a:lstStyle/>
+          <a:p>
+            <a:fld id="{3B8E83EB-7D5A-4947-8E9F-CDD9CFCA5BC8}" type="slidenum">
+              <a:rPr lang="en-US" smtClean="0">
+                <a:solidFill>
+                  <a:prstClr val="black">
+                    <a:tint val="75000"/>
+                  </a:prstClr>
+                </a:solidFill>
+                <a:latin typeface="Calibri"/>
+              </a:rPr>
+              <a:pPr/>
+              <a:t>‹#›</a:t>
+            </a:fld>
+            <a:endParaRPr lang="en-US">
+              <a:solidFill>
+                <a:prstClr val="black">
+                  <a:tint val="75000"/>
+                </a:prstClr>
+              </a:solidFill>
+              <a:latin typeface="Calibri"/>
+            </a:endParaRPr>
+          </a:p>
+        </p:txBody>
+      </p:sp>
+    </p:spTree>
+    <p:extLst>
+      <p:ext uri="{BB962C8B-B14F-4D97-AF65-F5344CB8AC3E}">
+        <p14:creationId xmlns:p14="http://schemas.microsoft.com/office/powerpoint/2010/main" val="4125221855"/>
+      </p:ext>
+    </p:extLst>
+  </p:cSld>
+  <p:clrMapOvr>
+    <a:masterClrMapping/>
+  </p:clrMapOvr>
+</p:sldLayout>
+</file>
+
+<file path=ppt/slideLayouts/slideLayout59.xml><?xml version="1.0" encoding="utf-8"?>
+<p:sldLayout xmlns:a="http://schemas.openxmlformats.org/drawingml/2006/main" xmlns:r="http://schemas.openxmlformats.org/officeDocument/2006/relationships" xmlns:p="http://schemas.openxmlformats.org/presentationml/2006/main" type="twoObj" preserve="1">
+  <p:cSld name="Two Content">
+    <p:spTree>
+      <p:nvGrpSpPr>
+        <p:cNvPr id="1" name=""/>
+        <p:cNvGrpSpPr/>
+        <p:nvPr/>
+      </p:nvGrpSpPr>
+      <p:grpSpPr>
+        <a:xfrm>
+          <a:off x="0" y="0"/>
+          <a:ext cx="0" cy="0"/>
+          <a:chOff x="0" y="0"/>
+          <a:chExt cx="0" cy="0"/>
+        </a:xfrm>
+      </p:grpSpPr>
+      <p:sp>
+        <p:nvSpPr>
+          <p:cNvPr id="2" name="Title 1"/>
+          <p:cNvSpPr>
+            <a:spLocks noGrp="1"/>
+          </p:cNvSpPr>
+          <p:nvPr>
+            <p:ph type="title"/>
+          </p:nvPr>
+        </p:nvSpPr>
+        <p:spPr/>
+        <p:txBody>
+          <a:bodyPr/>
+          <a:lstStyle/>
+          <a:p>
+            <a:r>
+              <a:rPr lang="en-GB" smtClean="0"/>
+              <a:t>Click to edit Master title style</a:t>
+            </a:r>
+            <a:endParaRPr lang="en-US"/>
+          </a:p>
+        </p:txBody>
+      </p:sp>
+      <p:sp>
+        <p:nvSpPr>
+          <p:cNvPr id="3" name="Content Placeholder 2"/>
+          <p:cNvSpPr>
+            <a:spLocks noGrp="1"/>
+          </p:cNvSpPr>
+          <p:nvPr>
+            <p:ph sz="half" idx="1"/>
+          </p:nvPr>
+        </p:nvSpPr>
+        <p:spPr>
+          <a:xfrm>
+            <a:off x="457200" y="1600200"/>
+            <a:ext cx="4038600" cy="4525963"/>
+          </a:xfrm>
+        </p:spPr>
+        <p:txBody>
+          <a:bodyPr/>
+          <a:lstStyle>
+            <a:lvl1pPr>
+              <a:defRPr sz="2800"/>
+            </a:lvl1pPr>
+            <a:lvl2pPr>
+              <a:defRPr sz="2400"/>
+            </a:lvl2pPr>
+            <a:lvl3pPr>
+              <a:defRPr sz="2000"/>
+            </a:lvl3pPr>
+            <a:lvl4pPr>
+              <a:defRPr sz="1800"/>
+            </a:lvl4pPr>
+            <a:lvl5pPr>
+              <a:defRPr sz="1800"/>
+            </a:lvl5pPr>
+            <a:lvl6pPr>
+              <a:defRPr sz="1800"/>
+            </a:lvl6pPr>
+            <a:lvl7pPr>
+              <a:defRPr sz="1800"/>
+            </a:lvl7pPr>
+            <a:lvl8pPr>
+              <a:defRPr sz="1800"/>
+            </a:lvl8pPr>
+            <a:lvl9pPr>
+              <a:defRPr sz="1800"/>
+            </a:lvl9pPr>
+          </a:lstStyle>
+          <a:p>
+            <a:pPr lvl="0"/>
+            <a:r>
+              <a:rPr lang="en-GB" smtClean="0"/>
+              <a:t>Click to edit Master text styles</a:t>
+            </a:r>
+          </a:p>
+          <a:p>
+            <a:pPr lvl="1"/>
+            <a:r>
+              <a:rPr lang="en-GB" smtClean="0"/>
+              <a:t>Second level</a:t>
+            </a:r>
+          </a:p>
+          <a:p>
+            <a:pPr lvl="2"/>
+            <a:r>
+              <a:rPr lang="en-GB" smtClean="0"/>
+              <a:t>Third level</a:t>
+            </a:r>
+          </a:p>
+          <a:p>
+            <a:pPr lvl="3"/>
+            <a:r>
+              <a:rPr lang="en-GB" smtClean="0"/>
+              <a:t>Fourth level</a:t>
+            </a:r>
+          </a:p>
+          <a:p>
+            <a:pPr lvl="4"/>
+            <a:r>
+              <a:rPr lang="en-GB" smtClean="0"/>
+              <a:t>Fifth level</a:t>
+            </a:r>
+            <a:endParaRPr lang="en-US"/>
+          </a:p>
+        </p:txBody>
+      </p:sp>
+      <p:sp>
+        <p:nvSpPr>
+          <p:cNvPr id="4" name="Content Placeholder 3"/>
+          <p:cNvSpPr>
+            <a:spLocks noGrp="1"/>
+          </p:cNvSpPr>
+          <p:nvPr>
+            <p:ph sz="half" idx="2"/>
+          </p:nvPr>
+        </p:nvSpPr>
+        <p:spPr>
+          <a:xfrm>
+            <a:off x="4648200" y="1600200"/>
+            <a:ext cx="4038600" cy="4525963"/>
+          </a:xfrm>
+        </p:spPr>
+        <p:txBody>
+          <a:bodyPr/>
+          <a:lstStyle>
+            <a:lvl1pPr>
+              <a:defRPr sz="2800"/>
+            </a:lvl1pPr>
+            <a:lvl2pPr>
+              <a:defRPr sz="2400"/>
+            </a:lvl2pPr>
+            <a:lvl3pPr>
+              <a:defRPr sz="2000"/>
+            </a:lvl3pPr>
+            <a:lvl4pPr>
+              <a:defRPr sz="1800"/>
+            </a:lvl4pPr>
+            <a:lvl5pPr>
+              <a:defRPr sz="1800"/>
+            </a:lvl5pPr>
+            <a:lvl6pPr>
+              <a:defRPr sz="1800"/>
+            </a:lvl6pPr>
+            <a:lvl7pPr>
+              <a:defRPr sz="1800"/>
+            </a:lvl7pPr>
+            <a:lvl8pPr>
+              <a:defRPr sz="1800"/>
+            </a:lvl8pPr>
+            <a:lvl9pPr>
+              <a:defRPr sz="1800"/>
+            </a:lvl9pPr>
+          </a:lstStyle>
+          <a:p>
+            <a:pPr lvl="0"/>
+            <a:r>
+              <a:rPr lang="en-GB" smtClean="0"/>
+              <a:t>Click to edit Master text styles</a:t>
+            </a:r>
+          </a:p>
+          <a:p>
+            <a:pPr lvl="1"/>
+            <a:r>
+              <a:rPr lang="en-GB" smtClean="0"/>
+              <a:t>Second level</a:t>
+            </a:r>
+          </a:p>
+          <a:p>
+            <a:pPr lvl="2"/>
+            <a:r>
+              <a:rPr lang="en-GB" smtClean="0"/>
+              <a:t>Third level</a:t>
+            </a:r>
+          </a:p>
+          <a:p>
+            <a:pPr lvl="3"/>
+            <a:r>
+              <a:rPr lang="en-GB" smtClean="0"/>
+              <a:t>Fourth level</a:t>
+            </a:r>
+          </a:p>
+          <a:p>
+            <a:pPr lvl="4"/>
+            <a:r>
+              <a:rPr lang="en-GB" smtClean="0"/>
+              <a:t>Fifth level</a:t>
+            </a:r>
+            <a:endParaRPr lang="en-US"/>
+          </a:p>
+        </p:txBody>
+      </p:sp>
+      <p:sp>
+        <p:nvSpPr>
+          <p:cNvPr id="5" name="Date Placeholder 4"/>
+          <p:cNvSpPr>
+            <a:spLocks noGrp="1"/>
+          </p:cNvSpPr>
+          <p:nvPr>
+            <p:ph type="dt" sz="half" idx="10"/>
+          </p:nvPr>
+        </p:nvSpPr>
+        <p:spPr/>
+        <p:txBody>
+          <a:bodyPr/>
+          <a:lstStyle/>
+          <a:p>
+            <a:fld id="{99C3E6F9-20FC-254C-9885-321F390E26D9}" type="datetimeFigureOut">
+              <a:rPr lang="en-US" smtClean="0">
+                <a:solidFill>
+                  <a:prstClr val="black">
+                    <a:tint val="75000"/>
+                  </a:prstClr>
+                </a:solidFill>
+                <a:latin typeface="Calibri"/>
+              </a:rPr>
+              <a:pPr/>
+              <a:t>21/03/13</a:t>
+            </a:fld>
+            <a:endParaRPr lang="en-US">
+              <a:solidFill>
+                <a:prstClr val="black">
+                  <a:tint val="75000"/>
+                </a:prstClr>
+              </a:solidFill>
+              <a:latin typeface="Calibri"/>
+            </a:endParaRPr>
+          </a:p>
+        </p:txBody>
+      </p:sp>
+      <p:sp>
+        <p:nvSpPr>
+          <p:cNvPr id="6" name="Footer Placeholder 5"/>
+          <p:cNvSpPr>
+            <a:spLocks noGrp="1"/>
+          </p:cNvSpPr>
+          <p:nvPr>
+            <p:ph type="ftr" sz="quarter" idx="11"/>
+          </p:nvPr>
+        </p:nvSpPr>
+        <p:spPr/>
+        <p:txBody>
+          <a:bodyPr/>
+          <a:lstStyle/>
+          <a:p>
+            <a:endParaRPr lang="en-US">
+              <a:solidFill>
+                <a:prstClr val="black">
+                  <a:tint val="75000"/>
+                </a:prstClr>
+              </a:solidFill>
+              <a:latin typeface="Calibri"/>
+            </a:endParaRPr>
+          </a:p>
+        </p:txBody>
+      </p:sp>
+      <p:sp>
+        <p:nvSpPr>
+          <p:cNvPr id="7" name="Slide Number Placeholder 6"/>
+          <p:cNvSpPr>
+            <a:spLocks noGrp="1"/>
+          </p:cNvSpPr>
+          <p:nvPr>
+            <p:ph type="sldNum" sz="quarter" idx="12"/>
+          </p:nvPr>
+        </p:nvSpPr>
+        <p:spPr/>
+        <p:txBody>
+          <a:bodyPr/>
+          <a:lstStyle/>
+          <a:p>
+            <a:fld id="{3B8E83EB-7D5A-4947-8E9F-CDD9CFCA5BC8}" type="slidenum">
+              <a:rPr lang="en-US" smtClean="0">
+                <a:solidFill>
+                  <a:prstClr val="black">
+                    <a:tint val="75000"/>
+                  </a:prstClr>
+                </a:solidFill>
+                <a:latin typeface="Calibri"/>
+              </a:rPr>
+              <a:pPr/>
+              <a:t>‹#›</a:t>
+            </a:fld>
+            <a:endParaRPr lang="en-US">
+              <a:solidFill>
+                <a:prstClr val="black">
+                  <a:tint val="75000"/>
+                </a:prstClr>
+              </a:solidFill>
+              <a:latin typeface="Calibri"/>
+            </a:endParaRPr>
+          </a:p>
+        </p:txBody>
+      </p:sp>
+    </p:spTree>
+    <p:extLst>
+      <p:ext uri="{BB962C8B-B14F-4D97-AF65-F5344CB8AC3E}">
+        <p14:creationId xmlns:p14="http://schemas.microsoft.com/office/powerpoint/2010/main" val="3606984310"/>
+      </p:ext>
+    </p:extLst>
+  </p:cSld>
+  <p:clrMapOvr>
+    <a:masterClrMapping/>
+  </p:clrMapOvr>
+</p:sldLayout>
+</file>
+
 <file path=ppt/slideLayouts/slideLayout6.xml><?xml version="1.0" encoding="utf-8"?>
 <p:sldLayout xmlns:a="http://schemas.openxmlformats.org/drawingml/2006/main" xmlns:r="http://schemas.openxmlformats.org/officeDocument/2006/relationships" xmlns:p="http://schemas.openxmlformats.org/presentationml/2006/main" type="titleOnly" preserve="1">
   <p:cSld name="Title Only">
@@ -14557,6 +15654,1780 @@
     <p:extLst>
       <p:ext uri="{BB962C8B-B14F-4D97-AF65-F5344CB8AC3E}">
         <p14:creationId xmlns:p14="http://schemas.microsoft.com/office/powerpoint/2010/main" val="2775411413"/>
+      </p:ext>
+    </p:extLst>
+  </p:cSld>
+  <p:clrMapOvr>
+    <a:masterClrMapping/>
+  </p:clrMapOvr>
+</p:sldLayout>
+</file>
+
+<file path=ppt/slideLayouts/slideLayout60.xml><?xml version="1.0" encoding="utf-8"?>
+<p:sldLayout xmlns:a="http://schemas.openxmlformats.org/drawingml/2006/main" xmlns:r="http://schemas.openxmlformats.org/officeDocument/2006/relationships" xmlns:p="http://schemas.openxmlformats.org/presentationml/2006/main" type="twoTxTwoObj" preserve="1">
+  <p:cSld name="Comparison">
+    <p:spTree>
+      <p:nvGrpSpPr>
+        <p:cNvPr id="1" name=""/>
+        <p:cNvGrpSpPr/>
+        <p:nvPr/>
+      </p:nvGrpSpPr>
+      <p:grpSpPr>
+        <a:xfrm>
+          <a:off x="0" y="0"/>
+          <a:ext cx="0" cy="0"/>
+          <a:chOff x="0" y="0"/>
+          <a:chExt cx="0" cy="0"/>
+        </a:xfrm>
+      </p:grpSpPr>
+      <p:sp>
+        <p:nvSpPr>
+          <p:cNvPr id="2" name="Title 1"/>
+          <p:cNvSpPr>
+            <a:spLocks noGrp="1"/>
+          </p:cNvSpPr>
+          <p:nvPr>
+            <p:ph type="title"/>
+          </p:nvPr>
+        </p:nvSpPr>
+        <p:spPr/>
+        <p:txBody>
+          <a:bodyPr/>
+          <a:lstStyle>
+            <a:lvl1pPr>
+              <a:defRPr/>
+            </a:lvl1pPr>
+          </a:lstStyle>
+          <a:p>
+            <a:r>
+              <a:rPr lang="en-GB" smtClean="0"/>
+              <a:t>Click to edit Master title style</a:t>
+            </a:r>
+            <a:endParaRPr lang="en-US"/>
+          </a:p>
+        </p:txBody>
+      </p:sp>
+      <p:sp>
+        <p:nvSpPr>
+          <p:cNvPr id="3" name="Text Placeholder 2"/>
+          <p:cNvSpPr>
+            <a:spLocks noGrp="1"/>
+          </p:cNvSpPr>
+          <p:nvPr>
+            <p:ph type="body" idx="1"/>
+          </p:nvPr>
+        </p:nvSpPr>
+        <p:spPr>
+          <a:xfrm>
+            <a:off x="457200" y="1535113"/>
+            <a:ext cx="4040188" cy="639762"/>
+          </a:xfrm>
+        </p:spPr>
+        <p:txBody>
+          <a:bodyPr anchor="b"/>
+          <a:lstStyle>
+            <a:lvl1pPr marL="0" indent="0">
+              <a:buNone/>
+              <a:defRPr sz="2400" b="1"/>
+            </a:lvl1pPr>
+            <a:lvl2pPr marL="457200" indent="0">
+              <a:buNone/>
+              <a:defRPr sz="2000" b="1"/>
+            </a:lvl2pPr>
+            <a:lvl3pPr marL="914400" indent="0">
+              <a:buNone/>
+              <a:defRPr sz="1800" b="1"/>
+            </a:lvl3pPr>
+            <a:lvl4pPr marL="1371600" indent="0">
+              <a:buNone/>
+              <a:defRPr sz="1600" b="1"/>
+            </a:lvl4pPr>
+            <a:lvl5pPr marL="1828800" indent="0">
+              <a:buNone/>
+              <a:defRPr sz="1600" b="1"/>
+            </a:lvl5pPr>
+            <a:lvl6pPr marL="2286000" indent="0">
+              <a:buNone/>
+              <a:defRPr sz="1600" b="1"/>
+            </a:lvl6pPr>
+            <a:lvl7pPr marL="2743200" indent="0">
+              <a:buNone/>
+              <a:defRPr sz="1600" b="1"/>
+            </a:lvl7pPr>
+            <a:lvl8pPr marL="3200400" indent="0">
+              <a:buNone/>
+              <a:defRPr sz="1600" b="1"/>
+            </a:lvl8pPr>
+            <a:lvl9pPr marL="3657600" indent="0">
+              <a:buNone/>
+              <a:defRPr sz="1600" b="1"/>
+            </a:lvl9pPr>
+          </a:lstStyle>
+          <a:p>
+            <a:pPr lvl="0"/>
+            <a:r>
+              <a:rPr lang="en-GB" smtClean="0"/>
+              <a:t>Click to edit Master text styles</a:t>
+            </a:r>
+          </a:p>
+        </p:txBody>
+      </p:sp>
+      <p:sp>
+        <p:nvSpPr>
+          <p:cNvPr id="4" name="Content Placeholder 3"/>
+          <p:cNvSpPr>
+            <a:spLocks noGrp="1"/>
+          </p:cNvSpPr>
+          <p:nvPr>
+            <p:ph sz="half" idx="2"/>
+          </p:nvPr>
+        </p:nvSpPr>
+        <p:spPr>
+          <a:xfrm>
+            <a:off x="457200" y="2174875"/>
+            <a:ext cx="4040188" cy="3951288"/>
+          </a:xfrm>
+        </p:spPr>
+        <p:txBody>
+          <a:bodyPr/>
+          <a:lstStyle>
+            <a:lvl1pPr>
+              <a:defRPr sz="2400"/>
+            </a:lvl1pPr>
+            <a:lvl2pPr>
+              <a:defRPr sz="2000"/>
+            </a:lvl2pPr>
+            <a:lvl3pPr>
+              <a:defRPr sz="1800"/>
+            </a:lvl3pPr>
+            <a:lvl4pPr>
+              <a:defRPr sz="1600"/>
+            </a:lvl4pPr>
+            <a:lvl5pPr>
+              <a:defRPr sz="1600"/>
+            </a:lvl5pPr>
+            <a:lvl6pPr>
+              <a:defRPr sz="1600"/>
+            </a:lvl6pPr>
+            <a:lvl7pPr>
+              <a:defRPr sz="1600"/>
+            </a:lvl7pPr>
+            <a:lvl8pPr>
+              <a:defRPr sz="1600"/>
+            </a:lvl8pPr>
+            <a:lvl9pPr>
+              <a:defRPr sz="1600"/>
+            </a:lvl9pPr>
+          </a:lstStyle>
+          <a:p>
+            <a:pPr lvl="0"/>
+            <a:r>
+              <a:rPr lang="en-GB" smtClean="0"/>
+              <a:t>Click to edit Master text styles</a:t>
+            </a:r>
+          </a:p>
+          <a:p>
+            <a:pPr lvl="1"/>
+            <a:r>
+              <a:rPr lang="en-GB" smtClean="0"/>
+              <a:t>Second level</a:t>
+            </a:r>
+          </a:p>
+          <a:p>
+            <a:pPr lvl="2"/>
+            <a:r>
+              <a:rPr lang="en-GB" smtClean="0"/>
+              <a:t>Third level</a:t>
+            </a:r>
+          </a:p>
+          <a:p>
+            <a:pPr lvl="3"/>
+            <a:r>
+              <a:rPr lang="en-GB" smtClean="0"/>
+              <a:t>Fourth level</a:t>
+            </a:r>
+          </a:p>
+          <a:p>
+            <a:pPr lvl="4"/>
+            <a:r>
+              <a:rPr lang="en-GB" smtClean="0"/>
+              <a:t>Fifth level</a:t>
+            </a:r>
+            <a:endParaRPr lang="en-US"/>
+          </a:p>
+        </p:txBody>
+      </p:sp>
+      <p:sp>
+        <p:nvSpPr>
+          <p:cNvPr id="5" name="Text Placeholder 4"/>
+          <p:cNvSpPr>
+            <a:spLocks noGrp="1"/>
+          </p:cNvSpPr>
+          <p:nvPr>
+            <p:ph type="body" sz="quarter" idx="3"/>
+          </p:nvPr>
+        </p:nvSpPr>
+        <p:spPr>
+          <a:xfrm>
+            <a:off x="4645025" y="1535113"/>
+            <a:ext cx="4041775" cy="639762"/>
+          </a:xfrm>
+        </p:spPr>
+        <p:txBody>
+          <a:bodyPr anchor="b"/>
+          <a:lstStyle>
+            <a:lvl1pPr marL="0" indent="0">
+              <a:buNone/>
+              <a:defRPr sz="2400" b="1"/>
+            </a:lvl1pPr>
+            <a:lvl2pPr marL="457200" indent="0">
+              <a:buNone/>
+              <a:defRPr sz="2000" b="1"/>
+            </a:lvl2pPr>
+            <a:lvl3pPr marL="914400" indent="0">
+              <a:buNone/>
+              <a:defRPr sz="1800" b="1"/>
+            </a:lvl3pPr>
+            <a:lvl4pPr marL="1371600" indent="0">
+              <a:buNone/>
+              <a:defRPr sz="1600" b="1"/>
+            </a:lvl4pPr>
+            <a:lvl5pPr marL="1828800" indent="0">
+              <a:buNone/>
+              <a:defRPr sz="1600" b="1"/>
+            </a:lvl5pPr>
+            <a:lvl6pPr marL="2286000" indent="0">
+              <a:buNone/>
+              <a:defRPr sz="1600" b="1"/>
+            </a:lvl6pPr>
+            <a:lvl7pPr marL="2743200" indent="0">
+              <a:buNone/>
+              <a:defRPr sz="1600" b="1"/>
+            </a:lvl7pPr>
+            <a:lvl8pPr marL="3200400" indent="0">
+              <a:buNone/>
+              <a:defRPr sz="1600" b="1"/>
+            </a:lvl8pPr>
+            <a:lvl9pPr marL="3657600" indent="0">
+              <a:buNone/>
+              <a:defRPr sz="1600" b="1"/>
+            </a:lvl9pPr>
+          </a:lstStyle>
+          <a:p>
+            <a:pPr lvl="0"/>
+            <a:r>
+              <a:rPr lang="en-GB" smtClean="0"/>
+              <a:t>Click to edit Master text styles</a:t>
+            </a:r>
+          </a:p>
+        </p:txBody>
+      </p:sp>
+      <p:sp>
+        <p:nvSpPr>
+          <p:cNvPr id="6" name="Content Placeholder 5"/>
+          <p:cNvSpPr>
+            <a:spLocks noGrp="1"/>
+          </p:cNvSpPr>
+          <p:nvPr>
+            <p:ph sz="quarter" idx="4"/>
+          </p:nvPr>
+        </p:nvSpPr>
+        <p:spPr>
+          <a:xfrm>
+            <a:off x="4645025" y="2174875"/>
+            <a:ext cx="4041775" cy="3951288"/>
+          </a:xfrm>
+        </p:spPr>
+        <p:txBody>
+          <a:bodyPr/>
+          <a:lstStyle>
+            <a:lvl1pPr>
+              <a:defRPr sz="2400"/>
+            </a:lvl1pPr>
+            <a:lvl2pPr>
+              <a:defRPr sz="2000"/>
+            </a:lvl2pPr>
+            <a:lvl3pPr>
+              <a:defRPr sz="1800"/>
+            </a:lvl3pPr>
+            <a:lvl4pPr>
+              <a:defRPr sz="1600"/>
+            </a:lvl4pPr>
+            <a:lvl5pPr>
+              <a:defRPr sz="1600"/>
+            </a:lvl5pPr>
+            <a:lvl6pPr>
+              <a:defRPr sz="1600"/>
+            </a:lvl6pPr>
+            <a:lvl7pPr>
+              <a:defRPr sz="1600"/>
+            </a:lvl7pPr>
+            <a:lvl8pPr>
+              <a:defRPr sz="1600"/>
+            </a:lvl8pPr>
+            <a:lvl9pPr>
+              <a:defRPr sz="1600"/>
+            </a:lvl9pPr>
+          </a:lstStyle>
+          <a:p>
+            <a:pPr lvl="0"/>
+            <a:r>
+              <a:rPr lang="en-GB" smtClean="0"/>
+              <a:t>Click to edit Master text styles</a:t>
+            </a:r>
+          </a:p>
+          <a:p>
+            <a:pPr lvl="1"/>
+            <a:r>
+              <a:rPr lang="en-GB" smtClean="0"/>
+              <a:t>Second level</a:t>
+            </a:r>
+          </a:p>
+          <a:p>
+            <a:pPr lvl="2"/>
+            <a:r>
+              <a:rPr lang="en-GB" smtClean="0"/>
+              <a:t>Third level</a:t>
+            </a:r>
+          </a:p>
+          <a:p>
+            <a:pPr lvl="3"/>
+            <a:r>
+              <a:rPr lang="en-GB" smtClean="0"/>
+              <a:t>Fourth level</a:t>
+            </a:r>
+          </a:p>
+          <a:p>
+            <a:pPr lvl="4"/>
+            <a:r>
+              <a:rPr lang="en-GB" smtClean="0"/>
+              <a:t>Fifth level</a:t>
+            </a:r>
+            <a:endParaRPr lang="en-US"/>
+          </a:p>
+        </p:txBody>
+      </p:sp>
+      <p:sp>
+        <p:nvSpPr>
+          <p:cNvPr id="7" name="Date Placeholder 6"/>
+          <p:cNvSpPr>
+            <a:spLocks noGrp="1"/>
+          </p:cNvSpPr>
+          <p:nvPr>
+            <p:ph type="dt" sz="half" idx="10"/>
+          </p:nvPr>
+        </p:nvSpPr>
+        <p:spPr/>
+        <p:txBody>
+          <a:bodyPr/>
+          <a:lstStyle/>
+          <a:p>
+            <a:fld id="{99C3E6F9-20FC-254C-9885-321F390E26D9}" type="datetimeFigureOut">
+              <a:rPr lang="en-US" smtClean="0">
+                <a:solidFill>
+                  <a:prstClr val="black">
+                    <a:tint val="75000"/>
+                  </a:prstClr>
+                </a:solidFill>
+                <a:latin typeface="Calibri"/>
+              </a:rPr>
+              <a:pPr/>
+              <a:t>21/03/13</a:t>
+            </a:fld>
+            <a:endParaRPr lang="en-US">
+              <a:solidFill>
+                <a:prstClr val="black">
+                  <a:tint val="75000"/>
+                </a:prstClr>
+              </a:solidFill>
+              <a:latin typeface="Calibri"/>
+            </a:endParaRPr>
+          </a:p>
+        </p:txBody>
+      </p:sp>
+      <p:sp>
+        <p:nvSpPr>
+          <p:cNvPr id="8" name="Footer Placeholder 7"/>
+          <p:cNvSpPr>
+            <a:spLocks noGrp="1"/>
+          </p:cNvSpPr>
+          <p:nvPr>
+            <p:ph type="ftr" sz="quarter" idx="11"/>
+          </p:nvPr>
+        </p:nvSpPr>
+        <p:spPr/>
+        <p:txBody>
+          <a:bodyPr/>
+          <a:lstStyle/>
+          <a:p>
+            <a:endParaRPr lang="en-US">
+              <a:solidFill>
+                <a:prstClr val="black">
+                  <a:tint val="75000"/>
+                </a:prstClr>
+              </a:solidFill>
+              <a:latin typeface="Calibri"/>
+            </a:endParaRPr>
+          </a:p>
+        </p:txBody>
+      </p:sp>
+      <p:sp>
+        <p:nvSpPr>
+          <p:cNvPr id="9" name="Slide Number Placeholder 8"/>
+          <p:cNvSpPr>
+            <a:spLocks noGrp="1"/>
+          </p:cNvSpPr>
+          <p:nvPr>
+            <p:ph type="sldNum" sz="quarter" idx="12"/>
+          </p:nvPr>
+        </p:nvSpPr>
+        <p:spPr/>
+        <p:txBody>
+          <a:bodyPr/>
+          <a:lstStyle/>
+          <a:p>
+            <a:fld id="{3B8E83EB-7D5A-4947-8E9F-CDD9CFCA5BC8}" type="slidenum">
+              <a:rPr lang="en-US" smtClean="0">
+                <a:solidFill>
+                  <a:prstClr val="black">
+                    <a:tint val="75000"/>
+                  </a:prstClr>
+                </a:solidFill>
+                <a:latin typeface="Calibri"/>
+              </a:rPr>
+              <a:pPr/>
+              <a:t>‹#›</a:t>
+            </a:fld>
+            <a:endParaRPr lang="en-US">
+              <a:solidFill>
+                <a:prstClr val="black">
+                  <a:tint val="75000"/>
+                </a:prstClr>
+              </a:solidFill>
+              <a:latin typeface="Calibri"/>
+            </a:endParaRPr>
+          </a:p>
+        </p:txBody>
+      </p:sp>
+    </p:spTree>
+    <p:extLst>
+      <p:ext uri="{BB962C8B-B14F-4D97-AF65-F5344CB8AC3E}">
+        <p14:creationId xmlns:p14="http://schemas.microsoft.com/office/powerpoint/2010/main" val="2995592602"/>
+      </p:ext>
+    </p:extLst>
+  </p:cSld>
+  <p:clrMapOvr>
+    <a:masterClrMapping/>
+  </p:clrMapOvr>
+</p:sldLayout>
+</file>
+
+<file path=ppt/slideLayouts/slideLayout61.xml><?xml version="1.0" encoding="utf-8"?>
+<p:sldLayout xmlns:a="http://schemas.openxmlformats.org/drawingml/2006/main" xmlns:r="http://schemas.openxmlformats.org/officeDocument/2006/relationships" xmlns:p="http://schemas.openxmlformats.org/presentationml/2006/main" type="titleOnly" preserve="1">
+  <p:cSld name="Title Only">
+    <p:spTree>
+      <p:nvGrpSpPr>
+        <p:cNvPr id="1" name=""/>
+        <p:cNvGrpSpPr/>
+        <p:nvPr/>
+      </p:nvGrpSpPr>
+      <p:grpSpPr>
+        <a:xfrm>
+          <a:off x="0" y="0"/>
+          <a:ext cx="0" cy="0"/>
+          <a:chOff x="0" y="0"/>
+          <a:chExt cx="0" cy="0"/>
+        </a:xfrm>
+      </p:grpSpPr>
+      <p:sp>
+        <p:nvSpPr>
+          <p:cNvPr id="2" name="Title 1"/>
+          <p:cNvSpPr>
+            <a:spLocks noGrp="1"/>
+          </p:cNvSpPr>
+          <p:nvPr>
+            <p:ph type="title"/>
+          </p:nvPr>
+        </p:nvSpPr>
+        <p:spPr/>
+        <p:txBody>
+          <a:bodyPr/>
+          <a:lstStyle/>
+          <a:p>
+            <a:r>
+              <a:rPr lang="en-GB" smtClean="0"/>
+              <a:t>Click to edit Master title style</a:t>
+            </a:r>
+            <a:endParaRPr lang="en-US"/>
+          </a:p>
+        </p:txBody>
+      </p:sp>
+      <p:sp>
+        <p:nvSpPr>
+          <p:cNvPr id="3" name="Date Placeholder 2"/>
+          <p:cNvSpPr>
+            <a:spLocks noGrp="1"/>
+          </p:cNvSpPr>
+          <p:nvPr>
+            <p:ph type="dt" sz="half" idx="10"/>
+          </p:nvPr>
+        </p:nvSpPr>
+        <p:spPr/>
+        <p:txBody>
+          <a:bodyPr/>
+          <a:lstStyle/>
+          <a:p>
+            <a:fld id="{99C3E6F9-20FC-254C-9885-321F390E26D9}" type="datetimeFigureOut">
+              <a:rPr lang="en-US" smtClean="0">
+                <a:solidFill>
+                  <a:prstClr val="black">
+                    <a:tint val="75000"/>
+                  </a:prstClr>
+                </a:solidFill>
+                <a:latin typeface="Calibri"/>
+              </a:rPr>
+              <a:pPr/>
+              <a:t>21/03/13</a:t>
+            </a:fld>
+            <a:endParaRPr lang="en-US">
+              <a:solidFill>
+                <a:prstClr val="black">
+                  <a:tint val="75000"/>
+                </a:prstClr>
+              </a:solidFill>
+              <a:latin typeface="Calibri"/>
+            </a:endParaRPr>
+          </a:p>
+        </p:txBody>
+      </p:sp>
+      <p:sp>
+        <p:nvSpPr>
+          <p:cNvPr id="4" name="Footer Placeholder 3"/>
+          <p:cNvSpPr>
+            <a:spLocks noGrp="1"/>
+          </p:cNvSpPr>
+          <p:nvPr>
+            <p:ph type="ftr" sz="quarter" idx="11"/>
+          </p:nvPr>
+        </p:nvSpPr>
+        <p:spPr/>
+        <p:txBody>
+          <a:bodyPr/>
+          <a:lstStyle/>
+          <a:p>
+            <a:endParaRPr lang="en-US">
+              <a:solidFill>
+                <a:prstClr val="black">
+                  <a:tint val="75000"/>
+                </a:prstClr>
+              </a:solidFill>
+              <a:latin typeface="Calibri"/>
+            </a:endParaRPr>
+          </a:p>
+        </p:txBody>
+      </p:sp>
+      <p:sp>
+        <p:nvSpPr>
+          <p:cNvPr id="5" name="Slide Number Placeholder 4"/>
+          <p:cNvSpPr>
+            <a:spLocks noGrp="1"/>
+          </p:cNvSpPr>
+          <p:nvPr>
+            <p:ph type="sldNum" sz="quarter" idx="12"/>
+          </p:nvPr>
+        </p:nvSpPr>
+        <p:spPr/>
+        <p:txBody>
+          <a:bodyPr/>
+          <a:lstStyle/>
+          <a:p>
+            <a:fld id="{3B8E83EB-7D5A-4947-8E9F-CDD9CFCA5BC8}" type="slidenum">
+              <a:rPr lang="en-US" smtClean="0">
+                <a:solidFill>
+                  <a:prstClr val="black">
+                    <a:tint val="75000"/>
+                  </a:prstClr>
+                </a:solidFill>
+                <a:latin typeface="Calibri"/>
+              </a:rPr>
+              <a:pPr/>
+              <a:t>‹#›</a:t>
+            </a:fld>
+            <a:endParaRPr lang="en-US">
+              <a:solidFill>
+                <a:prstClr val="black">
+                  <a:tint val="75000"/>
+                </a:prstClr>
+              </a:solidFill>
+              <a:latin typeface="Calibri"/>
+            </a:endParaRPr>
+          </a:p>
+        </p:txBody>
+      </p:sp>
+    </p:spTree>
+    <p:extLst>
+      <p:ext uri="{BB962C8B-B14F-4D97-AF65-F5344CB8AC3E}">
+        <p14:creationId xmlns:p14="http://schemas.microsoft.com/office/powerpoint/2010/main" val="90440326"/>
+      </p:ext>
+    </p:extLst>
+  </p:cSld>
+  <p:clrMapOvr>
+    <a:masterClrMapping/>
+  </p:clrMapOvr>
+</p:sldLayout>
+</file>
+
+<file path=ppt/slideLayouts/slideLayout62.xml><?xml version="1.0" encoding="utf-8"?>
+<p:sldLayout xmlns:a="http://schemas.openxmlformats.org/drawingml/2006/main" xmlns:r="http://schemas.openxmlformats.org/officeDocument/2006/relationships" xmlns:p="http://schemas.openxmlformats.org/presentationml/2006/main" type="blank" preserve="1">
+  <p:cSld name="Blank">
+    <p:spTree>
+      <p:nvGrpSpPr>
+        <p:cNvPr id="1" name=""/>
+        <p:cNvGrpSpPr/>
+        <p:nvPr/>
+      </p:nvGrpSpPr>
+      <p:grpSpPr>
+        <a:xfrm>
+          <a:off x="0" y="0"/>
+          <a:ext cx="0" cy="0"/>
+          <a:chOff x="0" y="0"/>
+          <a:chExt cx="0" cy="0"/>
+        </a:xfrm>
+      </p:grpSpPr>
+      <p:sp>
+        <p:nvSpPr>
+          <p:cNvPr id="2" name="Date Placeholder 1"/>
+          <p:cNvSpPr>
+            <a:spLocks noGrp="1"/>
+          </p:cNvSpPr>
+          <p:nvPr>
+            <p:ph type="dt" sz="half" idx="10"/>
+          </p:nvPr>
+        </p:nvSpPr>
+        <p:spPr/>
+        <p:txBody>
+          <a:bodyPr/>
+          <a:lstStyle/>
+          <a:p>
+            <a:fld id="{99C3E6F9-20FC-254C-9885-321F390E26D9}" type="datetimeFigureOut">
+              <a:rPr lang="en-US" smtClean="0">
+                <a:solidFill>
+                  <a:prstClr val="black">
+                    <a:tint val="75000"/>
+                  </a:prstClr>
+                </a:solidFill>
+                <a:latin typeface="Calibri"/>
+              </a:rPr>
+              <a:pPr/>
+              <a:t>21/03/13</a:t>
+            </a:fld>
+            <a:endParaRPr lang="en-US">
+              <a:solidFill>
+                <a:prstClr val="black">
+                  <a:tint val="75000"/>
+                </a:prstClr>
+              </a:solidFill>
+              <a:latin typeface="Calibri"/>
+            </a:endParaRPr>
+          </a:p>
+        </p:txBody>
+      </p:sp>
+      <p:sp>
+        <p:nvSpPr>
+          <p:cNvPr id="3" name="Footer Placeholder 2"/>
+          <p:cNvSpPr>
+            <a:spLocks noGrp="1"/>
+          </p:cNvSpPr>
+          <p:nvPr>
+            <p:ph type="ftr" sz="quarter" idx="11"/>
+          </p:nvPr>
+        </p:nvSpPr>
+        <p:spPr/>
+        <p:txBody>
+          <a:bodyPr/>
+          <a:lstStyle/>
+          <a:p>
+            <a:endParaRPr lang="en-US">
+              <a:solidFill>
+                <a:prstClr val="black">
+                  <a:tint val="75000"/>
+                </a:prstClr>
+              </a:solidFill>
+              <a:latin typeface="Calibri"/>
+            </a:endParaRPr>
+          </a:p>
+        </p:txBody>
+      </p:sp>
+      <p:sp>
+        <p:nvSpPr>
+          <p:cNvPr id="4" name="Slide Number Placeholder 3"/>
+          <p:cNvSpPr>
+            <a:spLocks noGrp="1"/>
+          </p:cNvSpPr>
+          <p:nvPr>
+            <p:ph type="sldNum" sz="quarter" idx="12"/>
+          </p:nvPr>
+        </p:nvSpPr>
+        <p:spPr/>
+        <p:txBody>
+          <a:bodyPr/>
+          <a:lstStyle/>
+          <a:p>
+            <a:fld id="{3B8E83EB-7D5A-4947-8E9F-CDD9CFCA5BC8}" type="slidenum">
+              <a:rPr lang="en-US" smtClean="0">
+                <a:solidFill>
+                  <a:prstClr val="black">
+                    <a:tint val="75000"/>
+                  </a:prstClr>
+                </a:solidFill>
+                <a:latin typeface="Calibri"/>
+              </a:rPr>
+              <a:pPr/>
+              <a:t>‹#›</a:t>
+            </a:fld>
+            <a:endParaRPr lang="en-US">
+              <a:solidFill>
+                <a:prstClr val="black">
+                  <a:tint val="75000"/>
+                </a:prstClr>
+              </a:solidFill>
+              <a:latin typeface="Calibri"/>
+            </a:endParaRPr>
+          </a:p>
+        </p:txBody>
+      </p:sp>
+    </p:spTree>
+    <p:extLst>
+      <p:ext uri="{BB962C8B-B14F-4D97-AF65-F5344CB8AC3E}">
+        <p14:creationId xmlns:p14="http://schemas.microsoft.com/office/powerpoint/2010/main" val="447565958"/>
+      </p:ext>
+    </p:extLst>
+  </p:cSld>
+  <p:clrMapOvr>
+    <a:masterClrMapping/>
+  </p:clrMapOvr>
+</p:sldLayout>
+</file>
+
+<file path=ppt/slideLayouts/slideLayout63.xml><?xml version="1.0" encoding="utf-8"?>
+<p:sldLayout xmlns:a="http://schemas.openxmlformats.org/drawingml/2006/main" xmlns:r="http://schemas.openxmlformats.org/officeDocument/2006/relationships" xmlns:p="http://schemas.openxmlformats.org/presentationml/2006/main" type="objTx" preserve="1">
+  <p:cSld name="Content with Caption">
+    <p:spTree>
+      <p:nvGrpSpPr>
+        <p:cNvPr id="1" name=""/>
+        <p:cNvGrpSpPr/>
+        <p:nvPr/>
+      </p:nvGrpSpPr>
+      <p:grpSpPr>
+        <a:xfrm>
+          <a:off x="0" y="0"/>
+          <a:ext cx="0" cy="0"/>
+          <a:chOff x="0" y="0"/>
+          <a:chExt cx="0" cy="0"/>
+        </a:xfrm>
+      </p:grpSpPr>
+      <p:sp>
+        <p:nvSpPr>
+          <p:cNvPr id="2" name="Title 1"/>
+          <p:cNvSpPr>
+            <a:spLocks noGrp="1"/>
+          </p:cNvSpPr>
+          <p:nvPr>
+            <p:ph type="title"/>
+          </p:nvPr>
+        </p:nvSpPr>
+        <p:spPr>
+          <a:xfrm>
+            <a:off x="457200" y="273050"/>
+            <a:ext cx="3008313" cy="1162050"/>
+          </a:xfrm>
+        </p:spPr>
+        <p:txBody>
+          <a:bodyPr anchor="b"/>
+          <a:lstStyle>
+            <a:lvl1pPr algn="l">
+              <a:defRPr sz="2000" b="1"/>
+            </a:lvl1pPr>
+          </a:lstStyle>
+          <a:p>
+            <a:r>
+              <a:rPr lang="en-GB" smtClean="0"/>
+              <a:t>Click to edit Master title style</a:t>
+            </a:r>
+            <a:endParaRPr lang="en-US"/>
+          </a:p>
+        </p:txBody>
+      </p:sp>
+      <p:sp>
+        <p:nvSpPr>
+          <p:cNvPr id="3" name="Content Placeholder 2"/>
+          <p:cNvSpPr>
+            <a:spLocks noGrp="1"/>
+          </p:cNvSpPr>
+          <p:nvPr>
+            <p:ph idx="1"/>
+          </p:nvPr>
+        </p:nvSpPr>
+        <p:spPr>
+          <a:xfrm>
+            <a:off x="3575050" y="273050"/>
+            <a:ext cx="5111750" cy="5853113"/>
+          </a:xfrm>
+        </p:spPr>
+        <p:txBody>
+          <a:bodyPr/>
+          <a:lstStyle>
+            <a:lvl1pPr>
+              <a:defRPr sz="3200"/>
+            </a:lvl1pPr>
+            <a:lvl2pPr>
+              <a:defRPr sz="2800"/>
+            </a:lvl2pPr>
+            <a:lvl3pPr>
+              <a:defRPr sz="2400"/>
+            </a:lvl3pPr>
+            <a:lvl4pPr>
+              <a:defRPr sz="2000"/>
+            </a:lvl4pPr>
+            <a:lvl5pPr>
+              <a:defRPr sz="2000"/>
+            </a:lvl5pPr>
+            <a:lvl6pPr>
+              <a:defRPr sz="2000"/>
+            </a:lvl6pPr>
+            <a:lvl7pPr>
+              <a:defRPr sz="2000"/>
+            </a:lvl7pPr>
+            <a:lvl8pPr>
+              <a:defRPr sz="2000"/>
+            </a:lvl8pPr>
+            <a:lvl9pPr>
+              <a:defRPr sz="2000"/>
+            </a:lvl9pPr>
+          </a:lstStyle>
+          <a:p>
+            <a:pPr lvl="0"/>
+            <a:r>
+              <a:rPr lang="en-GB" smtClean="0"/>
+              <a:t>Click to edit Master text styles</a:t>
+            </a:r>
+          </a:p>
+          <a:p>
+            <a:pPr lvl="1"/>
+            <a:r>
+              <a:rPr lang="en-GB" smtClean="0"/>
+              <a:t>Second level</a:t>
+            </a:r>
+          </a:p>
+          <a:p>
+            <a:pPr lvl="2"/>
+            <a:r>
+              <a:rPr lang="en-GB" smtClean="0"/>
+              <a:t>Third level</a:t>
+            </a:r>
+          </a:p>
+          <a:p>
+            <a:pPr lvl="3"/>
+            <a:r>
+              <a:rPr lang="en-GB" smtClean="0"/>
+              <a:t>Fourth level</a:t>
+            </a:r>
+          </a:p>
+          <a:p>
+            <a:pPr lvl="4"/>
+            <a:r>
+              <a:rPr lang="en-GB" smtClean="0"/>
+              <a:t>Fifth level</a:t>
+            </a:r>
+            <a:endParaRPr lang="en-US"/>
+          </a:p>
+        </p:txBody>
+      </p:sp>
+      <p:sp>
+        <p:nvSpPr>
+          <p:cNvPr id="4" name="Text Placeholder 3"/>
+          <p:cNvSpPr>
+            <a:spLocks noGrp="1"/>
+          </p:cNvSpPr>
+          <p:nvPr>
+            <p:ph type="body" sz="half" idx="2"/>
+          </p:nvPr>
+        </p:nvSpPr>
+        <p:spPr>
+          <a:xfrm>
+            <a:off x="457200" y="1435100"/>
+            <a:ext cx="3008313" cy="4691063"/>
+          </a:xfrm>
+        </p:spPr>
+        <p:txBody>
+          <a:bodyPr/>
+          <a:lstStyle>
+            <a:lvl1pPr marL="0" indent="0">
+              <a:buNone/>
+              <a:defRPr sz="1400"/>
+            </a:lvl1pPr>
+            <a:lvl2pPr marL="457200" indent="0">
+              <a:buNone/>
+              <a:defRPr sz="1200"/>
+            </a:lvl2pPr>
+            <a:lvl3pPr marL="914400" indent="0">
+              <a:buNone/>
+              <a:defRPr sz="1000"/>
+            </a:lvl3pPr>
+            <a:lvl4pPr marL="1371600" indent="0">
+              <a:buNone/>
+              <a:defRPr sz="900"/>
+            </a:lvl4pPr>
+            <a:lvl5pPr marL="1828800" indent="0">
+              <a:buNone/>
+              <a:defRPr sz="900"/>
+            </a:lvl5pPr>
+            <a:lvl6pPr marL="2286000" indent="0">
+              <a:buNone/>
+              <a:defRPr sz="900"/>
+            </a:lvl6pPr>
+            <a:lvl7pPr marL="2743200" indent="0">
+              <a:buNone/>
+              <a:defRPr sz="900"/>
+            </a:lvl7pPr>
+            <a:lvl8pPr marL="3200400" indent="0">
+              <a:buNone/>
+              <a:defRPr sz="900"/>
+            </a:lvl8pPr>
+            <a:lvl9pPr marL="3657600" indent="0">
+              <a:buNone/>
+              <a:defRPr sz="900"/>
+            </a:lvl9pPr>
+          </a:lstStyle>
+          <a:p>
+            <a:pPr lvl="0"/>
+            <a:r>
+              <a:rPr lang="en-GB" smtClean="0"/>
+              <a:t>Click to edit Master text styles</a:t>
+            </a:r>
+          </a:p>
+        </p:txBody>
+      </p:sp>
+      <p:sp>
+        <p:nvSpPr>
+          <p:cNvPr id="5" name="Date Placeholder 4"/>
+          <p:cNvSpPr>
+            <a:spLocks noGrp="1"/>
+          </p:cNvSpPr>
+          <p:nvPr>
+            <p:ph type="dt" sz="half" idx="10"/>
+          </p:nvPr>
+        </p:nvSpPr>
+        <p:spPr/>
+        <p:txBody>
+          <a:bodyPr/>
+          <a:lstStyle/>
+          <a:p>
+            <a:fld id="{99C3E6F9-20FC-254C-9885-321F390E26D9}" type="datetimeFigureOut">
+              <a:rPr lang="en-US" smtClean="0">
+                <a:solidFill>
+                  <a:prstClr val="black">
+                    <a:tint val="75000"/>
+                  </a:prstClr>
+                </a:solidFill>
+                <a:latin typeface="Calibri"/>
+              </a:rPr>
+              <a:pPr/>
+              <a:t>21/03/13</a:t>
+            </a:fld>
+            <a:endParaRPr lang="en-US">
+              <a:solidFill>
+                <a:prstClr val="black">
+                  <a:tint val="75000"/>
+                </a:prstClr>
+              </a:solidFill>
+              <a:latin typeface="Calibri"/>
+            </a:endParaRPr>
+          </a:p>
+        </p:txBody>
+      </p:sp>
+      <p:sp>
+        <p:nvSpPr>
+          <p:cNvPr id="6" name="Footer Placeholder 5"/>
+          <p:cNvSpPr>
+            <a:spLocks noGrp="1"/>
+          </p:cNvSpPr>
+          <p:nvPr>
+            <p:ph type="ftr" sz="quarter" idx="11"/>
+          </p:nvPr>
+        </p:nvSpPr>
+        <p:spPr/>
+        <p:txBody>
+          <a:bodyPr/>
+          <a:lstStyle/>
+          <a:p>
+            <a:endParaRPr lang="en-US">
+              <a:solidFill>
+                <a:prstClr val="black">
+                  <a:tint val="75000"/>
+                </a:prstClr>
+              </a:solidFill>
+              <a:latin typeface="Calibri"/>
+            </a:endParaRPr>
+          </a:p>
+        </p:txBody>
+      </p:sp>
+      <p:sp>
+        <p:nvSpPr>
+          <p:cNvPr id="7" name="Slide Number Placeholder 6"/>
+          <p:cNvSpPr>
+            <a:spLocks noGrp="1"/>
+          </p:cNvSpPr>
+          <p:nvPr>
+            <p:ph type="sldNum" sz="quarter" idx="12"/>
+          </p:nvPr>
+        </p:nvSpPr>
+        <p:spPr/>
+        <p:txBody>
+          <a:bodyPr/>
+          <a:lstStyle/>
+          <a:p>
+            <a:fld id="{3B8E83EB-7D5A-4947-8E9F-CDD9CFCA5BC8}" type="slidenum">
+              <a:rPr lang="en-US" smtClean="0">
+                <a:solidFill>
+                  <a:prstClr val="black">
+                    <a:tint val="75000"/>
+                  </a:prstClr>
+                </a:solidFill>
+                <a:latin typeface="Calibri"/>
+              </a:rPr>
+              <a:pPr/>
+              <a:t>‹#›</a:t>
+            </a:fld>
+            <a:endParaRPr lang="en-US">
+              <a:solidFill>
+                <a:prstClr val="black">
+                  <a:tint val="75000"/>
+                </a:prstClr>
+              </a:solidFill>
+              <a:latin typeface="Calibri"/>
+            </a:endParaRPr>
+          </a:p>
+        </p:txBody>
+      </p:sp>
+    </p:spTree>
+    <p:extLst>
+      <p:ext uri="{BB962C8B-B14F-4D97-AF65-F5344CB8AC3E}">
+        <p14:creationId xmlns:p14="http://schemas.microsoft.com/office/powerpoint/2010/main" val="1976865401"/>
+      </p:ext>
+    </p:extLst>
+  </p:cSld>
+  <p:clrMapOvr>
+    <a:masterClrMapping/>
+  </p:clrMapOvr>
+</p:sldLayout>
+</file>
+
+<file path=ppt/slideLayouts/slideLayout64.xml><?xml version="1.0" encoding="utf-8"?>
+<p:sldLayout xmlns:a="http://schemas.openxmlformats.org/drawingml/2006/main" xmlns:r="http://schemas.openxmlformats.org/officeDocument/2006/relationships" xmlns:p="http://schemas.openxmlformats.org/presentationml/2006/main" type="picTx" preserve="1">
+  <p:cSld name="Picture with Caption">
+    <p:spTree>
+      <p:nvGrpSpPr>
+        <p:cNvPr id="1" name=""/>
+        <p:cNvGrpSpPr/>
+        <p:nvPr/>
+      </p:nvGrpSpPr>
+      <p:grpSpPr>
+        <a:xfrm>
+          <a:off x="0" y="0"/>
+          <a:ext cx="0" cy="0"/>
+          <a:chOff x="0" y="0"/>
+          <a:chExt cx="0" cy="0"/>
+        </a:xfrm>
+      </p:grpSpPr>
+      <p:sp>
+        <p:nvSpPr>
+          <p:cNvPr id="2" name="Title 1"/>
+          <p:cNvSpPr>
+            <a:spLocks noGrp="1"/>
+          </p:cNvSpPr>
+          <p:nvPr>
+            <p:ph type="title"/>
+          </p:nvPr>
+        </p:nvSpPr>
+        <p:spPr>
+          <a:xfrm>
+            <a:off x="1792288" y="4800600"/>
+            <a:ext cx="5486400" cy="566738"/>
+          </a:xfrm>
+        </p:spPr>
+        <p:txBody>
+          <a:bodyPr anchor="b"/>
+          <a:lstStyle>
+            <a:lvl1pPr algn="l">
+              <a:defRPr sz="2000" b="1"/>
+            </a:lvl1pPr>
+          </a:lstStyle>
+          <a:p>
+            <a:r>
+              <a:rPr lang="en-GB" smtClean="0"/>
+              <a:t>Click to edit Master title style</a:t>
+            </a:r>
+            <a:endParaRPr lang="en-US"/>
+          </a:p>
+        </p:txBody>
+      </p:sp>
+      <p:sp>
+        <p:nvSpPr>
+          <p:cNvPr id="3" name="Picture Placeholder 2"/>
+          <p:cNvSpPr>
+            <a:spLocks noGrp="1"/>
+          </p:cNvSpPr>
+          <p:nvPr>
+            <p:ph type="pic" idx="1"/>
+          </p:nvPr>
+        </p:nvSpPr>
+        <p:spPr>
+          <a:xfrm>
+            <a:off x="1792288" y="612775"/>
+            <a:ext cx="5486400" cy="4114800"/>
+          </a:xfrm>
+        </p:spPr>
+        <p:txBody>
+          <a:bodyPr/>
+          <a:lstStyle>
+            <a:lvl1pPr marL="0" indent="0">
+              <a:buNone/>
+              <a:defRPr sz="3200"/>
+            </a:lvl1pPr>
+            <a:lvl2pPr marL="457200" indent="0">
+              <a:buNone/>
+              <a:defRPr sz="2800"/>
+            </a:lvl2pPr>
+            <a:lvl3pPr marL="914400" indent="0">
+              <a:buNone/>
+              <a:defRPr sz="2400"/>
+            </a:lvl3pPr>
+            <a:lvl4pPr marL="1371600" indent="0">
+              <a:buNone/>
+              <a:defRPr sz="2000"/>
+            </a:lvl4pPr>
+            <a:lvl5pPr marL="1828800" indent="0">
+              <a:buNone/>
+              <a:defRPr sz="2000"/>
+            </a:lvl5pPr>
+            <a:lvl6pPr marL="2286000" indent="0">
+              <a:buNone/>
+              <a:defRPr sz="2000"/>
+            </a:lvl6pPr>
+            <a:lvl7pPr marL="2743200" indent="0">
+              <a:buNone/>
+              <a:defRPr sz="2000"/>
+            </a:lvl7pPr>
+            <a:lvl8pPr marL="3200400" indent="0">
+              <a:buNone/>
+              <a:defRPr sz="2000"/>
+            </a:lvl8pPr>
+            <a:lvl9pPr marL="3657600" indent="0">
+              <a:buNone/>
+              <a:defRPr sz="2000"/>
+            </a:lvl9pPr>
+          </a:lstStyle>
+          <a:p>
+            <a:endParaRPr lang="en-US"/>
+          </a:p>
+        </p:txBody>
+      </p:sp>
+      <p:sp>
+        <p:nvSpPr>
+          <p:cNvPr id="4" name="Text Placeholder 3"/>
+          <p:cNvSpPr>
+            <a:spLocks noGrp="1"/>
+          </p:cNvSpPr>
+          <p:nvPr>
+            <p:ph type="body" sz="half" idx="2"/>
+          </p:nvPr>
+        </p:nvSpPr>
+        <p:spPr>
+          <a:xfrm>
+            <a:off x="1792288" y="5367338"/>
+            <a:ext cx="5486400" cy="804862"/>
+          </a:xfrm>
+        </p:spPr>
+        <p:txBody>
+          <a:bodyPr/>
+          <a:lstStyle>
+            <a:lvl1pPr marL="0" indent="0">
+              <a:buNone/>
+              <a:defRPr sz="1400"/>
+            </a:lvl1pPr>
+            <a:lvl2pPr marL="457200" indent="0">
+              <a:buNone/>
+              <a:defRPr sz="1200"/>
+            </a:lvl2pPr>
+            <a:lvl3pPr marL="914400" indent="0">
+              <a:buNone/>
+              <a:defRPr sz="1000"/>
+            </a:lvl3pPr>
+            <a:lvl4pPr marL="1371600" indent="0">
+              <a:buNone/>
+              <a:defRPr sz="900"/>
+            </a:lvl4pPr>
+            <a:lvl5pPr marL="1828800" indent="0">
+              <a:buNone/>
+              <a:defRPr sz="900"/>
+            </a:lvl5pPr>
+            <a:lvl6pPr marL="2286000" indent="0">
+              <a:buNone/>
+              <a:defRPr sz="900"/>
+            </a:lvl6pPr>
+            <a:lvl7pPr marL="2743200" indent="0">
+              <a:buNone/>
+              <a:defRPr sz="900"/>
+            </a:lvl7pPr>
+            <a:lvl8pPr marL="3200400" indent="0">
+              <a:buNone/>
+              <a:defRPr sz="900"/>
+            </a:lvl8pPr>
+            <a:lvl9pPr marL="3657600" indent="0">
+              <a:buNone/>
+              <a:defRPr sz="900"/>
+            </a:lvl9pPr>
+          </a:lstStyle>
+          <a:p>
+            <a:pPr lvl="0"/>
+            <a:r>
+              <a:rPr lang="en-GB" smtClean="0"/>
+              <a:t>Click to edit Master text styles</a:t>
+            </a:r>
+          </a:p>
+        </p:txBody>
+      </p:sp>
+      <p:sp>
+        <p:nvSpPr>
+          <p:cNvPr id="5" name="Date Placeholder 4"/>
+          <p:cNvSpPr>
+            <a:spLocks noGrp="1"/>
+          </p:cNvSpPr>
+          <p:nvPr>
+            <p:ph type="dt" sz="half" idx="10"/>
+          </p:nvPr>
+        </p:nvSpPr>
+        <p:spPr/>
+        <p:txBody>
+          <a:bodyPr/>
+          <a:lstStyle/>
+          <a:p>
+            <a:fld id="{99C3E6F9-20FC-254C-9885-321F390E26D9}" type="datetimeFigureOut">
+              <a:rPr lang="en-US" smtClean="0">
+                <a:solidFill>
+                  <a:prstClr val="black">
+                    <a:tint val="75000"/>
+                  </a:prstClr>
+                </a:solidFill>
+                <a:latin typeface="Calibri"/>
+              </a:rPr>
+              <a:pPr/>
+              <a:t>21/03/13</a:t>
+            </a:fld>
+            <a:endParaRPr lang="en-US">
+              <a:solidFill>
+                <a:prstClr val="black">
+                  <a:tint val="75000"/>
+                </a:prstClr>
+              </a:solidFill>
+              <a:latin typeface="Calibri"/>
+            </a:endParaRPr>
+          </a:p>
+        </p:txBody>
+      </p:sp>
+      <p:sp>
+        <p:nvSpPr>
+          <p:cNvPr id="6" name="Footer Placeholder 5"/>
+          <p:cNvSpPr>
+            <a:spLocks noGrp="1"/>
+          </p:cNvSpPr>
+          <p:nvPr>
+            <p:ph type="ftr" sz="quarter" idx="11"/>
+          </p:nvPr>
+        </p:nvSpPr>
+        <p:spPr/>
+        <p:txBody>
+          <a:bodyPr/>
+          <a:lstStyle/>
+          <a:p>
+            <a:endParaRPr lang="en-US">
+              <a:solidFill>
+                <a:prstClr val="black">
+                  <a:tint val="75000"/>
+                </a:prstClr>
+              </a:solidFill>
+              <a:latin typeface="Calibri"/>
+            </a:endParaRPr>
+          </a:p>
+        </p:txBody>
+      </p:sp>
+      <p:sp>
+        <p:nvSpPr>
+          <p:cNvPr id="7" name="Slide Number Placeholder 6"/>
+          <p:cNvSpPr>
+            <a:spLocks noGrp="1"/>
+          </p:cNvSpPr>
+          <p:nvPr>
+            <p:ph type="sldNum" sz="quarter" idx="12"/>
+          </p:nvPr>
+        </p:nvSpPr>
+        <p:spPr/>
+        <p:txBody>
+          <a:bodyPr/>
+          <a:lstStyle/>
+          <a:p>
+            <a:fld id="{3B8E83EB-7D5A-4947-8E9F-CDD9CFCA5BC8}" type="slidenum">
+              <a:rPr lang="en-US" smtClean="0">
+                <a:solidFill>
+                  <a:prstClr val="black">
+                    <a:tint val="75000"/>
+                  </a:prstClr>
+                </a:solidFill>
+                <a:latin typeface="Calibri"/>
+              </a:rPr>
+              <a:pPr/>
+              <a:t>‹#›</a:t>
+            </a:fld>
+            <a:endParaRPr lang="en-US">
+              <a:solidFill>
+                <a:prstClr val="black">
+                  <a:tint val="75000"/>
+                </a:prstClr>
+              </a:solidFill>
+              <a:latin typeface="Calibri"/>
+            </a:endParaRPr>
+          </a:p>
+        </p:txBody>
+      </p:sp>
+    </p:spTree>
+    <p:extLst>
+      <p:ext uri="{BB962C8B-B14F-4D97-AF65-F5344CB8AC3E}">
+        <p14:creationId xmlns:p14="http://schemas.microsoft.com/office/powerpoint/2010/main" val="533899027"/>
+      </p:ext>
+    </p:extLst>
+  </p:cSld>
+  <p:clrMapOvr>
+    <a:masterClrMapping/>
+  </p:clrMapOvr>
+</p:sldLayout>
+</file>
+
+<file path=ppt/slideLayouts/slideLayout65.xml><?xml version="1.0" encoding="utf-8"?>
+<p:sldLayout xmlns:a="http://schemas.openxmlformats.org/drawingml/2006/main" xmlns:r="http://schemas.openxmlformats.org/officeDocument/2006/relationships" xmlns:p="http://schemas.openxmlformats.org/presentationml/2006/main" type="vertTx" preserve="1">
+  <p:cSld name="Title and Vertical Text">
+    <p:spTree>
+      <p:nvGrpSpPr>
+        <p:cNvPr id="1" name=""/>
+        <p:cNvGrpSpPr/>
+        <p:nvPr/>
+      </p:nvGrpSpPr>
+      <p:grpSpPr>
+        <a:xfrm>
+          <a:off x="0" y="0"/>
+          <a:ext cx="0" cy="0"/>
+          <a:chOff x="0" y="0"/>
+          <a:chExt cx="0" cy="0"/>
+        </a:xfrm>
+      </p:grpSpPr>
+      <p:sp>
+        <p:nvSpPr>
+          <p:cNvPr id="2" name="Title 1"/>
+          <p:cNvSpPr>
+            <a:spLocks noGrp="1"/>
+          </p:cNvSpPr>
+          <p:nvPr>
+            <p:ph type="title"/>
+          </p:nvPr>
+        </p:nvSpPr>
+        <p:spPr/>
+        <p:txBody>
+          <a:bodyPr/>
+          <a:lstStyle/>
+          <a:p>
+            <a:r>
+              <a:rPr lang="en-GB" smtClean="0"/>
+              <a:t>Click to edit Master title style</a:t>
+            </a:r>
+            <a:endParaRPr lang="en-US"/>
+          </a:p>
+        </p:txBody>
+      </p:sp>
+      <p:sp>
+        <p:nvSpPr>
+          <p:cNvPr id="3" name="Vertical Text Placeholder 2"/>
+          <p:cNvSpPr>
+            <a:spLocks noGrp="1"/>
+          </p:cNvSpPr>
+          <p:nvPr>
+            <p:ph type="body" orient="vert" idx="1"/>
+          </p:nvPr>
+        </p:nvSpPr>
+        <p:spPr/>
+        <p:txBody>
+          <a:bodyPr vert="eaVert"/>
+          <a:lstStyle/>
+          <a:p>
+            <a:pPr lvl="0"/>
+            <a:r>
+              <a:rPr lang="en-GB" smtClean="0"/>
+              <a:t>Click to edit Master text styles</a:t>
+            </a:r>
+          </a:p>
+          <a:p>
+            <a:pPr lvl="1"/>
+            <a:r>
+              <a:rPr lang="en-GB" smtClean="0"/>
+              <a:t>Second level</a:t>
+            </a:r>
+          </a:p>
+          <a:p>
+            <a:pPr lvl="2"/>
+            <a:r>
+              <a:rPr lang="en-GB" smtClean="0"/>
+              <a:t>Third level</a:t>
+            </a:r>
+          </a:p>
+          <a:p>
+            <a:pPr lvl="3"/>
+            <a:r>
+              <a:rPr lang="en-GB" smtClean="0"/>
+              <a:t>Fourth level</a:t>
+            </a:r>
+          </a:p>
+          <a:p>
+            <a:pPr lvl="4"/>
+            <a:r>
+              <a:rPr lang="en-GB" smtClean="0"/>
+              <a:t>Fifth level</a:t>
+            </a:r>
+            <a:endParaRPr lang="en-US"/>
+          </a:p>
+        </p:txBody>
+      </p:sp>
+      <p:sp>
+        <p:nvSpPr>
+          <p:cNvPr id="4" name="Date Placeholder 3"/>
+          <p:cNvSpPr>
+            <a:spLocks noGrp="1"/>
+          </p:cNvSpPr>
+          <p:nvPr>
+            <p:ph type="dt" sz="half" idx="10"/>
+          </p:nvPr>
+        </p:nvSpPr>
+        <p:spPr/>
+        <p:txBody>
+          <a:bodyPr/>
+          <a:lstStyle/>
+          <a:p>
+            <a:fld id="{99C3E6F9-20FC-254C-9885-321F390E26D9}" type="datetimeFigureOut">
+              <a:rPr lang="en-US" smtClean="0">
+                <a:solidFill>
+                  <a:prstClr val="black">
+                    <a:tint val="75000"/>
+                  </a:prstClr>
+                </a:solidFill>
+                <a:latin typeface="Calibri"/>
+              </a:rPr>
+              <a:pPr/>
+              <a:t>21/03/13</a:t>
+            </a:fld>
+            <a:endParaRPr lang="en-US">
+              <a:solidFill>
+                <a:prstClr val="black">
+                  <a:tint val="75000"/>
+                </a:prstClr>
+              </a:solidFill>
+              <a:latin typeface="Calibri"/>
+            </a:endParaRPr>
+          </a:p>
+        </p:txBody>
+      </p:sp>
+      <p:sp>
+        <p:nvSpPr>
+          <p:cNvPr id="5" name="Footer Placeholder 4"/>
+          <p:cNvSpPr>
+            <a:spLocks noGrp="1"/>
+          </p:cNvSpPr>
+          <p:nvPr>
+            <p:ph type="ftr" sz="quarter" idx="11"/>
+          </p:nvPr>
+        </p:nvSpPr>
+        <p:spPr/>
+        <p:txBody>
+          <a:bodyPr/>
+          <a:lstStyle/>
+          <a:p>
+            <a:endParaRPr lang="en-US">
+              <a:solidFill>
+                <a:prstClr val="black">
+                  <a:tint val="75000"/>
+                </a:prstClr>
+              </a:solidFill>
+              <a:latin typeface="Calibri"/>
+            </a:endParaRPr>
+          </a:p>
+        </p:txBody>
+      </p:sp>
+      <p:sp>
+        <p:nvSpPr>
+          <p:cNvPr id="6" name="Slide Number Placeholder 5"/>
+          <p:cNvSpPr>
+            <a:spLocks noGrp="1"/>
+          </p:cNvSpPr>
+          <p:nvPr>
+            <p:ph type="sldNum" sz="quarter" idx="12"/>
+          </p:nvPr>
+        </p:nvSpPr>
+        <p:spPr/>
+        <p:txBody>
+          <a:bodyPr/>
+          <a:lstStyle/>
+          <a:p>
+            <a:fld id="{3B8E83EB-7D5A-4947-8E9F-CDD9CFCA5BC8}" type="slidenum">
+              <a:rPr lang="en-US" smtClean="0">
+                <a:solidFill>
+                  <a:prstClr val="black">
+                    <a:tint val="75000"/>
+                  </a:prstClr>
+                </a:solidFill>
+                <a:latin typeface="Calibri"/>
+              </a:rPr>
+              <a:pPr/>
+              <a:t>‹#›</a:t>
+            </a:fld>
+            <a:endParaRPr lang="en-US">
+              <a:solidFill>
+                <a:prstClr val="black">
+                  <a:tint val="75000"/>
+                </a:prstClr>
+              </a:solidFill>
+              <a:latin typeface="Calibri"/>
+            </a:endParaRPr>
+          </a:p>
+        </p:txBody>
+      </p:sp>
+    </p:spTree>
+    <p:extLst>
+      <p:ext uri="{BB962C8B-B14F-4D97-AF65-F5344CB8AC3E}">
+        <p14:creationId xmlns:p14="http://schemas.microsoft.com/office/powerpoint/2010/main" val="2448021958"/>
+      </p:ext>
+    </p:extLst>
+  </p:cSld>
+  <p:clrMapOvr>
+    <a:masterClrMapping/>
+  </p:clrMapOvr>
+</p:sldLayout>
+</file>
+
+<file path=ppt/slideLayouts/slideLayout66.xml><?xml version="1.0" encoding="utf-8"?>
+<p:sldLayout xmlns:a="http://schemas.openxmlformats.org/drawingml/2006/main" xmlns:r="http://schemas.openxmlformats.org/officeDocument/2006/relationships" xmlns:p="http://schemas.openxmlformats.org/presentationml/2006/main" type="vertTitleAndTx" preserve="1">
+  <p:cSld name="Vertical Title and Text">
+    <p:spTree>
+      <p:nvGrpSpPr>
+        <p:cNvPr id="1" name=""/>
+        <p:cNvGrpSpPr/>
+        <p:nvPr/>
+      </p:nvGrpSpPr>
+      <p:grpSpPr>
+        <a:xfrm>
+          <a:off x="0" y="0"/>
+          <a:ext cx="0" cy="0"/>
+          <a:chOff x="0" y="0"/>
+          <a:chExt cx="0" cy="0"/>
+        </a:xfrm>
+      </p:grpSpPr>
+      <p:sp>
+        <p:nvSpPr>
+          <p:cNvPr id="2" name="Vertical Title 1"/>
+          <p:cNvSpPr>
+            <a:spLocks noGrp="1"/>
+          </p:cNvSpPr>
+          <p:nvPr>
+            <p:ph type="title" orient="vert"/>
+          </p:nvPr>
+        </p:nvSpPr>
+        <p:spPr>
+          <a:xfrm>
+            <a:off x="6629400" y="274638"/>
+            <a:ext cx="2057400" cy="5851525"/>
+          </a:xfrm>
+        </p:spPr>
+        <p:txBody>
+          <a:bodyPr vert="eaVert"/>
+          <a:lstStyle/>
+          <a:p>
+            <a:r>
+              <a:rPr lang="en-GB" smtClean="0"/>
+              <a:t>Click to edit Master title style</a:t>
+            </a:r>
+            <a:endParaRPr lang="en-US"/>
+          </a:p>
+        </p:txBody>
+      </p:sp>
+      <p:sp>
+        <p:nvSpPr>
+          <p:cNvPr id="3" name="Vertical Text Placeholder 2"/>
+          <p:cNvSpPr>
+            <a:spLocks noGrp="1"/>
+          </p:cNvSpPr>
+          <p:nvPr>
+            <p:ph type="body" orient="vert" idx="1"/>
+          </p:nvPr>
+        </p:nvSpPr>
+        <p:spPr>
+          <a:xfrm>
+            <a:off x="457200" y="274638"/>
+            <a:ext cx="6019800" cy="5851525"/>
+          </a:xfrm>
+        </p:spPr>
+        <p:txBody>
+          <a:bodyPr vert="eaVert"/>
+          <a:lstStyle/>
+          <a:p>
+            <a:pPr lvl="0"/>
+            <a:r>
+              <a:rPr lang="en-GB" smtClean="0"/>
+              <a:t>Click to edit Master text styles</a:t>
+            </a:r>
+          </a:p>
+          <a:p>
+            <a:pPr lvl="1"/>
+            <a:r>
+              <a:rPr lang="en-GB" smtClean="0"/>
+              <a:t>Second level</a:t>
+            </a:r>
+          </a:p>
+          <a:p>
+            <a:pPr lvl="2"/>
+            <a:r>
+              <a:rPr lang="en-GB" smtClean="0"/>
+              <a:t>Third level</a:t>
+            </a:r>
+          </a:p>
+          <a:p>
+            <a:pPr lvl="3"/>
+            <a:r>
+              <a:rPr lang="en-GB" smtClean="0"/>
+              <a:t>Fourth level</a:t>
+            </a:r>
+          </a:p>
+          <a:p>
+            <a:pPr lvl="4"/>
+            <a:r>
+              <a:rPr lang="en-GB" smtClean="0"/>
+              <a:t>Fifth level</a:t>
+            </a:r>
+            <a:endParaRPr lang="en-US"/>
+          </a:p>
+        </p:txBody>
+      </p:sp>
+      <p:sp>
+        <p:nvSpPr>
+          <p:cNvPr id="4" name="Date Placeholder 3"/>
+          <p:cNvSpPr>
+            <a:spLocks noGrp="1"/>
+          </p:cNvSpPr>
+          <p:nvPr>
+            <p:ph type="dt" sz="half" idx="10"/>
+          </p:nvPr>
+        </p:nvSpPr>
+        <p:spPr/>
+        <p:txBody>
+          <a:bodyPr/>
+          <a:lstStyle/>
+          <a:p>
+            <a:fld id="{99C3E6F9-20FC-254C-9885-321F390E26D9}" type="datetimeFigureOut">
+              <a:rPr lang="en-US" smtClean="0">
+                <a:solidFill>
+                  <a:prstClr val="black">
+                    <a:tint val="75000"/>
+                  </a:prstClr>
+                </a:solidFill>
+                <a:latin typeface="Calibri"/>
+              </a:rPr>
+              <a:pPr/>
+              <a:t>21/03/13</a:t>
+            </a:fld>
+            <a:endParaRPr lang="en-US">
+              <a:solidFill>
+                <a:prstClr val="black">
+                  <a:tint val="75000"/>
+                </a:prstClr>
+              </a:solidFill>
+              <a:latin typeface="Calibri"/>
+            </a:endParaRPr>
+          </a:p>
+        </p:txBody>
+      </p:sp>
+      <p:sp>
+        <p:nvSpPr>
+          <p:cNvPr id="5" name="Footer Placeholder 4"/>
+          <p:cNvSpPr>
+            <a:spLocks noGrp="1"/>
+          </p:cNvSpPr>
+          <p:nvPr>
+            <p:ph type="ftr" sz="quarter" idx="11"/>
+          </p:nvPr>
+        </p:nvSpPr>
+        <p:spPr/>
+        <p:txBody>
+          <a:bodyPr/>
+          <a:lstStyle/>
+          <a:p>
+            <a:endParaRPr lang="en-US">
+              <a:solidFill>
+                <a:prstClr val="black">
+                  <a:tint val="75000"/>
+                </a:prstClr>
+              </a:solidFill>
+              <a:latin typeface="Calibri"/>
+            </a:endParaRPr>
+          </a:p>
+        </p:txBody>
+      </p:sp>
+      <p:sp>
+        <p:nvSpPr>
+          <p:cNvPr id="6" name="Slide Number Placeholder 5"/>
+          <p:cNvSpPr>
+            <a:spLocks noGrp="1"/>
+          </p:cNvSpPr>
+          <p:nvPr>
+            <p:ph type="sldNum" sz="quarter" idx="12"/>
+          </p:nvPr>
+        </p:nvSpPr>
+        <p:spPr/>
+        <p:txBody>
+          <a:bodyPr/>
+          <a:lstStyle/>
+          <a:p>
+            <a:fld id="{3B8E83EB-7D5A-4947-8E9F-CDD9CFCA5BC8}" type="slidenum">
+              <a:rPr lang="en-US" smtClean="0">
+                <a:solidFill>
+                  <a:prstClr val="black">
+                    <a:tint val="75000"/>
+                  </a:prstClr>
+                </a:solidFill>
+                <a:latin typeface="Calibri"/>
+              </a:rPr>
+              <a:pPr/>
+              <a:t>‹#›</a:t>
+            </a:fld>
+            <a:endParaRPr lang="en-US">
+              <a:solidFill>
+                <a:prstClr val="black">
+                  <a:tint val="75000"/>
+                </a:prstClr>
+              </a:solidFill>
+              <a:latin typeface="Calibri"/>
+            </a:endParaRPr>
+          </a:p>
+        </p:txBody>
+      </p:sp>
+    </p:spTree>
+    <p:extLst>
+      <p:ext uri="{BB962C8B-B14F-4D97-AF65-F5344CB8AC3E}">
+        <p14:creationId xmlns:p14="http://schemas.microsoft.com/office/powerpoint/2010/main" val="475570454"/>
       </p:ext>
     </p:extLst>
   </p:cSld>
@@ -17884,6 +20755,553 @@
 </p:sldMaster>
 </file>
 
+<file path=ppt/slideMasters/slideMaster6.xml><?xml version="1.0" encoding="utf-8"?>
+<p:sldMaster xmlns:a="http://schemas.openxmlformats.org/drawingml/2006/main" xmlns:r="http://schemas.openxmlformats.org/officeDocument/2006/relationships" xmlns:p="http://schemas.openxmlformats.org/presentationml/2006/main">
+  <p:cSld>
+    <p:bg>
+      <p:bgRef idx="1001">
+        <a:schemeClr val="bg1"/>
+      </p:bgRef>
+    </p:bg>
+    <p:spTree>
+      <p:nvGrpSpPr>
+        <p:cNvPr id="1" name=""/>
+        <p:cNvGrpSpPr/>
+        <p:nvPr/>
+      </p:nvGrpSpPr>
+      <p:grpSpPr>
+        <a:xfrm>
+          <a:off x="0" y="0"/>
+          <a:ext cx="0" cy="0"/>
+          <a:chOff x="0" y="0"/>
+          <a:chExt cx="0" cy="0"/>
+        </a:xfrm>
+      </p:grpSpPr>
+      <p:sp>
+        <p:nvSpPr>
+          <p:cNvPr id="2" name="Title Placeholder 1"/>
+          <p:cNvSpPr>
+            <a:spLocks noGrp="1"/>
+          </p:cNvSpPr>
+          <p:nvPr>
+            <p:ph type="title"/>
+          </p:nvPr>
+        </p:nvSpPr>
+        <p:spPr>
+          <a:xfrm>
+            <a:off x="457200" y="274638"/>
+            <a:ext cx="8229600" cy="1143000"/>
+          </a:xfrm>
+          <a:prstGeom prst="rect">
+            <a:avLst/>
+          </a:prstGeom>
+        </p:spPr>
+        <p:txBody>
+          <a:bodyPr vert="horz" lIns="91440" tIns="45720" rIns="91440" bIns="45720" rtlCol="0" anchor="ctr">
+            <a:normAutofit/>
+          </a:bodyPr>
+          <a:lstStyle/>
+          <a:p>
+            <a:r>
+              <a:rPr lang="en-GB" smtClean="0"/>
+              <a:t>Click to edit Master title style</a:t>
+            </a:r>
+            <a:endParaRPr lang="en-US"/>
+          </a:p>
+        </p:txBody>
+      </p:sp>
+      <p:sp>
+        <p:nvSpPr>
+          <p:cNvPr id="3" name="Text Placeholder 2"/>
+          <p:cNvSpPr>
+            <a:spLocks noGrp="1"/>
+          </p:cNvSpPr>
+          <p:nvPr>
+            <p:ph type="body" idx="1"/>
+          </p:nvPr>
+        </p:nvSpPr>
+        <p:spPr>
+          <a:xfrm>
+            <a:off x="457200" y="1600200"/>
+            <a:ext cx="8229600" cy="4525963"/>
+          </a:xfrm>
+          <a:prstGeom prst="rect">
+            <a:avLst/>
+          </a:prstGeom>
+        </p:spPr>
+        <p:txBody>
+          <a:bodyPr vert="horz" lIns="91440" tIns="45720" rIns="91440" bIns="45720" rtlCol="0">
+            <a:normAutofit/>
+          </a:bodyPr>
+          <a:lstStyle/>
+          <a:p>
+            <a:pPr lvl="0"/>
+            <a:r>
+              <a:rPr lang="en-GB" smtClean="0"/>
+              <a:t>Click to edit Master text styles</a:t>
+            </a:r>
+          </a:p>
+          <a:p>
+            <a:pPr lvl="1"/>
+            <a:r>
+              <a:rPr lang="en-GB" smtClean="0"/>
+              <a:t>Second level</a:t>
+            </a:r>
+          </a:p>
+          <a:p>
+            <a:pPr lvl="2"/>
+            <a:r>
+              <a:rPr lang="en-GB" smtClean="0"/>
+              <a:t>Third level</a:t>
+            </a:r>
+          </a:p>
+          <a:p>
+            <a:pPr lvl="3"/>
+            <a:r>
+              <a:rPr lang="en-GB" smtClean="0"/>
+              <a:t>Fourth level</a:t>
+            </a:r>
+          </a:p>
+          <a:p>
+            <a:pPr lvl="4"/>
+            <a:r>
+              <a:rPr lang="en-GB" smtClean="0"/>
+              <a:t>Fifth level</a:t>
+            </a:r>
+            <a:endParaRPr lang="en-US"/>
+          </a:p>
+        </p:txBody>
+      </p:sp>
+      <p:sp>
+        <p:nvSpPr>
+          <p:cNvPr id="4" name="Date Placeholder 3"/>
+          <p:cNvSpPr>
+            <a:spLocks noGrp="1"/>
+          </p:cNvSpPr>
+          <p:nvPr>
+            <p:ph type="dt" sz="half" idx="2"/>
+          </p:nvPr>
+        </p:nvSpPr>
+        <p:spPr>
+          <a:xfrm>
+            <a:off x="457200" y="6356350"/>
+            <a:ext cx="2133600" cy="365125"/>
+          </a:xfrm>
+          <a:prstGeom prst="rect">
+            <a:avLst/>
+          </a:prstGeom>
+        </p:spPr>
+        <p:txBody>
+          <a:bodyPr vert="horz" lIns="91440" tIns="45720" rIns="91440" bIns="45720" rtlCol="0" anchor="ctr"/>
+          <a:lstStyle>
+            <a:lvl1pPr algn="l">
+              <a:defRPr sz="1200">
+                <a:solidFill>
+                  <a:schemeClr val="tx1">
+                    <a:tint val="75000"/>
+                  </a:schemeClr>
+                </a:solidFill>
+              </a:defRPr>
+            </a:lvl1pPr>
+          </a:lstStyle>
+          <a:p>
+            <a:fld id="{99C3E6F9-20FC-254C-9885-321F390E26D9}" type="datetimeFigureOut">
+              <a:rPr lang="en-US" smtClean="0">
+                <a:solidFill>
+                  <a:prstClr val="black">
+                    <a:tint val="75000"/>
+                  </a:prstClr>
+                </a:solidFill>
+                <a:latin typeface="Calibri"/>
+              </a:rPr>
+              <a:pPr/>
+              <a:t>21/03/13</a:t>
+            </a:fld>
+            <a:endParaRPr lang="en-US">
+              <a:solidFill>
+                <a:prstClr val="black">
+                  <a:tint val="75000"/>
+                </a:prstClr>
+              </a:solidFill>
+              <a:latin typeface="Calibri"/>
+            </a:endParaRPr>
+          </a:p>
+        </p:txBody>
+      </p:sp>
+      <p:sp>
+        <p:nvSpPr>
+          <p:cNvPr id="5" name="Footer Placeholder 4"/>
+          <p:cNvSpPr>
+            <a:spLocks noGrp="1"/>
+          </p:cNvSpPr>
+          <p:nvPr>
+            <p:ph type="ftr" sz="quarter" idx="3"/>
+          </p:nvPr>
+        </p:nvSpPr>
+        <p:spPr>
+          <a:xfrm>
+            <a:off x="3124200" y="6356350"/>
+            <a:ext cx="2895600" cy="365125"/>
+          </a:xfrm>
+          <a:prstGeom prst="rect">
+            <a:avLst/>
+          </a:prstGeom>
+        </p:spPr>
+        <p:txBody>
+          <a:bodyPr vert="horz" lIns="91440" tIns="45720" rIns="91440" bIns="45720" rtlCol="0" anchor="ctr"/>
+          <a:lstStyle>
+            <a:lvl1pPr algn="ctr">
+              <a:defRPr sz="1200">
+                <a:solidFill>
+                  <a:schemeClr val="tx1">
+                    <a:tint val="75000"/>
+                  </a:schemeClr>
+                </a:solidFill>
+              </a:defRPr>
+            </a:lvl1pPr>
+          </a:lstStyle>
+          <a:p>
+            <a:endParaRPr lang="en-US">
+              <a:solidFill>
+                <a:prstClr val="black">
+                  <a:tint val="75000"/>
+                </a:prstClr>
+              </a:solidFill>
+              <a:latin typeface="Calibri"/>
+            </a:endParaRPr>
+          </a:p>
+        </p:txBody>
+      </p:sp>
+      <p:sp>
+        <p:nvSpPr>
+          <p:cNvPr id="6" name="Slide Number Placeholder 5"/>
+          <p:cNvSpPr>
+            <a:spLocks noGrp="1"/>
+          </p:cNvSpPr>
+          <p:nvPr>
+            <p:ph type="sldNum" sz="quarter" idx="4"/>
+          </p:nvPr>
+        </p:nvSpPr>
+        <p:spPr>
+          <a:xfrm>
+            <a:off x="6553200" y="6356350"/>
+            <a:ext cx="2133600" cy="365125"/>
+          </a:xfrm>
+          <a:prstGeom prst="rect">
+            <a:avLst/>
+          </a:prstGeom>
+        </p:spPr>
+        <p:txBody>
+          <a:bodyPr vert="horz" lIns="91440" tIns="45720" rIns="91440" bIns="45720" rtlCol="0" anchor="ctr"/>
+          <a:lstStyle>
+            <a:lvl1pPr algn="r">
+              <a:defRPr sz="1200">
+                <a:solidFill>
+                  <a:schemeClr val="tx1">
+                    <a:tint val="75000"/>
+                  </a:schemeClr>
+                </a:solidFill>
+              </a:defRPr>
+            </a:lvl1pPr>
+          </a:lstStyle>
+          <a:p>
+            <a:fld id="{3B8E83EB-7D5A-4947-8E9F-CDD9CFCA5BC8}" type="slidenum">
+              <a:rPr lang="en-US" smtClean="0">
+                <a:solidFill>
+                  <a:prstClr val="black">
+                    <a:tint val="75000"/>
+                  </a:prstClr>
+                </a:solidFill>
+                <a:latin typeface="Calibri"/>
+              </a:rPr>
+              <a:pPr/>
+              <a:t>‹#›</a:t>
+            </a:fld>
+            <a:endParaRPr lang="en-US">
+              <a:solidFill>
+                <a:prstClr val="black">
+                  <a:tint val="75000"/>
+                </a:prstClr>
+              </a:solidFill>
+              <a:latin typeface="Calibri"/>
+            </a:endParaRPr>
+          </a:p>
+        </p:txBody>
+      </p:sp>
+    </p:spTree>
+    <p:extLst>
+      <p:ext uri="{BB962C8B-B14F-4D97-AF65-F5344CB8AC3E}">
+        <p14:creationId xmlns:p14="http://schemas.microsoft.com/office/powerpoint/2010/main" val="73919291"/>
+      </p:ext>
+    </p:extLst>
+  </p:cSld>
+  <p:clrMap bg1="lt1" tx1="dk1" bg2="lt2" tx2="dk2" accent1="accent1" accent2="accent2" accent3="accent3" accent4="accent4" accent5="accent5" accent6="accent6" hlink="hlink" folHlink="folHlink"/>
+  <p:sldLayoutIdLst>
+    <p:sldLayoutId id="2147483709" r:id="rId1"/>
+    <p:sldLayoutId id="2147483710" r:id="rId2"/>
+    <p:sldLayoutId id="2147483711" r:id="rId3"/>
+    <p:sldLayoutId id="2147483712" r:id="rId4"/>
+    <p:sldLayoutId id="2147483713" r:id="rId5"/>
+    <p:sldLayoutId id="2147483714" r:id="rId6"/>
+    <p:sldLayoutId id="2147483715" r:id="rId7"/>
+    <p:sldLayoutId id="2147483716" r:id="rId8"/>
+    <p:sldLayoutId id="2147483717" r:id="rId9"/>
+    <p:sldLayoutId id="2147483718" r:id="rId10"/>
+    <p:sldLayoutId id="2147483719" r:id="rId11"/>
+  </p:sldLayoutIdLst>
+  <p:txStyles>
+    <p:titleStyle>
+      <a:lvl1pPr algn="ctr" defTabSz="457200" rtl="0" eaLnBrk="1" latinLnBrk="0" hangingPunct="1">
+        <a:spcBef>
+          <a:spcPct val="0"/>
+        </a:spcBef>
+        <a:buNone/>
+        <a:defRPr sz="4400" kern="1200">
+          <a:solidFill>
+            <a:schemeClr val="tx1"/>
+          </a:solidFill>
+          <a:latin typeface="+mj-lt"/>
+          <a:ea typeface="+mj-ea"/>
+          <a:cs typeface="+mj-cs"/>
+        </a:defRPr>
+      </a:lvl1pPr>
+    </p:titleStyle>
+    <p:bodyStyle>
+      <a:lvl1pPr marL="342900" indent="-342900" algn="l" defTabSz="457200" rtl="0" eaLnBrk="1" latinLnBrk="0" hangingPunct="1">
+        <a:spcBef>
+          <a:spcPct val="20000"/>
+        </a:spcBef>
+        <a:buFont typeface="Arial"/>
+        <a:buChar char="•"/>
+        <a:defRPr sz="3200" kern="1200">
+          <a:solidFill>
+            <a:schemeClr val="tx1"/>
+          </a:solidFill>
+          <a:latin typeface="+mn-lt"/>
+          <a:ea typeface="+mn-ea"/>
+          <a:cs typeface="+mn-cs"/>
+        </a:defRPr>
+      </a:lvl1pPr>
+      <a:lvl2pPr marL="742950" indent="-285750" algn="l" defTabSz="457200" rtl="0" eaLnBrk="1" latinLnBrk="0" hangingPunct="1">
+        <a:spcBef>
+          <a:spcPct val="20000"/>
+        </a:spcBef>
+        <a:buFont typeface="Arial"/>
+        <a:buChar char="–"/>
+        <a:defRPr sz="2800" kern="1200">
+          <a:solidFill>
+            <a:schemeClr val="tx1"/>
+          </a:solidFill>
+          <a:latin typeface="+mn-lt"/>
+          <a:ea typeface="+mn-ea"/>
+          <a:cs typeface="+mn-cs"/>
+        </a:defRPr>
+      </a:lvl2pPr>
+      <a:lvl3pPr marL="1143000" indent="-228600" algn="l" defTabSz="457200" rtl="0" eaLnBrk="1" latinLnBrk="0" hangingPunct="1">
+        <a:spcBef>
+          <a:spcPct val="20000"/>
+        </a:spcBef>
+        <a:buFont typeface="Arial"/>
+        <a:buChar char="•"/>
+        <a:defRPr sz="2400" kern="1200">
+          <a:solidFill>
+            <a:schemeClr val="tx1"/>
+          </a:solidFill>
+          <a:latin typeface="+mn-lt"/>
+          <a:ea typeface="+mn-ea"/>
+          <a:cs typeface="+mn-cs"/>
+        </a:defRPr>
+      </a:lvl3pPr>
+      <a:lvl4pPr marL="1600200" indent="-228600" algn="l" defTabSz="457200" rtl="0" eaLnBrk="1" latinLnBrk="0" hangingPunct="1">
+        <a:spcBef>
+          <a:spcPct val="20000"/>
+        </a:spcBef>
+        <a:buFont typeface="Arial"/>
+        <a:buChar char="–"/>
+        <a:defRPr sz="2000" kern="1200">
+          <a:solidFill>
+            <a:schemeClr val="tx1"/>
+          </a:solidFill>
+          <a:latin typeface="+mn-lt"/>
+          <a:ea typeface="+mn-ea"/>
+          <a:cs typeface="+mn-cs"/>
+        </a:defRPr>
+      </a:lvl4pPr>
+      <a:lvl5pPr marL="2057400" indent="-228600" algn="l" defTabSz="457200" rtl="0" eaLnBrk="1" latinLnBrk="0" hangingPunct="1">
+        <a:spcBef>
+          <a:spcPct val="20000"/>
+        </a:spcBef>
+        <a:buFont typeface="Arial"/>
+        <a:buChar char="»"/>
+        <a:defRPr sz="2000" kern="1200">
+          <a:solidFill>
+            <a:schemeClr val="tx1"/>
+          </a:solidFill>
+          <a:latin typeface="+mn-lt"/>
+          <a:ea typeface="+mn-ea"/>
+          <a:cs typeface="+mn-cs"/>
+        </a:defRPr>
+      </a:lvl5pPr>
+      <a:lvl6pPr marL="2514600" indent="-228600" algn="l" defTabSz="457200" rtl="0" eaLnBrk="1" latinLnBrk="0" hangingPunct="1">
+        <a:spcBef>
+          <a:spcPct val="20000"/>
+        </a:spcBef>
+        <a:buFont typeface="Arial"/>
+        <a:buChar char="•"/>
+        <a:defRPr sz="2000" kern="1200">
+          <a:solidFill>
+            <a:schemeClr val="tx1"/>
+          </a:solidFill>
+          <a:latin typeface="+mn-lt"/>
+          <a:ea typeface="+mn-ea"/>
+          <a:cs typeface="+mn-cs"/>
+        </a:defRPr>
+      </a:lvl6pPr>
+      <a:lvl7pPr marL="2971800" indent="-228600" algn="l" defTabSz="457200" rtl="0" eaLnBrk="1" latinLnBrk="0" hangingPunct="1">
+        <a:spcBef>
+          <a:spcPct val="20000"/>
+        </a:spcBef>
+        <a:buFont typeface="Arial"/>
+        <a:buChar char="•"/>
+        <a:defRPr sz="2000" kern="1200">
+          <a:solidFill>
+            <a:schemeClr val="tx1"/>
+          </a:solidFill>
+          <a:latin typeface="+mn-lt"/>
+          <a:ea typeface="+mn-ea"/>
+          <a:cs typeface="+mn-cs"/>
+        </a:defRPr>
+      </a:lvl7pPr>
+      <a:lvl8pPr marL="3429000" indent="-228600" algn="l" defTabSz="457200" rtl="0" eaLnBrk="1" latinLnBrk="0" hangingPunct="1">
+        <a:spcBef>
+          <a:spcPct val="20000"/>
+        </a:spcBef>
+        <a:buFont typeface="Arial"/>
+        <a:buChar char="•"/>
+        <a:defRPr sz="2000" kern="1200">
+          <a:solidFill>
+            <a:schemeClr val="tx1"/>
+          </a:solidFill>
+          <a:latin typeface="+mn-lt"/>
+          <a:ea typeface="+mn-ea"/>
+          <a:cs typeface="+mn-cs"/>
+        </a:defRPr>
+      </a:lvl8pPr>
+      <a:lvl9pPr marL="3886200" indent="-228600" algn="l" defTabSz="457200" rtl="0" eaLnBrk="1" latinLnBrk="0" hangingPunct="1">
+        <a:spcBef>
+          <a:spcPct val="20000"/>
+        </a:spcBef>
+        <a:buFont typeface="Arial"/>
+        <a:buChar char="•"/>
+        <a:defRPr sz="2000" kern="1200">
+          <a:solidFill>
+            <a:schemeClr val="tx1"/>
+          </a:solidFill>
+          <a:latin typeface="+mn-lt"/>
+          <a:ea typeface="+mn-ea"/>
+          <a:cs typeface="+mn-cs"/>
+        </a:defRPr>
+      </a:lvl9pPr>
+    </p:bodyStyle>
+    <p:otherStyle>
+      <a:defPPr>
+        <a:defRPr lang="en-US"/>
+      </a:defPPr>
+      <a:lvl1pPr marL="0" algn="l" defTabSz="457200" rtl="0" eaLnBrk="1" latinLnBrk="0" hangingPunct="1">
+        <a:defRPr sz="1800" kern="1200">
+          <a:solidFill>
+            <a:schemeClr val="tx1"/>
+          </a:solidFill>
+          <a:latin typeface="+mn-lt"/>
+          <a:ea typeface="+mn-ea"/>
+          <a:cs typeface="+mn-cs"/>
+        </a:defRPr>
+      </a:lvl1pPr>
+      <a:lvl2pPr marL="457200" algn="l" defTabSz="457200" rtl="0" eaLnBrk="1" latinLnBrk="0" hangingPunct="1">
+        <a:defRPr sz="1800" kern="1200">
+          <a:solidFill>
+            <a:schemeClr val="tx1"/>
+          </a:solidFill>
+          <a:latin typeface="+mn-lt"/>
+          <a:ea typeface="+mn-ea"/>
+          <a:cs typeface="+mn-cs"/>
+        </a:defRPr>
+      </a:lvl2pPr>
+      <a:lvl3pPr marL="914400" algn="l" defTabSz="457200" rtl="0" eaLnBrk="1" latinLnBrk="0" hangingPunct="1">
+        <a:defRPr sz="1800" kern="1200">
+          <a:solidFill>
+            <a:schemeClr val="tx1"/>
+          </a:solidFill>
+          <a:latin typeface="+mn-lt"/>
+          <a:ea typeface="+mn-ea"/>
+          <a:cs typeface="+mn-cs"/>
+        </a:defRPr>
+      </a:lvl3pPr>
+      <a:lvl4pPr marL="1371600" algn="l" defTabSz="457200" rtl="0" eaLnBrk="1" latinLnBrk="0" hangingPunct="1">
+        <a:defRPr sz="1800" kern="1200">
+          <a:solidFill>
+            <a:schemeClr val="tx1"/>
+          </a:solidFill>
+          <a:latin typeface="+mn-lt"/>
+          <a:ea typeface="+mn-ea"/>
+          <a:cs typeface="+mn-cs"/>
+        </a:defRPr>
+      </a:lvl4pPr>
+      <a:lvl5pPr marL="1828800" algn="l" defTabSz="457200" rtl="0" eaLnBrk="1" latinLnBrk="0" hangingPunct="1">
+        <a:defRPr sz="1800" kern="1200">
+          <a:solidFill>
+            <a:schemeClr val="tx1"/>
+          </a:solidFill>
+          <a:latin typeface="+mn-lt"/>
+          <a:ea typeface="+mn-ea"/>
+          <a:cs typeface="+mn-cs"/>
+        </a:defRPr>
+      </a:lvl5pPr>
+      <a:lvl6pPr marL="2286000" algn="l" defTabSz="457200" rtl="0" eaLnBrk="1" latinLnBrk="0" hangingPunct="1">
+        <a:defRPr sz="1800" kern="1200">
+          <a:solidFill>
+            <a:schemeClr val="tx1"/>
+          </a:solidFill>
+          <a:latin typeface="+mn-lt"/>
+          <a:ea typeface="+mn-ea"/>
+          <a:cs typeface="+mn-cs"/>
+        </a:defRPr>
+      </a:lvl6pPr>
+      <a:lvl7pPr marL="2743200" algn="l" defTabSz="457200" rtl="0" eaLnBrk="1" latinLnBrk="0" hangingPunct="1">
+        <a:defRPr sz="1800" kern="1200">
+          <a:solidFill>
+            <a:schemeClr val="tx1"/>
+          </a:solidFill>
+          <a:latin typeface="+mn-lt"/>
+          <a:ea typeface="+mn-ea"/>
+          <a:cs typeface="+mn-cs"/>
+        </a:defRPr>
+      </a:lvl7pPr>
+      <a:lvl8pPr marL="3200400" algn="l" defTabSz="457200" rtl="0" eaLnBrk="1" latinLnBrk="0" hangingPunct="1">
+        <a:defRPr sz="1800" kern="1200">
+          <a:solidFill>
+            <a:schemeClr val="tx1"/>
+          </a:solidFill>
+          <a:latin typeface="+mn-lt"/>
+          <a:ea typeface="+mn-ea"/>
+          <a:cs typeface="+mn-cs"/>
+        </a:defRPr>
+      </a:lvl8pPr>
+      <a:lvl9pPr marL="3657600" algn="l" defTabSz="457200" rtl="0" eaLnBrk="1" latinLnBrk="0" hangingPunct="1">
+        <a:defRPr sz="1800" kern="1200">
+          <a:solidFill>
+            <a:schemeClr val="tx1"/>
+          </a:solidFill>
+          <a:latin typeface="+mn-lt"/>
+          <a:ea typeface="+mn-ea"/>
+          <a:cs typeface="+mn-cs"/>
+        </a:defRPr>
+      </a:lvl9pPr>
+    </p:otherStyle>
+  </p:txStyles>
+</p:sldMaster>
+</file>
+
 <file path=ppt/slides/slide1.xml><?xml version="1.0" encoding="utf-8"?>
 <p:sld xmlns:a="http://schemas.openxmlformats.org/drawingml/2006/main" xmlns:r="http://schemas.openxmlformats.org/officeDocument/2006/relationships" xmlns:p="http://schemas.openxmlformats.org/presentationml/2006/main">
   <p:cSld>
@@ -18663,10 +22081,62 @@
           </a:p>
         </p:txBody>
       </p:sp>
+      <p:pic>
+        <p:nvPicPr>
+          <p:cNvPr id="1026" name="Picture 2"/>
+          <p:cNvPicPr>
+            <a:picLocks noChangeAspect="1" noChangeArrowheads="1"/>
+          </p:cNvPicPr>
+          <p:nvPr/>
+        </p:nvPicPr>
+        <p:blipFill rotWithShape="1">
+          <a:blip r:embed="rId4">
+            <a:extLst>
+              <a:ext uri="{28A0092B-C50C-407E-A947-70E740481C1C}">
+                <a14:useLocalDpi xmlns:a14="http://schemas.microsoft.com/office/drawing/2010/main" val="0"/>
+              </a:ext>
+            </a:extLst>
+          </a:blip>
+          <a:srcRect l="12794" t="14203" r="13015" b="62126"/>
+          <a:stretch/>
+        </p:blipFill>
+        <p:spPr bwMode="auto">
+          <a:xfrm>
+            <a:off x="2006528" y="4762355"/>
+            <a:ext cx="5504329" cy="1363808"/>
+          </a:xfrm>
+          <a:prstGeom prst="rect">
+            <a:avLst/>
+          </a:prstGeom>
+          <a:noFill/>
+          <a:ln>
+            <a:noFill/>
+          </a:ln>
+          <a:extLst>
+            <a:ext uri="{909E8E84-426E-40dd-AFC4-6F175D3DCCD1}">
+              <a14:hiddenFill xmlns:a14="http://schemas.microsoft.com/office/drawing/2010/main">
+                <a:solidFill>
+                  <a:schemeClr val="accent1"/>
+                </a:solidFill>
+              </a14:hiddenFill>
+            </a:ext>
+            <a:ext uri="{91240B29-F687-4f45-9708-019B960494DF}">
+              <a14:hiddenLine xmlns:a14="http://schemas.microsoft.com/office/drawing/2010/main" w="9525">
+                <a:solidFill>
+                  <a:schemeClr val="tx1"/>
+                </a:solidFill>
+                <a:miter lim="800000"/>
+                <a:headEnd/>
+                <a:tailEnd/>
+              </a14:hiddenLine>
+            </a:ext>
+          </a:extLst>
+        </p:spPr>
+      </p:pic>
     </p:spTree>
     <p:extLst>
       <p:ext uri="{BB962C8B-B14F-4D97-AF65-F5344CB8AC3E}">
-        <p14:creationId xmlns:p14="http://schemas.microsoft.com/office/powerpoint/2010/main" val="1066919663"/>
+        <p14:creationId xmlns:p14="http://schemas.microsoft.com/office/powerpoint/2010/main" val="2729108390"/>
       </p:ext>
     </p:extLst>
   </p:cSld>
@@ -19580,6 +23050,173 @@
         </p:nvSpPr>
         <p:spPr/>
         <p:txBody>
+          <a:bodyPr>
+            <a:normAutofit/>
+          </a:bodyPr>
+          <a:lstStyle/>
+          <a:p>
+            <a:r>
+              <a:rPr lang="en-US" dirty="0" smtClean="0">
+                <a:solidFill>
+                  <a:schemeClr val="tx2">
+                    <a:lumMod val="50000"/>
+                  </a:schemeClr>
+                </a:solidFill>
+                <a:effectLst>
+                  <a:outerShdw blurRad="50800" dist="38100" dir="2700000" algn="tl" rotWithShape="0">
+                    <a:schemeClr val="bg1">
+                      <a:alpha val="40000"/>
+                    </a:schemeClr>
+                  </a:outerShdw>
+                </a:effectLst>
+                <a:latin typeface="Lucida Sans Unicode"/>
+                <a:cs typeface="Lucida Sans Unicode"/>
+              </a:rPr>
+              <a:t>What is </a:t>
+            </a:r>
+            <a:r>
+              <a:rPr lang="en-US" dirty="0" err="1" smtClean="0">
+                <a:solidFill>
+                  <a:schemeClr val="tx2">
+                    <a:lumMod val="50000"/>
+                  </a:schemeClr>
+                </a:solidFill>
+                <a:effectLst>
+                  <a:outerShdw blurRad="50800" dist="38100" dir="2700000" algn="tl" rotWithShape="0">
+                    <a:schemeClr val="bg1">
+                      <a:alpha val="40000"/>
+                    </a:schemeClr>
+                  </a:outerShdw>
+                </a:effectLst>
+                <a:latin typeface="Lucida Sans Unicode"/>
+                <a:cs typeface="Lucida Sans Unicode"/>
+              </a:rPr>
+              <a:t>Git</a:t>
+            </a:r>
+            <a:r>
+              <a:rPr lang="en-US" dirty="0" smtClean="0">
+                <a:solidFill>
+                  <a:schemeClr val="tx2">
+                    <a:lumMod val="50000"/>
+                  </a:schemeClr>
+                </a:solidFill>
+                <a:effectLst>
+                  <a:outerShdw blurRad="50800" dist="38100" dir="2700000" algn="tl" rotWithShape="0">
+                    <a:schemeClr val="bg1">
+                      <a:alpha val="40000"/>
+                    </a:schemeClr>
+                  </a:outerShdw>
+                </a:effectLst>
+                <a:latin typeface="Lucida Sans Unicode"/>
+                <a:cs typeface="Lucida Sans Unicode"/>
+              </a:rPr>
+              <a:t> workflow?</a:t>
+            </a:r>
+            <a:endParaRPr lang="en-US" dirty="0">
+              <a:solidFill>
+                <a:schemeClr val="tx2">
+                  <a:lumMod val="50000"/>
+                </a:schemeClr>
+              </a:solidFill>
+              <a:effectLst>
+                <a:outerShdw blurRad="50800" dist="38100" dir="2700000" algn="tl" rotWithShape="0">
+                  <a:schemeClr val="bg1">
+                    <a:alpha val="40000"/>
+                  </a:schemeClr>
+                </a:outerShdw>
+              </a:effectLst>
+              <a:latin typeface="Lucida Sans Unicode"/>
+              <a:cs typeface="Lucida Sans Unicode"/>
+            </a:endParaRPr>
+          </a:p>
+        </p:txBody>
+      </p:sp>
+      <p:pic>
+        <p:nvPicPr>
+          <p:cNvPr id="3" name="Picture 2"/>
+          <p:cNvPicPr>
+            <a:picLocks noChangeAspect="1"/>
+          </p:cNvPicPr>
+          <p:nvPr/>
+        </p:nvPicPr>
+        <p:blipFill>
+          <a:blip r:embed="rId4"/>
+          <a:stretch>
+            <a:fillRect/>
+          </a:stretch>
+        </p:blipFill>
+        <p:spPr>
+          <a:xfrm>
+            <a:off x="673100" y="1727200"/>
+            <a:ext cx="7797800" cy="3403600"/>
+          </a:xfrm>
+          <a:prstGeom prst="rect">
+            <a:avLst/>
+          </a:prstGeom>
+        </p:spPr>
+      </p:pic>
+    </p:spTree>
+    <p:extLst>
+      <p:ext uri="{BB962C8B-B14F-4D97-AF65-F5344CB8AC3E}">
+        <p14:creationId xmlns:p14="http://schemas.microsoft.com/office/powerpoint/2010/main" val="3377451234"/>
+      </p:ext>
+    </p:extLst>
+  </p:cSld>
+  <p:clrMapOvr>
+    <a:masterClrMapping/>
+  </p:clrMapOvr>
+  <p:timing>
+    <p:tnLst>
+      <p:par>
+        <p:cTn xmlns:p14="http://schemas.microsoft.com/office/powerpoint/2010/main" id="1" dur="indefinite" restart="never" nodeType="tmRoot"/>
+      </p:par>
+    </p:tnLst>
+  </p:timing>
+</p:sld>
+</file>
+
+<file path=ppt/slides/slide7.xml><?xml version="1.0" encoding="utf-8"?>
+<p:sld xmlns:a="http://schemas.openxmlformats.org/drawingml/2006/main" xmlns:r="http://schemas.openxmlformats.org/officeDocument/2006/relationships" xmlns:p="http://schemas.openxmlformats.org/presentationml/2006/main">
+  <p:cSld>
+    <p:bg>
+      <p:bgPr>
+        <a:blipFill rotWithShape="1">
+          <a:blip r:embed="rId3">
+            <a:alphaModFix amt="60000"/>
+          </a:blip>
+          <a:stretch>
+            <a:fillRect/>
+          </a:stretch>
+        </a:blipFill>
+        <a:effectLst/>
+      </p:bgPr>
+    </p:bg>
+    <p:spTree>
+      <p:nvGrpSpPr>
+        <p:cNvPr id="1" name=""/>
+        <p:cNvGrpSpPr/>
+        <p:nvPr/>
+      </p:nvGrpSpPr>
+      <p:grpSpPr>
+        <a:xfrm>
+          <a:off x="0" y="0"/>
+          <a:ext cx="0" cy="0"/>
+          <a:chOff x="0" y="0"/>
+          <a:chExt cx="0" cy="0"/>
+        </a:xfrm>
+      </p:grpSpPr>
+      <p:sp>
+        <p:nvSpPr>
+          <p:cNvPr id="2" name="Title 1"/>
+          <p:cNvSpPr>
+            <a:spLocks noGrp="1"/>
+          </p:cNvSpPr>
+          <p:nvPr>
+            <p:ph type="title"/>
+          </p:nvPr>
+        </p:nvSpPr>
+        <p:spPr/>
+        <p:txBody>
           <a:bodyPr/>
           <a:lstStyle/>
           <a:p>
@@ -19671,7 +23308,7 @@
 </p:sld>
 </file>
 
-<file path=ppt/slides/slide7.xml><?xml version="1.0" encoding="utf-8"?>
+<file path=ppt/slides/slide8.xml><?xml version="1.0" encoding="utf-8"?>
 <p:sld xmlns:a="http://schemas.openxmlformats.org/drawingml/2006/main" xmlns:r="http://schemas.openxmlformats.org/officeDocument/2006/relationships" xmlns:p="http://schemas.openxmlformats.org/presentationml/2006/main">
   <p:cSld>
     <p:bg>
@@ -19854,139 +23491,6 @@
     <p:extLst>
       <p:ext uri="{BB962C8B-B14F-4D97-AF65-F5344CB8AC3E}">
         <p14:creationId xmlns:p14="http://schemas.microsoft.com/office/powerpoint/2010/main" val="2819552462"/>
-      </p:ext>
-    </p:extLst>
-  </p:cSld>
-  <p:clrMapOvr>
-    <a:masterClrMapping/>
-  </p:clrMapOvr>
-  <p:timing>
-    <p:tnLst>
-      <p:par>
-        <p:cTn xmlns:p14="http://schemas.microsoft.com/office/powerpoint/2010/main" id="1" dur="indefinite" restart="never" nodeType="tmRoot"/>
-      </p:par>
-    </p:tnLst>
-  </p:timing>
-</p:sld>
-</file>
-
-<file path=ppt/slides/slide8.xml><?xml version="1.0" encoding="utf-8"?>
-<p:sld xmlns:a="http://schemas.openxmlformats.org/drawingml/2006/main" xmlns:r="http://schemas.openxmlformats.org/officeDocument/2006/relationships" xmlns:p="http://schemas.openxmlformats.org/presentationml/2006/main">
-  <p:cSld>
-    <p:bg>
-      <p:bgPr>
-        <a:blipFill rotWithShape="1">
-          <a:blip r:embed="rId3">
-            <a:alphaModFix amt="60000"/>
-          </a:blip>
-          <a:stretch>
-            <a:fillRect/>
-          </a:stretch>
-        </a:blipFill>
-        <a:effectLst/>
-      </p:bgPr>
-    </p:bg>
-    <p:spTree>
-      <p:nvGrpSpPr>
-        <p:cNvPr id="1" name=""/>
-        <p:cNvGrpSpPr/>
-        <p:nvPr/>
-      </p:nvGrpSpPr>
-      <p:grpSpPr>
-        <a:xfrm>
-          <a:off x="0" y="0"/>
-          <a:ext cx="0" cy="0"/>
-          <a:chOff x="0" y="0"/>
-          <a:chExt cx="0" cy="0"/>
-        </a:xfrm>
-      </p:grpSpPr>
-      <p:sp>
-        <p:nvSpPr>
-          <p:cNvPr id="2" name="Title 1"/>
-          <p:cNvSpPr>
-            <a:spLocks noGrp="1"/>
-          </p:cNvSpPr>
-          <p:nvPr>
-            <p:ph type="title"/>
-          </p:nvPr>
-        </p:nvSpPr>
-        <p:spPr/>
-        <p:txBody>
-          <a:bodyPr/>
-          <a:lstStyle/>
-          <a:p>
-            <a:r>
-              <a:rPr lang="en-US" dirty="0" smtClean="0">
-                <a:solidFill>
-                  <a:schemeClr val="tx2">
-                    <a:lumMod val="50000"/>
-                  </a:schemeClr>
-                </a:solidFill>
-                <a:effectLst>
-                  <a:outerShdw blurRad="50800" dist="38100" dir="2700000" algn="tl" rotWithShape="0">
-                    <a:schemeClr val="bg1">
-                      <a:alpha val="40000"/>
-                    </a:schemeClr>
-                  </a:outerShdw>
-                </a:effectLst>
-                <a:latin typeface="Lucida Sans Unicode"/>
-                <a:cs typeface="Lucida Sans Unicode"/>
-              </a:rPr>
-              <a:t>Ready for a new start</a:t>
-            </a:r>
-            <a:endParaRPr lang="en-US" dirty="0">
-              <a:solidFill>
-                <a:schemeClr val="tx2">
-                  <a:lumMod val="50000"/>
-                </a:schemeClr>
-              </a:solidFill>
-              <a:effectLst>
-                <a:outerShdw blurRad="50800" dist="38100" dir="2700000" algn="tl" rotWithShape="0">
-                  <a:schemeClr val="bg1">
-                    <a:alpha val="40000"/>
-                  </a:schemeClr>
-                </a:outerShdw>
-              </a:effectLst>
-              <a:latin typeface="Lucida Sans Unicode"/>
-              <a:cs typeface="Lucida Sans Unicode"/>
-            </a:endParaRPr>
-          </a:p>
-        </p:txBody>
-      </p:sp>
-      <p:pic>
-        <p:nvPicPr>
-          <p:cNvPr id="4" name="Picture 3" descr="End_of_Beginning.jpg"/>
-          <p:cNvPicPr>
-            <a:picLocks noChangeAspect="1"/>
-          </p:cNvPicPr>
-          <p:nvPr/>
-        </p:nvPicPr>
-        <p:blipFill>
-          <a:blip r:embed="rId4">
-            <a:extLst>
-              <a:ext uri="{28A0092B-C50C-407E-A947-70E740481C1C}">
-                <a14:useLocalDpi xmlns:a14="http://schemas.microsoft.com/office/drawing/2010/main" val="0"/>
-              </a:ext>
-            </a:extLst>
-          </a:blip>
-          <a:stretch>
-            <a:fillRect/>
-          </a:stretch>
-        </p:blipFill>
-        <p:spPr>
-          <a:xfrm>
-            <a:off x="1397000" y="1609896"/>
-            <a:ext cx="6350000" cy="4229100"/>
-          </a:xfrm>
-          <a:prstGeom prst="rect">
-            <a:avLst/>
-          </a:prstGeom>
-        </p:spPr>
-      </p:pic>
-    </p:spTree>
-    <p:extLst>
-      <p:ext uri="{BB962C8B-B14F-4D97-AF65-F5344CB8AC3E}">
-        <p14:creationId xmlns:p14="http://schemas.microsoft.com/office/powerpoint/2010/main" val="544346336"/>
       </p:ext>
     </p:extLst>
   </p:cSld>
@@ -20065,7 +23569,7 @@
                 <a:latin typeface="Lucida Sans Unicode"/>
                 <a:cs typeface="Lucida Sans Unicode"/>
               </a:rPr>
-              <a:t>Annexes</a:t>
+              <a:t>Ready for a new start</a:t>
             </a:r>
             <a:endParaRPr lang="en-US" dirty="0">
               <a:solidFill>
@@ -20086,418 +23590,15 @@
           </a:p>
         </p:txBody>
       </p:sp>
-      <p:sp>
-        <p:nvSpPr>
-          <p:cNvPr id="3" name="Content Placeholder 2"/>
-          <p:cNvSpPr>
-            <a:spLocks noGrp="1"/>
-          </p:cNvSpPr>
-          <p:nvPr>
-            <p:ph idx="1"/>
-          </p:nvPr>
-        </p:nvSpPr>
-        <p:spPr/>
-        <p:txBody>
-          <a:bodyPr/>
-          <a:lstStyle/>
-          <a:p>
-            <a:r>
-              <a:rPr lang="en-GB" dirty="0">
-                <a:solidFill>
-                  <a:schemeClr val="tx2">
-                    <a:lumMod val="50000"/>
-                  </a:schemeClr>
-                </a:solidFill>
-                <a:effectLst>
-                  <a:outerShdw blurRad="50800" dist="38100" dir="2700000" algn="tl" rotWithShape="0">
-                    <a:schemeClr val="bg1">
-                      <a:alpha val="40000"/>
-                    </a:schemeClr>
-                  </a:outerShdw>
-                </a:effectLst>
-                <a:latin typeface="Lucida Sans Unicode"/>
-                <a:cs typeface="Lucida Sans Unicode"/>
-              </a:rPr>
-              <a:t>Configuring git to use SSH</a:t>
-            </a:r>
-            <a:r>
-              <a:rPr lang="en-GB" dirty="0" smtClean="0">
-                <a:solidFill>
-                  <a:schemeClr val="tx2">
-                    <a:lumMod val="50000"/>
-                  </a:schemeClr>
-                </a:solidFill>
-                <a:effectLst>
-                  <a:outerShdw blurRad="50800" dist="38100" dir="2700000" algn="tl" rotWithShape="0">
-                    <a:schemeClr val="bg1">
-                      <a:alpha val="40000"/>
-                    </a:schemeClr>
-                  </a:outerShdw>
-                </a:effectLst>
-                <a:latin typeface="Lucida Sans Unicode"/>
-                <a:cs typeface="Lucida Sans Unicode"/>
-              </a:rPr>
-              <a:t>:</a:t>
-            </a:r>
-          </a:p>
-          <a:p>
-            <a:pPr lvl="1"/>
-            <a:r>
-              <a:rPr lang="en-GB" dirty="0" smtClean="0">
-                <a:solidFill>
-                  <a:schemeClr val="tx2">
-                    <a:lumMod val="50000"/>
-                  </a:schemeClr>
-                </a:solidFill>
-                <a:effectLst>
-                  <a:outerShdw blurRad="50800" dist="38100" dir="2700000" algn="tl" rotWithShape="0">
-                    <a:schemeClr val="bg1">
-                      <a:alpha val="40000"/>
-                    </a:schemeClr>
-                  </a:outerShdw>
-                </a:effectLst>
-                <a:latin typeface="Lucida Sans Unicode"/>
-                <a:cs typeface="Lucida Sans Unicode"/>
-              </a:rPr>
-              <a:t>Directory: </a:t>
-            </a:r>
-            <a:r>
-              <a:rPr lang="en-GB" i="1" dirty="0" smtClean="0">
-                <a:solidFill>
-                  <a:schemeClr val="tx2">
-                    <a:lumMod val="50000"/>
-                  </a:schemeClr>
-                </a:solidFill>
-                <a:effectLst>
-                  <a:outerShdw blurRad="50800" dist="38100" dir="2700000" algn="tl" rotWithShape="0">
-                    <a:schemeClr val="bg1">
-                      <a:alpha val="40000"/>
-                    </a:schemeClr>
-                  </a:outerShdw>
-                </a:effectLst>
-                <a:latin typeface="Lucida Sans Unicode"/>
-                <a:cs typeface="Lucida Sans Unicode"/>
-              </a:rPr>
-              <a:t>{USER_HOME}/.</a:t>
-            </a:r>
-            <a:r>
-              <a:rPr lang="en-GB" i="1" dirty="0" err="1" smtClean="0">
-                <a:solidFill>
-                  <a:schemeClr val="tx2">
-                    <a:lumMod val="50000"/>
-                  </a:schemeClr>
-                </a:solidFill>
-                <a:effectLst>
-                  <a:outerShdw blurRad="50800" dist="38100" dir="2700000" algn="tl" rotWithShape="0">
-                    <a:schemeClr val="bg1">
-                      <a:alpha val="40000"/>
-                    </a:schemeClr>
-                  </a:outerShdw>
-                </a:effectLst>
-                <a:latin typeface="Lucida Sans Unicode"/>
-                <a:cs typeface="Lucida Sans Unicode"/>
-              </a:rPr>
-              <a:t>ssh</a:t>
-            </a:r>
-            <a:r>
-              <a:rPr lang="en-GB" i="1" dirty="0" smtClean="0">
-                <a:solidFill>
-                  <a:schemeClr val="tx2">
-                    <a:lumMod val="50000"/>
-                  </a:schemeClr>
-                </a:solidFill>
-                <a:effectLst>
-                  <a:outerShdw blurRad="50800" dist="38100" dir="2700000" algn="tl" rotWithShape="0">
-                    <a:schemeClr val="bg1">
-                      <a:alpha val="40000"/>
-                    </a:schemeClr>
-                  </a:outerShdw>
-                </a:effectLst>
-                <a:latin typeface="Lucida Sans Unicode"/>
-                <a:cs typeface="Lucida Sans Unicode"/>
-              </a:rPr>
-              <a:t>/</a:t>
-            </a:r>
-            <a:endParaRPr lang="en-GB" i="1" dirty="0">
-              <a:solidFill>
-                <a:schemeClr val="tx2">
-                  <a:lumMod val="50000"/>
-                </a:schemeClr>
-              </a:solidFill>
-              <a:effectLst>
-                <a:outerShdw blurRad="50800" dist="38100" dir="2700000" algn="tl" rotWithShape="0">
-                  <a:schemeClr val="bg1">
-                    <a:alpha val="40000"/>
-                  </a:schemeClr>
-                </a:outerShdw>
-              </a:effectLst>
-              <a:latin typeface="Lucida Sans Unicode"/>
-              <a:cs typeface="Lucida Sans Unicode"/>
-            </a:endParaRPr>
-          </a:p>
-          <a:p>
-            <a:pPr lvl="1"/>
-            <a:r>
-              <a:rPr lang="en-GB" dirty="0" smtClean="0">
-                <a:solidFill>
-                  <a:schemeClr val="tx2">
-                    <a:lumMod val="50000"/>
-                  </a:schemeClr>
-                </a:solidFill>
-                <a:effectLst>
-                  <a:outerShdw blurRad="50800" dist="38100" dir="2700000" algn="tl" rotWithShape="0">
-                    <a:schemeClr val="bg1">
-                      <a:alpha val="40000"/>
-                    </a:schemeClr>
-                  </a:outerShdw>
-                </a:effectLst>
-                <a:latin typeface="Lucida Sans Unicode"/>
-                <a:cs typeface="Lucida Sans Unicode"/>
-              </a:rPr>
-              <a:t>Generate key pair: </a:t>
-            </a:r>
-            <a:r>
-              <a:rPr lang="en-GB" i="1" dirty="0" err="1" smtClean="0">
-                <a:solidFill>
-                  <a:schemeClr val="tx2">
-                    <a:lumMod val="50000"/>
-                  </a:schemeClr>
-                </a:solidFill>
-                <a:effectLst>
-                  <a:outerShdw blurRad="50800" dist="38100" dir="2700000" algn="tl" rotWithShape="0">
-                    <a:schemeClr val="bg1">
-                      <a:alpha val="40000"/>
-                    </a:schemeClr>
-                  </a:outerShdw>
-                </a:effectLst>
-                <a:latin typeface="Lucida Sans Unicode"/>
-                <a:cs typeface="Lucida Sans Unicode"/>
-              </a:rPr>
-              <a:t>ssh-keygen</a:t>
-            </a:r>
-            <a:r>
-              <a:rPr lang="en-GB" i="1" dirty="0" smtClean="0">
-                <a:solidFill>
-                  <a:schemeClr val="tx2">
-                    <a:lumMod val="50000"/>
-                  </a:schemeClr>
-                </a:solidFill>
-                <a:effectLst>
-                  <a:outerShdw blurRad="50800" dist="38100" dir="2700000" algn="tl" rotWithShape="0">
-                    <a:schemeClr val="bg1">
-                      <a:alpha val="40000"/>
-                    </a:schemeClr>
-                  </a:outerShdw>
-                </a:effectLst>
-                <a:latin typeface="Lucida Sans Unicode"/>
-                <a:cs typeface="Lucida Sans Unicode"/>
-              </a:rPr>
-              <a:t> </a:t>
-            </a:r>
-            <a:r>
-              <a:rPr lang="en-GB" i="1" dirty="0">
-                <a:solidFill>
-                  <a:schemeClr val="tx2">
-                    <a:lumMod val="50000"/>
-                  </a:schemeClr>
-                </a:solidFill>
-                <a:effectLst>
-                  <a:outerShdw blurRad="50800" dist="38100" dir="2700000" algn="tl" rotWithShape="0">
-                    <a:schemeClr val="bg1">
-                      <a:alpha val="40000"/>
-                    </a:schemeClr>
-                  </a:outerShdw>
-                </a:effectLst>
-                <a:latin typeface="Lucida Sans Unicode"/>
-                <a:cs typeface="Lucida Sans Unicode"/>
-              </a:rPr>
-              <a:t>-t </a:t>
-            </a:r>
-            <a:r>
-              <a:rPr lang="en-GB" i="1" dirty="0" err="1" smtClean="0">
-                <a:solidFill>
-                  <a:schemeClr val="tx2">
-                    <a:lumMod val="50000"/>
-                  </a:schemeClr>
-                </a:solidFill>
-                <a:effectLst>
-                  <a:outerShdw blurRad="50800" dist="38100" dir="2700000" algn="tl" rotWithShape="0">
-                    <a:schemeClr val="bg1">
-                      <a:alpha val="40000"/>
-                    </a:schemeClr>
-                  </a:outerShdw>
-                </a:effectLst>
-                <a:latin typeface="Lucida Sans Unicode"/>
-                <a:cs typeface="Lucida Sans Unicode"/>
-              </a:rPr>
-              <a:t>rsa</a:t>
-            </a:r>
-            <a:endParaRPr lang="en-GB" i="1" dirty="0" smtClean="0">
-              <a:solidFill>
-                <a:schemeClr val="tx2">
-                  <a:lumMod val="50000"/>
-                </a:schemeClr>
-              </a:solidFill>
-              <a:effectLst>
-                <a:outerShdw blurRad="50800" dist="38100" dir="2700000" algn="tl" rotWithShape="0">
-                  <a:schemeClr val="bg1">
-                    <a:alpha val="40000"/>
-                  </a:schemeClr>
-                </a:outerShdw>
-              </a:effectLst>
-              <a:latin typeface="Lucida Sans Unicode"/>
-              <a:cs typeface="Lucida Sans Unicode"/>
-            </a:endParaRPr>
-          </a:p>
-          <a:p>
-            <a:pPr lvl="1"/>
-            <a:r>
-              <a:rPr lang="en-GB" dirty="0" smtClean="0">
-                <a:solidFill>
-                  <a:schemeClr val="tx2">
-                    <a:lumMod val="50000"/>
-                  </a:schemeClr>
-                </a:solidFill>
-                <a:effectLst>
-                  <a:outerShdw blurRad="50800" dist="38100" dir="2700000" algn="tl" rotWithShape="0">
-                    <a:schemeClr val="bg1">
-                      <a:alpha val="40000"/>
-                    </a:schemeClr>
-                  </a:outerShdw>
-                </a:effectLst>
-                <a:latin typeface="Lucida Sans Unicode"/>
-                <a:cs typeface="Lucida Sans Unicode"/>
-              </a:rPr>
-              <a:t>Edit public key: </a:t>
-            </a:r>
-            <a:r>
-              <a:rPr lang="en-GB" i="1" dirty="0" smtClean="0">
-                <a:solidFill>
-                  <a:schemeClr val="tx2">
-                    <a:lumMod val="50000"/>
-                  </a:schemeClr>
-                </a:solidFill>
-                <a:effectLst>
-                  <a:outerShdw blurRad="50800" dist="38100" dir="2700000" algn="tl" rotWithShape="0">
-                    <a:schemeClr val="bg1">
-                      <a:alpha val="40000"/>
-                    </a:schemeClr>
-                  </a:outerShdw>
-                </a:effectLst>
-                <a:latin typeface="Lucida Sans Unicode"/>
-                <a:cs typeface="Lucida Sans Unicode"/>
-              </a:rPr>
-              <a:t>cat id_rsa.pub</a:t>
-            </a:r>
-            <a:endParaRPr lang="en-GB" dirty="0" smtClean="0">
-              <a:solidFill>
-                <a:schemeClr val="tx2">
-                  <a:lumMod val="50000"/>
-                </a:schemeClr>
-              </a:solidFill>
-              <a:effectLst>
-                <a:outerShdw blurRad="50800" dist="38100" dir="2700000" algn="tl" rotWithShape="0">
-                  <a:schemeClr val="bg1">
-                    <a:alpha val="40000"/>
-                  </a:schemeClr>
-                </a:outerShdw>
-              </a:effectLst>
-              <a:latin typeface="Lucida Sans Unicode"/>
-              <a:cs typeface="Lucida Sans Unicode"/>
-            </a:endParaRPr>
-          </a:p>
-          <a:p>
-            <a:pPr lvl="1">
-              <a:buFontTx/>
-              <a:buChar char="-"/>
-            </a:pPr>
-            <a:r>
-              <a:rPr lang="en-US" dirty="0" smtClean="0">
-                <a:solidFill>
-                  <a:schemeClr val="tx2">
-                    <a:lumMod val="50000"/>
-                  </a:schemeClr>
-                </a:solidFill>
-                <a:effectLst>
-                  <a:outerShdw blurRad="50800" dist="38100" dir="2700000" algn="tl" rotWithShape="0">
-                    <a:schemeClr val="bg1">
-                      <a:alpha val="40000"/>
-                    </a:schemeClr>
-                  </a:outerShdw>
-                </a:effectLst>
-                <a:latin typeface="Lucida Sans Unicode"/>
-                <a:cs typeface="Lucida Sans Unicode"/>
-              </a:rPr>
-              <a:t>Copy the content to your profile on </a:t>
-            </a:r>
-            <a:r>
-              <a:rPr lang="en-US" dirty="0" err="1" smtClean="0">
-                <a:solidFill>
-                  <a:schemeClr val="tx2">
-                    <a:lumMod val="50000"/>
-                  </a:schemeClr>
-                </a:solidFill>
-                <a:effectLst>
-                  <a:outerShdw blurRad="50800" dist="38100" dir="2700000" algn="tl" rotWithShape="0">
-                    <a:schemeClr val="bg1">
-                      <a:alpha val="40000"/>
-                    </a:schemeClr>
-                  </a:outerShdw>
-                </a:effectLst>
-                <a:latin typeface="Lucida Sans Unicode"/>
-                <a:cs typeface="Lucida Sans Unicode"/>
-              </a:rPr>
-              <a:t>GitHub</a:t>
-            </a:r>
-            <a:endParaRPr lang="en-US" dirty="0">
-              <a:solidFill>
-                <a:schemeClr val="tx2">
-                  <a:lumMod val="50000"/>
-                </a:schemeClr>
-              </a:solidFill>
-              <a:effectLst>
-                <a:outerShdw blurRad="50800" dist="38100" dir="2700000" algn="tl" rotWithShape="0">
-                  <a:schemeClr val="bg1">
-                    <a:alpha val="40000"/>
-                  </a:schemeClr>
-                </a:outerShdw>
-              </a:effectLst>
-              <a:latin typeface="Lucida Sans Unicode"/>
-              <a:cs typeface="Lucida Sans Unicode"/>
-            </a:endParaRPr>
-          </a:p>
-          <a:p>
-            <a:pPr marL="457200" lvl="1" indent="0">
-              <a:buNone/>
-            </a:pPr>
-            <a:endParaRPr lang="en-US" dirty="0">
-              <a:solidFill>
-                <a:schemeClr val="tx2">
-                  <a:lumMod val="50000"/>
-                </a:schemeClr>
-              </a:solidFill>
-              <a:effectLst>
-                <a:outerShdw blurRad="50800" dist="38100" dir="2700000" algn="tl" rotWithShape="0">
-                  <a:schemeClr val="bg1">
-                    <a:alpha val="40000"/>
-                  </a:schemeClr>
-                </a:outerShdw>
-              </a:effectLst>
-              <a:latin typeface="Lucida Sans Unicode"/>
-              <a:cs typeface="Lucida Sans Unicode"/>
-            </a:endParaRPr>
-          </a:p>
-        </p:txBody>
-      </p:sp>
       <p:pic>
         <p:nvPicPr>
-          <p:cNvPr id="1026" name="Picture 2"/>
+          <p:cNvPr id="4" name="Picture 3" descr="End_of_Beginning.jpg"/>
           <p:cNvPicPr>
-            <a:picLocks noChangeAspect="1" noChangeArrowheads="1"/>
+            <a:picLocks noChangeAspect="1"/>
           </p:cNvPicPr>
           <p:nvPr/>
         </p:nvPicPr>
-        <p:blipFill rotWithShape="1">
+        <p:blipFill>
           <a:blip r:embed="rId4">
             <a:extLst>
               <a:ext uri="{28A0092B-C50C-407E-A947-70E740481C1C}">
@@ -20505,46 +23606,24 @@
               </a:ext>
             </a:extLst>
           </a:blip>
-          <a:srcRect l="12794" t="14203" r="13015" b="62126"/>
-          <a:stretch/>
+          <a:stretch>
+            <a:fillRect/>
+          </a:stretch>
         </p:blipFill>
-        <p:spPr bwMode="auto">
+        <p:spPr>
           <a:xfrm>
-            <a:off x="2006528" y="4762355"/>
-            <a:ext cx="5504329" cy="1363808"/>
+            <a:off x="1397000" y="1609896"/>
+            <a:ext cx="6350000" cy="4229100"/>
           </a:xfrm>
           <a:prstGeom prst="rect">
             <a:avLst/>
           </a:prstGeom>
-          <a:noFill/>
-          <a:ln>
-            <a:noFill/>
-          </a:ln>
-          <a:extLst>
-            <a:ext uri="{909E8E84-426E-40dd-AFC4-6F175D3DCCD1}">
-              <a14:hiddenFill xmlns:a14="http://schemas.microsoft.com/office/drawing/2010/main">
-                <a:solidFill>
-                  <a:schemeClr val="accent1"/>
-                </a:solidFill>
-              </a14:hiddenFill>
-            </a:ext>
-            <a:ext uri="{91240B29-F687-4f45-9708-019B960494DF}">
-              <a14:hiddenLine xmlns:a14="http://schemas.microsoft.com/office/drawing/2010/main" w="9525">
-                <a:solidFill>
-                  <a:schemeClr val="tx1"/>
-                </a:solidFill>
-                <a:miter lim="800000"/>
-                <a:headEnd/>
-                <a:tailEnd/>
-              </a14:hiddenLine>
-            </a:ext>
-          </a:extLst>
         </p:spPr>
       </p:pic>
     </p:spTree>
     <p:extLst>
       <p:ext uri="{BB962C8B-B14F-4D97-AF65-F5344CB8AC3E}">
-        <p14:creationId xmlns:p14="http://schemas.microsoft.com/office/powerpoint/2010/main" val="2729108390"/>
+        <p14:creationId xmlns:p14="http://schemas.microsoft.com/office/powerpoint/2010/main" val="544346336"/>
       </p:ext>
     </p:extLst>
   </p:cSld>
@@ -22162,6 +25241,326 @@
 </file>
 
 <file path=ppt/theme/theme6.xml><?xml version="1.0" encoding="utf-8"?>
+<a:theme xmlns:a="http://schemas.openxmlformats.org/drawingml/2006/main" name="5_Office Theme">
+  <a:themeElements>
+    <a:clrScheme name="Office">
+      <a:dk1>
+        <a:sysClr val="windowText" lastClr="000000"/>
+      </a:dk1>
+      <a:lt1>
+        <a:sysClr val="window" lastClr="FFFFFF"/>
+      </a:lt1>
+      <a:dk2>
+        <a:srgbClr val="1F497D"/>
+      </a:dk2>
+      <a:lt2>
+        <a:srgbClr val="EEECE1"/>
+      </a:lt2>
+      <a:accent1>
+        <a:srgbClr val="4F81BD"/>
+      </a:accent1>
+      <a:accent2>
+        <a:srgbClr val="C0504D"/>
+      </a:accent2>
+      <a:accent3>
+        <a:srgbClr val="9BBB59"/>
+      </a:accent3>
+      <a:accent4>
+        <a:srgbClr val="8064A2"/>
+      </a:accent4>
+      <a:accent5>
+        <a:srgbClr val="4BACC6"/>
+      </a:accent5>
+      <a:accent6>
+        <a:srgbClr val="F79646"/>
+      </a:accent6>
+      <a:hlink>
+        <a:srgbClr val="0000FF"/>
+      </a:hlink>
+      <a:folHlink>
+        <a:srgbClr val="800080"/>
+      </a:folHlink>
+    </a:clrScheme>
+    <a:fontScheme name="Office">
+      <a:majorFont>
+        <a:latin typeface="Calibri"/>
+        <a:ea typeface=""/>
+        <a:cs typeface=""/>
+        <a:font script="Jpan" typeface="ＭＳ Ｐゴシック"/>
+        <a:font script="Hang" typeface="맑은 고딕"/>
+        <a:font script="Hans" typeface="宋体"/>
+        <a:font script="Hant" typeface="新細明體"/>
+        <a:font script="Arab" typeface="Times New Roman"/>
+        <a:font script="Hebr" typeface="Times New Roman"/>
+        <a:font script="Thai" typeface="Angsana New"/>
+        <a:font script="Ethi" typeface="Nyala"/>
+        <a:font script="Beng" typeface="Vrinda"/>
+        <a:font script="Gujr" typeface="Shruti"/>
+        <a:font script="Khmr" typeface="MoolBoran"/>
+        <a:font script="Knda" typeface="Tunga"/>
+        <a:font script="Guru" typeface="Raavi"/>
+        <a:font script="Cans" typeface="Euphemia"/>
+        <a:font script="Cher" typeface="Plantagenet Cherokee"/>
+        <a:font script="Yiii" typeface="Microsoft Yi Baiti"/>
+        <a:font script="Tibt" typeface="Microsoft Himalaya"/>
+        <a:font script="Thaa" typeface="MV Boli"/>
+        <a:font script="Deva" typeface="Mangal"/>
+        <a:font script="Telu" typeface="Gautami"/>
+        <a:font script="Taml" typeface="Latha"/>
+        <a:font script="Syrc" typeface="Estrangelo Edessa"/>
+        <a:font script="Orya" typeface="Kalinga"/>
+        <a:font script="Mlym" typeface="Kartika"/>
+        <a:font script="Laoo" typeface="DokChampa"/>
+        <a:font script="Sinh" typeface="Iskoola Pota"/>
+        <a:font script="Mong" typeface="Mongolian Baiti"/>
+        <a:font script="Viet" typeface="Times New Roman"/>
+        <a:font script="Uigh" typeface="Microsoft Uighur"/>
+        <a:font script="Geor" typeface="Sylfaen"/>
+      </a:majorFont>
+      <a:minorFont>
+        <a:latin typeface="Calibri"/>
+        <a:ea typeface=""/>
+        <a:cs typeface=""/>
+        <a:font script="Jpan" typeface="ＭＳ Ｐゴシック"/>
+        <a:font script="Hang" typeface="맑은 고딕"/>
+        <a:font script="Hans" typeface="宋体"/>
+        <a:font script="Hant" typeface="新細明體"/>
+        <a:font script="Arab" typeface="Arial"/>
+        <a:font script="Hebr" typeface="Arial"/>
+        <a:font script="Thai" typeface="Cordia New"/>
+        <a:font script="Ethi" typeface="Nyala"/>
+        <a:font script="Beng" typeface="Vrinda"/>
+        <a:font script="Gujr" typeface="Shruti"/>
+        <a:font script="Khmr" typeface="DaunPenh"/>
+        <a:font script="Knda" typeface="Tunga"/>
+        <a:font script="Guru" typeface="Raavi"/>
+        <a:font script="Cans" typeface="Euphemia"/>
+        <a:font script="Cher" typeface="Plantagenet Cherokee"/>
+        <a:font script="Yiii" typeface="Microsoft Yi Baiti"/>
+        <a:font script="Tibt" typeface="Microsoft Himalaya"/>
+        <a:font script="Thaa" typeface="MV Boli"/>
+        <a:font script="Deva" typeface="Mangal"/>
+        <a:font script="Telu" typeface="Gautami"/>
+        <a:font script="Taml" typeface="Latha"/>
+        <a:font script="Syrc" typeface="Estrangelo Edessa"/>
+        <a:font script="Orya" typeface="Kalinga"/>
+        <a:font script="Mlym" typeface="Kartika"/>
+        <a:font script="Laoo" typeface="DokChampa"/>
+        <a:font script="Sinh" typeface="Iskoola Pota"/>
+        <a:font script="Mong" typeface="Mongolian Baiti"/>
+        <a:font script="Viet" typeface="Arial"/>
+        <a:font script="Uigh" typeface="Microsoft Uighur"/>
+        <a:font script="Geor" typeface="Sylfaen"/>
+      </a:minorFont>
+    </a:fontScheme>
+    <a:fmtScheme name="Office">
+      <a:fillStyleLst>
+        <a:solidFill>
+          <a:schemeClr val="phClr"/>
+        </a:solidFill>
+        <a:gradFill rotWithShape="1">
+          <a:gsLst>
+            <a:gs pos="0">
+              <a:schemeClr val="phClr">
+                <a:tint val="50000"/>
+                <a:satMod val="300000"/>
+              </a:schemeClr>
+            </a:gs>
+            <a:gs pos="35000">
+              <a:schemeClr val="phClr">
+                <a:tint val="37000"/>
+                <a:satMod val="300000"/>
+              </a:schemeClr>
+            </a:gs>
+            <a:gs pos="100000">
+              <a:schemeClr val="phClr">
+                <a:tint val="15000"/>
+                <a:satMod val="350000"/>
+              </a:schemeClr>
+            </a:gs>
+          </a:gsLst>
+          <a:lin ang="16200000" scaled="1"/>
+        </a:gradFill>
+        <a:gradFill rotWithShape="1">
+          <a:gsLst>
+            <a:gs pos="0">
+              <a:schemeClr val="phClr">
+                <a:tint val="100000"/>
+                <a:shade val="100000"/>
+                <a:satMod val="130000"/>
+              </a:schemeClr>
+            </a:gs>
+            <a:gs pos="100000">
+              <a:schemeClr val="phClr">
+                <a:tint val="50000"/>
+                <a:shade val="100000"/>
+                <a:satMod val="350000"/>
+              </a:schemeClr>
+            </a:gs>
+          </a:gsLst>
+          <a:lin ang="16200000" scaled="0"/>
+        </a:gradFill>
+      </a:fillStyleLst>
+      <a:lnStyleLst>
+        <a:ln w="9525" cap="flat" cmpd="sng" algn="ctr">
+          <a:solidFill>
+            <a:schemeClr val="phClr">
+              <a:shade val="95000"/>
+              <a:satMod val="105000"/>
+            </a:schemeClr>
+          </a:solidFill>
+          <a:prstDash val="solid"/>
+        </a:ln>
+        <a:ln w="25400" cap="flat" cmpd="sng" algn="ctr">
+          <a:solidFill>
+            <a:schemeClr val="phClr"/>
+          </a:solidFill>
+          <a:prstDash val="solid"/>
+        </a:ln>
+        <a:ln w="38100" cap="flat" cmpd="sng" algn="ctr">
+          <a:solidFill>
+            <a:schemeClr val="phClr"/>
+          </a:solidFill>
+          <a:prstDash val="solid"/>
+        </a:ln>
+      </a:lnStyleLst>
+      <a:effectStyleLst>
+        <a:effectStyle>
+          <a:effectLst>
+            <a:outerShdw blurRad="40000" dist="20000" dir="5400000" rotWithShape="0">
+              <a:srgbClr val="000000">
+                <a:alpha val="38000"/>
+              </a:srgbClr>
+            </a:outerShdw>
+          </a:effectLst>
+        </a:effectStyle>
+        <a:effectStyle>
+          <a:effectLst>
+            <a:outerShdw blurRad="40000" dist="23000" dir="5400000" rotWithShape="0">
+              <a:srgbClr val="000000">
+                <a:alpha val="35000"/>
+              </a:srgbClr>
+            </a:outerShdw>
+          </a:effectLst>
+        </a:effectStyle>
+        <a:effectStyle>
+          <a:effectLst>
+            <a:outerShdw blurRad="40000" dist="23000" dir="5400000" rotWithShape="0">
+              <a:srgbClr val="000000">
+                <a:alpha val="35000"/>
+              </a:srgbClr>
+            </a:outerShdw>
+          </a:effectLst>
+          <a:scene3d>
+            <a:camera prst="orthographicFront">
+              <a:rot lat="0" lon="0" rev="0"/>
+            </a:camera>
+            <a:lightRig rig="threePt" dir="t">
+              <a:rot lat="0" lon="0" rev="1200000"/>
+            </a:lightRig>
+          </a:scene3d>
+          <a:sp3d>
+            <a:bevelT w="63500" h="25400"/>
+          </a:sp3d>
+        </a:effectStyle>
+      </a:effectStyleLst>
+      <a:bgFillStyleLst>
+        <a:solidFill>
+          <a:schemeClr val="phClr"/>
+        </a:solidFill>
+        <a:gradFill rotWithShape="1">
+          <a:gsLst>
+            <a:gs pos="0">
+              <a:schemeClr val="phClr">
+                <a:tint val="40000"/>
+                <a:satMod val="350000"/>
+              </a:schemeClr>
+            </a:gs>
+            <a:gs pos="40000">
+              <a:schemeClr val="phClr">
+                <a:tint val="45000"/>
+                <a:shade val="99000"/>
+                <a:satMod val="350000"/>
+              </a:schemeClr>
+            </a:gs>
+            <a:gs pos="100000">
+              <a:schemeClr val="phClr">
+                <a:shade val="20000"/>
+                <a:satMod val="255000"/>
+              </a:schemeClr>
+            </a:gs>
+          </a:gsLst>
+          <a:path path="circle">
+            <a:fillToRect l="50000" t="-80000" r="50000" b="180000"/>
+          </a:path>
+        </a:gradFill>
+        <a:gradFill rotWithShape="1">
+          <a:gsLst>
+            <a:gs pos="0">
+              <a:schemeClr val="phClr">
+                <a:tint val="80000"/>
+                <a:satMod val="300000"/>
+              </a:schemeClr>
+            </a:gs>
+            <a:gs pos="100000">
+              <a:schemeClr val="phClr">
+                <a:shade val="30000"/>
+                <a:satMod val="200000"/>
+              </a:schemeClr>
+            </a:gs>
+          </a:gsLst>
+          <a:path path="circle">
+            <a:fillToRect l="50000" t="50000" r="50000" b="50000"/>
+          </a:path>
+        </a:gradFill>
+      </a:bgFillStyleLst>
+    </a:fmtScheme>
+  </a:themeElements>
+  <a:objectDefaults>
+    <a:spDef>
+      <a:spPr/>
+      <a:bodyPr/>
+      <a:lstStyle/>
+      <a:style>
+        <a:lnRef idx="1">
+          <a:schemeClr val="accent1"/>
+        </a:lnRef>
+        <a:fillRef idx="3">
+          <a:schemeClr val="accent1"/>
+        </a:fillRef>
+        <a:effectRef idx="2">
+          <a:schemeClr val="accent1"/>
+        </a:effectRef>
+        <a:fontRef idx="minor">
+          <a:schemeClr val="lt1"/>
+        </a:fontRef>
+      </a:style>
+    </a:spDef>
+    <a:lnDef>
+      <a:spPr/>
+      <a:bodyPr/>
+      <a:lstStyle/>
+      <a:style>
+        <a:lnRef idx="2">
+          <a:schemeClr val="accent1"/>
+        </a:lnRef>
+        <a:fillRef idx="0">
+          <a:schemeClr val="accent1"/>
+        </a:fillRef>
+        <a:effectRef idx="1">
+          <a:schemeClr val="accent1"/>
+        </a:effectRef>
+        <a:fontRef idx="minor">
+          <a:schemeClr val="tx1"/>
+        </a:fontRef>
+      </a:style>
+    </a:lnDef>
+  </a:objectDefaults>
+  <a:extraClrSchemeLst/>
+</a:theme>
+</file>
+
+<file path=ppt/theme/theme7.xml><?xml version="1.0" encoding="utf-8"?>
 <a:theme xmlns:a="http://schemas.openxmlformats.org/drawingml/2006/main" name="Office Theme">
   <a:themeElements>
     <a:clrScheme name="Office">

</xml_diff>